<commit_message>
update docker intro presentation + excluded _data folder form docker build context
</commit_message>
<xml_diff>
--- a/src/_data/docker.pptx
+++ b/src/_data/docker.pptx
@@ -12,18 +12,22 @@
     <p:sldId id="273" r:id="rId6"/>
     <p:sldId id="258" r:id="rId7"/>
     <p:sldId id="271" r:id="rId8"/>
-    <p:sldId id="276" r:id="rId9"/>
-    <p:sldId id="260" r:id="rId10"/>
-    <p:sldId id="277" r:id="rId11"/>
-    <p:sldId id="268" r:id="rId12"/>
-    <p:sldId id="266" r:id="rId13"/>
-    <p:sldId id="261" r:id="rId14"/>
-    <p:sldId id="267" r:id="rId15"/>
-    <p:sldId id="269" r:id="rId16"/>
-    <p:sldId id="274" r:id="rId17"/>
-    <p:sldId id="275" r:id="rId18"/>
-    <p:sldId id="270" r:id="rId19"/>
-    <p:sldId id="259" r:id="rId20"/>
+    <p:sldId id="278" r:id="rId9"/>
+    <p:sldId id="276" r:id="rId10"/>
+    <p:sldId id="260" r:id="rId11"/>
+    <p:sldId id="277" r:id="rId12"/>
+    <p:sldId id="281" r:id="rId13"/>
+    <p:sldId id="268" r:id="rId14"/>
+    <p:sldId id="266" r:id="rId15"/>
+    <p:sldId id="279" r:id="rId16"/>
+    <p:sldId id="261" r:id="rId17"/>
+    <p:sldId id="267" r:id="rId18"/>
+    <p:sldId id="269" r:id="rId19"/>
+    <p:sldId id="274" r:id="rId20"/>
+    <p:sldId id="280" r:id="rId21"/>
+    <p:sldId id="275" r:id="rId22"/>
+    <p:sldId id="270" r:id="rId23"/>
+    <p:sldId id="259" r:id="rId24"/>
   </p:sldIdLst>
   <p:sldSz cx="12192000" cy="6858000"/>
   <p:notesSz cx="6858000" cy="9144000"/>
@@ -3456,13 +3460,8 @@
           <a:p>
             <a:r>
               <a:rPr lang="en-US" dirty="0"/>
-              <a:t>.</a:t>
-            </a:r>
-            <a:r>
-              <a:rPr lang="en-US" dirty="0" err="1"/>
-              <a:t>dockerignore</a:t>
-            </a:r>
-            <a:endParaRPr lang="en-US" dirty="0"/>
+              <a:t>docker-compose</a:t>
+            </a:r>
           </a:p>
         </p:txBody>
       </p:sp>
@@ -3489,70 +3488,35 @@
           <a:p>
             <a:r>
               <a:rPr lang="en-US" dirty="0"/>
-              <a:t>build context</a:t>
+              <a:t>define and run multi-container Docker applications</a:t>
+            </a:r>
+          </a:p>
+          <a:p>
+            <a:r>
+              <a:rPr lang="en-US" dirty="0"/>
+              <a:t>yam configuration</a:t>
             </a:r>
           </a:p>
           <a:p>
             <a:pPr lvl="1"/>
             <a:r>
-              <a:rPr lang="en-US" dirty="0" err="1"/>
-              <a:t>Dockerfile</a:t>
-            </a:r>
-            <a:r>
-              <a:rPr lang="en-US" dirty="0"/>
-              <a:t> is part of it</a:t>
+              <a:rPr lang="en-US" dirty="0"/>
+              <a:t>list of services</a:t>
             </a:r>
           </a:p>
           <a:p>
             <a:pPr lvl="1"/>
             <a:r>
               <a:rPr lang="en-US" dirty="0"/>
-              <a:t>can be defined recursively</a:t>
-            </a:r>
-          </a:p>
-          <a:p>
-            <a:pPr lvl="1"/>
-            <a:r>
-              <a:rPr lang="en-US" dirty="0"/>
-              <a:t>is sent to Docker daemon </a:t>
-            </a:r>
-            <a:r>
-              <a:rPr lang="en-US" sz="2000" i="1" dirty="0"/>
-              <a:t>“Sending build context to Docker daemon  35.33kB”</a:t>
-            </a:r>
-          </a:p>
-          <a:p>
-            <a:r>
-              <a:rPr lang="en-US" dirty="0"/>
-              <a:t>.</a:t>
-            </a:r>
-            <a:r>
-              <a:rPr lang="en-US" dirty="0" err="1"/>
-              <a:t>dockerignore</a:t>
-            </a:r>
-            <a:r>
-              <a:rPr lang="en-US" dirty="0"/>
-              <a:t> file excludes files that are not relevant for build</a:t>
-            </a:r>
-          </a:p>
-          <a:p>
-            <a:pPr lvl="1"/>
-            <a:r>
-              <a:rPr lang="en-US" dirty="0"/>
-              <a:t>similar purpose as .</a:t>
-            </a:r>
-            <a:r>
-              <a:rPr lang="en-US" dirty="0" err="1"/>
-              <a:t>gitignore</a:t>
-            </a:r>
-            <a:endParaRPr lang="en-US" dirty="0"/>
+              <a:t>configuration how to build images for these services (can contain path to service docker file)</a:t>
+            </a:r>
           </a:p>
         </p:txBody>
       </p:sp>
     </p:spTree>
     <p:extLst>
       <p:ext uri="{BB962C8B-B14F-4D97-AF65-F5344CB8AC3E}">
-        <p14:creationId xmlns:p14="http://schemas.microsoft.com/office/powerpoint/2010/main" val="1402545555"/>
+        <p14:creationId xmlns:p14="http://schemas.microsoft.com/office/powerpoint/2010/main" val="3540793809"/>
       </p:ext>
     </p:extLst>
   </p:cSld>
@@ -3584,7 +3548,7 @@
           <p:cNvPr id="2" name="Title 1">
             <a:extLst>
               <a:ext uri="{FF2B5EF4-FFF2-40B4-BE49-F238E27FC236}">
-                <a16:creationId xmlns:a16="http://schemas.microsoft.com/office/drawing/2014/main" id="{55FC709F-AA0C-4631-9258-FE9EBED3D402}"/>
+                <a16:creationId xmlns:a16="http://schemas.microsoft.com/office/drawing/2014/main" id="{BB21D77D-4C3A-4B66-84CE-9B062D14A330}"/>
               </a:ext>
             </a:extLst>
           </p:cNvPr>
@@ -3602,8 +3566,13 @@
           <a:p>
             <a:r>
               <a:rPr lang="en-US" dirty="0"/>
-              <a:t>Docker – application data</a:t>
-            </a:r>
+              <a:t>.</a:t>
+            </a:r>
+            <a:r>
+              <a:rPr lang="en-US" dirty="0" err="1"/>
+              <a:t>dockerignore</a:t>
+            </a:r>
+            <a:endParaRPr lang="en-US" dirty="0"/>
           </a:p>
         </p:txBody>
       </p:sp>
@@ -3612,7 +3581,7 @@
           <p:cNvPr id="3" name="Content Placeholder 2">
             <a:extLst>
               <a:ext uri="{FF2B5EF4-FFF2-40B4-BE49-F238E27FC236}">
-                <a16:creationId xmlns:a16="http://schemas.microsoft.com/office/drawing/2014/main" id="{3222C25C-A151-4E2F-9DAD-C0964E88C089}"/>
+                <a16:creationId xmlns:a16="http://schemas.microsoft.com/office/drawing/2014/main" id="{E533342D-28AE-48F1-92F9-DB97BE6F87FE}"/>
               </a:ext>
             </a:extLst>
           </p:cNvPr>
@@ -3630,73 +3599,70 @@
           <a:p>
             <a:r>
               <a:rPr lang="en-US" dirty="0"/>
-              <a:t>Volumes</a:t>
+              <a:t>build context</a:t>
             </a:r>
           </a:p>
           <a:p>
             <a:pPr lvl="1"/>
             <a:r>
-              <a:rPr lang="en-US" dirty="0"/>
-              <a:t>file/directory on host machine is mounted into a container</a:t>
+              <a:rPr lang="en-US" dirty="0" err="1"/>
+              <a:t>Dockerfile</a:t>
+            </a:r>
+            <a:r>
+              <a:rPr lang="en-US" dirty="0"/>
+              <a:t> is part of it</a:t>
             </a:r>
           </a:p>
           <a:p>
             <a:pPr lvl="1"/>
             <a:r>
               <a:rPr lang="en-US" dirty="0"/>
-              <a:t>best choice for data storing</a:t>
-            </a:r>
-          </a:p>
-          <a:p>
-            <a:r>
-              <a:rPr lang="en-US" dirty="0"/>
-              <a:t>Bind mounts</a:t>
+              <a:t>can be defined recursively</a:t>
             </a:r>
           </a:p>
           <a:p>
             <a:pPr lvl="1"/>
             <a:r>
               <a:rPr lang="en-US" dirty="0"/>
-              <a:t>file/directory on host machine is mounted into a container</a:t>
+              <a:t>is sent to Docker daemon </a:t>
+            </a:r>
+            <a:r>
+              <a:rPr lang="en-US" sz="2000" i="1" dirty="0"/>
+              <a:t>“Sending build context to Docker daemon  35.33kB”</a:t>
+            </a:r>
+          </a:p>
+          <a:p>
+            <a:r>
+              <a:rPr lang="en-US" dirty="0"/>
+              <a:t>.</a:t>
+            </a:r>
+            <a:r>
+              <a:rPr lang="en-US" dirty="0" err="1"/>
+              <a:t>dockerignore</a:t>
+            </a:r>
+            <a:r>
+              <a:rPr lang="en-US" dirty="0"/>
+              <a:t> file excludes files that are not relevant for build</a:t>
             </a:r>
           </a:p>
           <a:p>
             <a:pPr lvl="1"/>
             <a:r>
               <a:rPr lang="en-US" dirty="0"/>
-              <a:t>Docker CLI cannot be used to manage bind-mounts</a:t>
-            </a:r>
-          </a:p>
-          <a:p>
+              <a:t>similar purpose as .</a:t>
+            </a:r>
             <a:r>
               <a:rPr lang="en-US" dirty="0" err="1"/>
-              <a:t>tmpfs</a:t>
-            </a:r>
-            <a:r>
-              <a:rPr lang="en-US" dirty="0"/>
-              <a:t> mounts</a:t>
-            </a:r>
-          </a:p>
-          <a:p>
-            <a:pPr lvl="1"/>
-            <a:r>
-              <a:rPr lang="en-US" dirty="0"/>
-              <a:t>stored in memory/swap (nor container R/W layer, nor host filesystem)</a:t>
-            </a:r>
-          </a:p>
-          <a:p>
-            <a:pPr lvl="1"/>
-            <a:r>
-              <a:rPr lang="en-US" dirty="0"/>
-              <a:t>cleared when container is stopped</a:t>
-            </a:r>
+              <a:t>gitignore</a:t>
+            </a:r>
+            <a:endParaRPr lang="en-US" dirty="0"/>
           </a:p>
         </p:txBody>
       </p:sp>
     </p:spTree>
     <p:extLst>
       <p:ext uri="{BB962C8B-B14F-4D97-AF65-F5344CB8AC3E}">
-        <p14:creationId xmlns:p14="http://schemas.microsoft.com/office/powerpoint/2010/main" val="3692977509"/>
+        <p14:creationId xmlns:p14="http://schemas.microsoft.com/office/powerpoint/2010/main" val="1402545555"/>
       </p:ext>
     </p:extLst>
   </p:cSld>
@@ -3728,6 +3694,307 @@
           <p:cNvPr id="2" name="Title 1">
             <a:extLst>
               <a:ext uri="{FF2B5EF4-FFF2-40B4-BE49-F238E27FC236}">
+                <a16:creationId xmlns:a16="http://schemas.microsoft.com/office/drawing/2014/main" id="{464CA198-CBF7-407B-B8A2-CA003AD7CB41}"/>
+              </a:ext>
+            </a:extLst>
+          </p:cNvPr>
+          <p:cNvSpPr>
+            <a:spLocks noGrp="1"/>
+          </p:cNvSpPr>
+          <p:nvPr>
+            <p:ph type="title"/>
+          </p:nvPr>
+        </p:nvSpPr>
+        <p:spPr/>
+        <p:txBody>
+          <a:bodyPr/>
+          <a:lstStyle/>
+          <a:p>
+            <a:endParaRPr lang="en-US" dirty="0"/>
+          </a:p>
+        </p:txBody>
+      </p:sp>
+      <p:sp>
+        <p:nvSpPr>
+          <p:cNvPr id="3" name="Content Placeholder 2">
+            <a:extLst>
+              <a:ext uri="{FF2B5EF4-FFF2-40B4-BE49-F238E27FC236}">
+                <a16:creationId xmlns:a16="http://schemas.microsoft.com/office/drawing/2014/main" id="{C5FB6573-8C73-44D7-B5E6-65EBAF34FD85}"/>
+              </a:ext>
+            </a:extLst>
+          </p:cNvPr>
+          <p:cNvSpPr>
+            <a:spLocks noGrp="1"/>
+          </p:cNvSpPr>
+          <p:nvPr>
+            <p:ph idx="1"/>
+          </p:nvPr>
+        </p:nvSpPr>
+        <p:spPr/>
+        <p:txBody>
+          <a:bodyPr/>
+          <a:lstStyle/>
+          <a:p>
+            <a:pPr marL="0" indent="0">
+              <a:buNone/>
+            </a:pPr>
+            <a:endParaRPr lang="en-US" dirty="0"/>
+          </a:p>
+          <a:p>
+            <a:pPr marL="0" indent="0">
+              <a:buNone/>
+            </a:pPr>
+            <a:endParaRPr lang="en-US" dirty="0"/>
+          </a:p>
+          <a:p>
+            <a:pPr marL="0" indent="0">
+              <a:buNone/>
+            </a:pPr>
+            <a:endParaRPr lang="en-US" dirty="0"/>
+          </a:p>
+          <a:p>
+            <a:pPr marL="0" indent="0" algn="ctr">
+              <a:buNone/>
+            </a:pPr>
+            <a:r>
+              <a:rPr lang="en-US" sz="4800" dirty="0"/>
+              <a:t>.NET Core 2.0</a:t>
+            </a:r>
+          </a:p>
+        </p:txBody>
+      </p:sp>
+      <p:sp>
+        <p:nvSpPr>
+          <p:cNvPr id="4" name="TextBox 3">
+            <a:extLst>
+              <a:ext uri="{FF2B5EF4-FFF2-40B4-BE49-F238E27FC236}">
+                <a16:creationId xmlns:a16="http://schemas.microsoft.com/office/drawing/2014/main" id="{7A6F8156-3B86-422D-8C6F-DE4F8DDFCBFD}"/>
+              </a:ext>
+            </a:extLst>
+          </p:cNvPr>
+          <p:cNvSpPr txBox="1"/>
+          <p:nvPr/>
+        </p:nvSpPr>
+        <p:spPr>
+          <a:xfrm>
+            <a:off x="-8389" y="6211232"/>
+            <a:ext cx="9118833" cy="646331"/>
+          </a:xfrm>
+          <a:prstGeom prst="rect">
+            <a:avLst/>
+          </a:prstGeom>
+          <a:noFill/>
+        </p:spPr>
+        <p:txBody>
+          <a:bodyPr wrap="square" rtlCol="0">
+            <a:spAutoFit/>
+          </a:bodyPr>
+          <a:lstStyle/>
+          <a:p>
+            <a:r>
+              <a:rPr lang="en-US" i="1" dirty="0">
+                <a:solidFill>
+                  <a:schemeClr val="accent2">
+                    <a:lumMod val="75000"/>
+                  </a:schemeClr>
+                </a:solidFill>
+              </a:rPr>
+              <a:t>docker build</a:t>
+            </a:r>
+          </a:p>
+          <a:p>
+            <a:r>
+              <a:rPr lang="en-US" i="1" dirty="0">
+                <a:solidFill>
+                  <a:schemeClr val="accent2">
+                    <a:lumMod val="75000"/>
+                  </a:schemeClr>
+                </a:solidFill>
+              </a:rPr>
+              <a:t>docker compose-up</a:t>
+            </a:r>
+          </a:p>
+        </p:txBody>
+      </p:sp>
+    </p:spTree>
+    <p:extLst>
+      <p:ext uri="{BB962C8B-B14F-4D97-AF65-F5344CB8AC3E}">
+        <p14:creationId xmlns:p14="http://schemas.microsoft.com/office/powerpoint/2010/main" val="931205960"/>
+      </p:ext>
+    </p:extLst>
+  </p:cSld>
+  <p:clrMapOvr>
+    <a:masterClrMapping/>
+  </p:clrMapOvr>
+</p:sld>
+</file>
+
+<file path=ppt/slides/slide13.xml><?xml version="1.0" encoding="utf-8"?>
+<p:sld xmlns:a="http://schemas.openxmlformats.org/drawingml/2006/main" xmlns:r="http://schemas.openxmlformats.org/officeDocument/2006/relationships" xmlns:p="http://schemas.openxmlformats.org/presentationml/2006/main">
+  <p:cSld>
+    <p:spTree>
+      <p:nvGrpSpPr>
+        <p:cNvPr id="1" name=""/>
+        <p:cNvGrpSpPr/>
+        <p:nvPr/>
+      </p:nvGrpSpPr>
+      <p:grpSpPr>
+        <a:xfrm>
+          <a:off x="0" y="0"/>
+          <a:ext cx="0" cy="0"/>
+          <a:chOff x="0" y="0"/>
+          <a:chExt cx="0" cy="0"/>
+        </a:xfrm>
+      </p:grpSpPr>
+      <p:sp>
+        <p:nvSpPr>
+          <p:cNvPr id="2" name="Title 1">
+            <a:extLst>
+              <a:ext uri="{FF2B5EF4-FFF2-40B4-BE49-F238E27FC236}">
+                <a16:creationId xmlns:a16="http://schemas.microsoft.com/office/drawing/2014/main" id="{55FC709F-AA0C-4631-9258-FE9EBED3D402}"/>
+              </a:ext>
+            </a:extLst>
+          </p:cNvPr>
+          <p:cNvSpPr>
+            <a:spLocks noGrp="1"/>
+          </p:cNvSpPr>
+          <p:nvPr>
+            <p:ph type="title"/>
+          </p:nvPr>
+        </p:nvSpPr>
+        <p:spPr/>
+        <p:txBody>
+          <a:bodyPr/>
+          <a:lstStyle/>
+          <a:p>
+            <a:r>
+              <a:rPr lang="en-US" dirty="0"/>
+              <a:t>Docker – application data</a:t>
+            </a:r>
+          </a:p>
+        </p:txBody>
+      </p:sp>
+      <p:sp>
+        <p:nvSpPr>
+          <p:cNvPr id="3" name="Content Placeholder 2">
+            <a:extLst>
+              <a:ext uri="{FF2B5EF4-FFF2-40B4-BE49-F238E27FC236}">
+                <a16:creationId xmlns:a16="http://schemas.microsoft.com/office/drawing/2014/main" id="{3222C25C-A151-4E2F-9DAD-C0964E88C089}"/>
+              </a:ext>
+            </a:extLst>
+          </p:cNvPr>
+          <p:cNvSpPr>
+            <a:spLocks noGrp="1"/>
+          </p:cNvSpPr>
+          <p:nvPr>
+            <p:ph idx="1"/>
+          </p:nvPr>
+        </p:nvSpPr>
+        <p:spPr/>
+        <p:txBody>
+          <a:bodyPr/>
+          <a:lstStyle/>
+          <a:p>
+            <a:r>
+              <a:rPr lang="en-US" dirty="0"/>
+              <a:t>Volumes</a:t>
+            </a:r>
+          </a:p>
+          <a:p>
+            <a:pPr lvl="1"/>
+            <a:r>
+              <a:rPr lang="en-US" dirty="0"/>
+              <a:t>file/directory on host machine is mounted into a container</a:t>
+            </a:r>
+          </a:p>
+          <a:p>
+            <a:pPr lvl="1"/>
+            <a:r>
+              <a:rPr lang="en-US" dirty="0"/>
+              <a:t>best choice for data storing</a:t>
+            </a:r>
+          </a:p>
+          <a:p>
+            <a:r>
+              <a:rPr lang="en-US" dirty="0"/>
+              <a:t>Bind mounts</a:t>
+            </a:r>
+          </a:p>
+          <a:p>
+            <a:pPr lvl="1"/>
+            <a:r>
+              <a:rPr lang="en-US" dirty="0"/>
+              <a:t>file/directory on host machine is mounted into a container</a:t>
+            </a:r>
+          </a:p>
+          <a:p>
+            <a:pPr lvl="1"/>
+            <a:r>
+              <a:rPr lang="en-US" dirty="0"/>
+              <a:t>Docker CLI cannot be used to manage bind-mounts</a:t>
+            </a:r>
+          </a:p>
+          <a:p>
+            <a:r>
+              <a:rPr lang="en-US" dirty="0" err="1"/>
+              <a:t>tmpfs</a:t>
+            </a:r>
+            <a:r>
+              <a:rPr lang="en-US" dirty="0"/>
+              <a:t> mounts</a:t>
+            </a:r>
+          </a:p>
+          <a:p>
+            <a:pPr lvl="1"/>
+            <a:r>
+              <a:rPr lang="en-US" dirty="0"/>
+              <a:t>stored in memory/swap (nor container R/W layer, nor host filesystem)</a:t>
+            </a:r>
+          </a:p>
+          <a:p>
+            <a:pPr lvl="1"/>
+            <a:r>
+              <a:rPr lang="en-US" dirty="0"/>
+              <a:t>cleared when container is stopped</a:t>
+            </a:r>
+          </a:p>
+        </p:txBody>
+      </p:sp>
+    </p:spTree>
+    <p:extLst>
+      <p:ext uri="{BB962C8B-B14F-4D97-AF65-F5344CB8AC3E}">
+        <p14:creationId xmlns:p14="http://schemas.microsoft.com/office/powerpoint/2010/main" val="3692977509"/>
+      </p:ext>
+    </p:extLst>
+  </p:cSld>
+  <p:clrMapOvr>
+    <a:masterClrMapping/>
+  </p:clrMapOvr>
+</p:sld>
+</file>
+
+<file path=ppt/slides/slide14.xml><?xml version="1.0" encoding="utf-8"?>
+<p:sld xmlns:a="http://schemas.openxmlformats.org/drawingml/2006/main" xmlns:r="http://schemas.openxmlformats.org/officeDocument/2006/relationships" xmlns:p="http://schemas.openxmlformats.org/presentationml/2006/main">
+  <p:cSld>
+    <p:spTree>
+      <p:nvGrpSpPr>
+        <p:cNvPr id="1" name=""/>
+        <p:cNvGrpSpPr/>
+        <p:nvPr/>
+      </p:nvGrpSpPr>
+      <p:grpSpPr>
+        <a:xfrm>
+          <a:off x="0" y="0"/>
+          <a:ext cx="0" cy="0"/>
+          <a:chOff x="0" y="0"/>
+          <a:chExt cx="0" cy="0"/>
+        </a:xfrm>
+      </p:grpSpPr>
+      <p:sp>
+        <p:nvSpPr>
+          <p:cNvPr id="2" name="Title 1">
+            <a:extLst>
+              <a:ext uri="{FF2B5EF4-FFF2-40B4-BE49-F238E27FC236}">
                 <a16:creationId xmlns:a16="http://schemas.microsoft.com/office/drawing/2014/main" id="{08578D90-C595-4221-9910-97011CA30B58}"/>
               </a:ext>
             </a:extLst>
@@ -3871,7 +4138,164 @@
 </p:sld>
 </file>
 
-<file path=ppt/slides/slide13.xml><?xml version="1.0" encoding="utf-8"?>
+<file path=ppt/slides/slide15.xml><?xml version="1.0" encoding="utf-8"?>
+<p:sld xmlns:a="http://schemas.openxmlformats.org/drawingml/2006/main" xmlns:r="http://schemas.openxmlformats.org/officeDocument/2006/relationships" xmlns:p="http://schemas.openxmlformats.org/presentationml/2006/main">
+  <p:cSld>
+    <p:spTree>
+      <p:nvGrpSpPr>
+        <p:cNvPr id="1" name=""/>
+        <p:cNvGrpSpPr/>
+        <p:nvPr/>
+      </p:nvGrpSpPr>
+      <p:grpSpPr>
+        <a:xfrm>
+          <a:off x="0" y="0"/>
+          <a:ext cx="0" cy="0"/>
+          <a:chOff x="0" y="0"/>
+          <a:chExt cx="0" cy="0"/>
+        </a:xfrm>
+      </p:grpSpPr>
+      <p:sp>
+        <p:nvSpPr>
+          <p:cNvPr id="2" name="Title 1">
+            <a:extLst>
+              <a:ext uri="{FF2B5EF4-FFF2-40B4-BE49-F238E27FC236}">
+                <a16:creationId xmlns:a16="http://schemas.microsoft.com/office/drawing/2014/main" id="{464CA198-CBF7-407B-B8A2-CA003AD7CB41}"/>
+              </a:ext>
+            </a:extLst>
+          </p:cNvPr>
+          <p:cNvSpPr>
+            <a:spLocks noGrp="1"/>
+          </p:cNvSpPr>
+          <p:nvPr>
+            <p:ph type="title"/>
+          </p:nvPr>
+        </p:nvSpPr>
+        <p:spPr/>
+        <p:txBody>
+          <a:bodyPr/>
+          <a:lstStyle/>
+          <a:p>
+            <a:endParaRPr lang="en-US" dirty="0"/>
+          </a:p>
+        </p:txBody>
+      </p:sp>
+      <p:sp>
+        <p:nvSpPr>
+          <p:cNvPr id="3" name="Content Placeholder 2">
+            <a:extLst>
+              <a:ext uri="{FF2B5EF4-FFF2-40B4-BE49-F238E27FC236}">
+                <a16:creationId xmlns:a16="http://schemas.microsoft.com/office/drawing/2014/main" id="{C5FB6573-8C73-44D7-B5E6-65EBAF34FD85}"/>
+              </a:ext>
+            </a:extLst>
+          </p:cNvPr>
+          <p:cNvSpPr>
+            <a:spLocks noGrp="1"/>
+          </p:cNvSpPr>
+          <p:nvPr>
+            <p:ph idx="1"/>
+          </p:nvPr>
+        </p:nvSpPr>
+        <p:spPr/>
+        <p:txBody>
+          <a:bodyPr/>
+          <a:lstStyle/>
+          <a:p>
+            <a:pPr marL="0" indent="0">
+              <a:buNone/>
+            </a:pPr>
+            <a:endParaRPr lang="en-US" dirty="0"/>
+          </a:p>
+          <a:p>
+            <a:pPr marL="0" indent="0">
+              <a:buNone/>
+            </a:pPr>
+            <a:endParaRPr lang="en-US" dirty="0"/>
+          </a:p>
+          <a:p>
+            <a:pPr marL="0" indent="0">
+              <a:buNone/>
+            </a:pPr>
+            <a:endParaRPr lang="en-US" dirty="0"/>
+          </a:p>
+          <a:p>
+            <a:pPr marL="0" indent="0" algn="ctr">
+              <a:buNone/>
+            </a:pPr>
+            <a:r>
+              <a:rPr lang="en-US" sz="4800" dirty="0"/>
+              <a:t>MariaDB example</a:t>
+            </a:r>
+          </a:p>
+        </p:txBody>
+      </p:sp>
+      <p:sp>
+        <p:nvSpPr>
+          <p:cNvPr id="4" name="TextBox 3">
+            <a:extLst>
+              <a:ext uri="{FF2B5EF4-FFF2-40B4-BE49-F238E27FC236}">
+                <a16:creationId xmlns:a16="http://schemas.microsoft.com/office/drawing/2014/main" id="{83E2DF29-AB33-496B-BAE8-521C2E7569EF}"/>
+              </a:ext>
+            </a:extLst>
+          </p:cNvPr>
+          <p:cNvSpPr txBox="1"/>
+          <p:nvPr/>
+        </p:nvSpPr>
+        <p:spPr>
+          <a:xfrm>
+            <a:off x="0" y="6211669"/>
+            <a:ext cx="9118833" cy="646331"/>
+          </a:xfrm>
+          <a:prstGeom prst="rect">
+            <a:avLst/>
+          </a:prstGeom>
+          <a:noFill/>
+        </p:spPr>
+        <p:txBody>
+          <a:bodyPr wrap="square" rtlCol="0">
+            <a:spAutoFit/>
+          </a:bodyPr>
+          <a:lstStyle/>
+          <a:p>
+            <a:r>
+              <a:rPr lang="en-US" i="1" dirty="0">
+                <a:solidFill>
+                  <a:schemeClr val="accent2">
+                    <a:lumMod val="75000"/>
+                  </a:schemeClr>
+                </a:solidFill>
+              </a:rPr>
+              <a:t>docker volume</a:t>
+            </a:r>
+          </a:p>
+          <a:p>
+            <a:r>
+              <a:rPr lang="en-US" i="1" dirty="0">
+                <a:solidFill>
+                  <a:schemeClr val="accent2">
+                    <a:lumMod val="75000"/>
+                  </a:schemeClr>
+                </a:solidFill>
+              </a:rPr>
+              <a:t>docker inspect</a:t>
+            </a:r>
+          </a:p>
+        </p:txBody>
+      </p:sp>
+    </p:spTree>
+    <p:extLst>
+      <p:ext uri="{BB962C8B-B14F-4D97-AF65-F5344CB8AC3E}">
+        <p14:creationId xmlns:p14="http://schemas.microsoft.com/office/powerpoint/2010/main" val="3335794604"/>
+      </p:ext>
+    </p:extLst>
+  </p:cSld>
+  <p:clrMapOvr>
+    <a:masterClrMapping/>
+  </p:clrMapOvr>
+</p:sld>
+</file>
+
+<file path=ppt/slides/slide16.xml><?xml version="1.0" encoding="utf-8"?>
 <p:sld xmlns:a="http://schemas.openxmlformats.org/drawingml/2006/main" xmlns:r="http://schemas.openxmlformats.org/officeDocument/2006/relationships" xmlns:p="http://schemas.openxmlformats.org/presentationml/2006/main">
   <p:cSld>
     <p:spTree>
@@ -3999,533 +4423,6 @@
 </p:sld>
 </file>
 
-<file path=ppt/slides/slide14.xml><?xml version="1.0" encoding="utf-8"?>
-<p:sld xmlns:a="http://schemas.openxmlformats.org/drawingml/2006/main" xmlns:r="http://schemas.openxmlformats.org/officeDocument/2006/relationships" xmlns:p="http://schemas.openxmlformats.org/presentationml/2006/main">
-  <p:cSld>
-    <p:spTree>
-      <p:nvGrpSpPr>
-        <p:cNvPr id="1" name=""/>
-        <p:cNvGrpSpPr/>
-        <p:nvPr/>
-      </p:nvGrpSpPr>
-      <p:grpSpPr>
-        <a:xfrm>
-          <a:off x="0" y="0"/>
-          <a:ext cx="0" cy="0"/>
-          <a:chOff x="0" y="0"/>
-          <a:chExt cx="0" cy="0"/>
-        </a:xfrm>
-      </p:grpSpPr>
-      <p:sp>
-        <p:nvSpPr>
-          <p:cNvPr id="2" name="Title 1">
-            <a:extLst>
-              <a:ext uri="{FF2B5EF4-FFF2-40B4-BE49-F238E27FC236}">
-                <a16:creationId xmlns:a16="http://schemas.microsoft.com/office/drawing/2014/main" id="{4DA00555-4385-4FB6-AFB7-64E8E37A98D3}"/>
-              </a:ext>
-            </a:extLst>
-          </p:cNvPr>
-          <p:cNvSpPr>
-            <a:spLocks noGrp="1"/>
-          </p:cNvSpPr>
-          <p:nvPr>
-            <p:ph type="title"/>
-          </p:nvPr>
-        </p:nvSpPr>
-        <p:spPr/>
-        <p:txBody>
-          <a:bodyPr/>
-          <a:lstStyle/>
-          <a:p>
-            <a:r>
-              <a:rPr lang="en-US" dirty="0"/>
-              <a:t>Docker - storage drivers</a:t>
-            </a:r>
-          </a:p>
-        </p:txBody>
-      </p:sp>
-      <p:sp>
-        <p:nvSpPr>
-          <p:cNvPr id="3" name="Content Placeholder 2">
-            <a:extLst>
-              <a:ext uri="{FF2B5EF4-FFF2-40B4-BE49-F238E27FC236}">
-                <a16:creationId xmlns:a16="http://schemas.microsoft.com/office/drawing/2014/main" id="{59D54D27-EC9C-4D9B-9467-EB646BB762F2}"/>
-              </a:ext>
-            </a:extLst>
-          </p:cNvPr>
-          <p:cNvSpPr>
-            <a:spLocks noGrp="1"/>
-          </p:cNvSpPr>
-          <p:nvPr>
-            <p:ph idx="1"/>
-          </p:nvPr>
-        </p:nvSpPr>
-        <p:spPr/>
-        <p:txBody>
-          <a:bodyPr>
-            <a:normAutofit/>
-          </a:bodyPr>
-          <a:lstStyle/>
-          <a:p>
-            <a:r>
-              <a:rPr lang="en-US" dirty="0"/>
-              <a:t>Control how images and containers are stored (important)</a:t>
-            </a:r>
-          </a:p>
-          <a:p>
-            <a:r>
-              <a:rPr lang="en-US" dirty="0"/>
-              <a:t>More than one is supported</a:t>
-            </a:r>
-          </a:p>
-          <a:p>
-            <a:r>
-              <a:rPr lang="en-US" dirty="0"/>
-              <a:t>overlay 2 , </a:t>
-            </a:r>
-            <a:r>
-              <a:rPr lang="en-US" dirty="0" err="1"/>
-              <a:t>aufs</a:t>
-            </a:r>
-            <a:r>
-              <a:rPr lang="en-US" dirty="0"/>
-              <a:t>, </a:t>
-            </a:r>
-            <a:r>
-              <a:rPr lang="en-US" dirty="0" err="1"/>
-              <a:t>devicemapper</a:t>
-            </a:r>
-            <a:r>
-              <a:rPr lang="en-US" dirty="0"/>
-              <a:t>, </a:t>
-            </a:r>
-            <a:r>
-              <a:rPr lang="en-US" dirty="0" err="1"/>
-              <a:t>vfs</a:t>
-            </a:r>
-            <a:r>
-              <a:rPr lang="en-US" dirty="0"/>
-              <a:t>, </a:t>
-            </a:r>
-            <a:r>
-              <a:rPr lang="en-US" dirty="0" err="1"/>
-              <a:t>zfs</a:t>
-            </a:r>
-            <a:r>
-              <a:rPr lang="en-US" dirty="0"/>
-              <a:t>, </a:t>
-            </a:r>
-            <a:r>
-              <a:rPr lang="en-US" dirty="0" err="1"/>
-              <a:t>brtfs</a:t>
-            </a:r>
-            <a:r>
-              <a:rPr lang="en-US" dirty="0"/>
-              <a:t> …</a:t>
-            </a:r>
-          </a:p>
-          <a:p>
-            <a:pPr lvl="1"/>
-            <a:r>
-              <a:rPr lang="en-US" dirty="0"/>
-              <a:t>Priority list – depend also on </a:t>
-            </a:r>
-            <a:r>
-              <a:rPr lang="en-US" dirty="0" err="1"/>
-              <a:t>linux</a:t>
-            </a:r>
-            <a:r>
-              <a:rPr lang="en-US" dirty="0"/>
-              <a:t> distribution (Ubuntu vs. Fedora)</a:t>
-            </a:r>
-          </a:p>
-          <a:p>
-            <a:pPr lvl="1"/>
-            <a:r>
-              <a:rPr lang="en-US" dirty="0"/>
-              <a:t>Can be modified (except for Windows and Mac)</a:t>
-            </a:r>
-          </a:p>
-          <a:p>
-            <a:pPr lvl="1"/>
-            <a:r>
-              <a:rPr lang="en-US" dirty="0"/>
-              <a:t>File level (</a:t>
-            </a:r>
-            <a:r>
-              <a:rPr lang="en-US" dirty="0" err="1"/>
-              <a:t>aufs</a:t>
-            </a:r>
-            <a:r>
-              <a:rPr lang="en-US" dirty="0"/>
-              <a:t>, overlay 2, …) vs. Block level (</a:t>
-            </a:r>
-            <a:r>
-              <a:rPr lang="en-US" dirty="0" err="1"/>
-              <a:t>brtfs</a:t>
-            </a:r>
-            <a:r>
-              <a:rPr lang="en-US" dirty="0"/>
-              <a:t>, </a:t>
-            </a:r>
-            <a:r>
-              <a:rPr lang="en-US" dirty="0" err="1"/>
-              <a:t>zfs</a:t>
-            </a:r>
-            <a:r>
-              <a:rPr lang="en-US" dirty="0"/>
-              <a:t>, …)</a:t>
-            </a:r>
-          </a:p>
-          <a:p>
-            <a:pPr marL="457200" lvl="1" indent="0">
-              <a:buNone/>
-            </a:pPr>
-            <a:endParaRPr lang="en-US" dirty="0"/>
-          </a:p>
-          <a:p>
-            <a:pPr marL="457200" lvl="1" indent="0">
-              <a:buNone/>
-            </a:pPr>
-            <a:endParaRPr lang="en-US" dirty="0"/>
-          </a:p>
-        </p:txBody>
-      </p:sp>
-      <p:sp>
-        <p:nvSpPr>
-          <p:cNvPr id="6" name="TextBox 5">
-            <a:extLst>
-              <a:ext uri="{FF2B5EF4-FFF2-40B4-BE49-F238E27FC236}">
-                <a16:creationId xmlns:a16="http://schemas.microsoft.com/office/drawing/2014/main" id="{E79A8967-62F7-41FF-BFCC-D4A78E6502F5}"/>
-              </a:ext>
-            </a:extLst>
-          </p:cNvPr>
-          <p:cNvSpPr txBox="1"/>
-          <p:nvPr/>
-        </p:nvSpPr>
-        <p:spPr>
-          <a:xfrm>
-            <a:off x="0" y="6488668"/>
-            <a:ext cx="4305670" cy="369332"/>
-          </a:xfrm>
-          <a:prstGeom prst="rect">
-            <a:avLst/>
-          </a:prstGeom>
-          <a:noFill/>
-        </p:spPr>
-        <p:txBody>
-          <a:bodyPr wrap="square" rtlCol="0">
-            <a:spAutoFit/>
-          </a:bodyPr>
-          <a:lstStyle/>
-          <a:p>
-            <a:r>
-              <a:rPr lang="en-US" i="1" dirty="0">
-                <a:solidFill>
-                  <a:schemeClr val="accent2">
-                    <a:lumMod val="75000"/>
-                  </a:schemeClr>
-                </a:solidFill>
-              </a:rPr>
-              <a:t>docker info</a:t>
-            </a:r>
-          </a:p>
-        </p:txBody>
-      </p:sp>
-    </p:spTree>
-    <p:extLst>
-      <p:ext uri="{BB962C8B-B14F-4D97-AF65-F5344CB8AC3E}">
-        <p14:creationId xmlns:p14="http://schemas.microsoft.com/office/powerpoint/2010/main" val="1018560530"/>
-      </p:ext>
-    </p:extLst>
-  </p:cSld>
-  <p:clrMapOvr>
-    <a:masterClrMapping/>
-  </p:clrMapOvr>
-</p:sld>
-</file>
-
-<file path=ppt/slides/slide15.xml><?xml version="1.0" encoding="utf-8"?>
-<p:sld xmlns:a="http://schemas.openxmlformats.org/drawingml/2006/main" xmlns:r="http://schemas.openxmlformats.org/officeDocument/2006/relationships" xmlns:p="http://schemas.openxmlformats.org/presentationml/2006/main">
-  <p:cSld>
-    <p:spTree>
-      <p:nvGrpSpPr>
-        <p:cNvPr id="1" name=""/>
-        <p:cNvGrpSpPr/>
-        <p:nvPr/>
-      </p:nvGrpSpPr>
-      <p:grpSpPr>
-        <a:xfrm>
-          <a:off x="0" y="0"/>
-          <a:ext cx="0" cy="0"/>
-          <a:chOff x="0" y="0"/>
-          <a:chExt cx="0" cy="0"/>
-        </a:xfrm>
-      </p:grpSpPr>
-      <p:sp>
-        <p:nvSpPr>
-          <p:cNvPr id="2" name="Title 1">
-            <a:extLst>
-              <a:ext uri="{FF2B5EF4-FFF2-40B4-BE49-F238E27FC236}">
-                <a16:creationId xmlns:a16="http://schemas.microsoft.com/office/drawing/2014/main" id="{E89F9279-F437-4036-A51B-F9F9F2853ADC}"/>
-              </a:ext>
-            </a:extLst>
-          </p:cNvPr>
-          <p:cNvSpPr>
-            <a:spLocks noGrp="1"/>
-          </p:cNvSpPr>
-          <p:nvPr>
-            <p:ph type="title"/>
-          </p:nvPr>
-        </p:nvSpPr>
-        <p:spPr/>
-        <p:txBody>
-          <a:bodyPr/>
-          <a:lstStyle/>
-          <a:p>
-            <a:r>
-              <a:rPr lang="en-US" dirty="0"/>
-              <a:t>Docker – Networking</a:t>
-            </a:r>
-          </a:p>
-        </p:txBody>
-      </p:sp>
-      <p:sp>
-        <p:nvSpPr>
-          <p:cNvPr id="3" name="Content Placeholder 2">
-            <a:extLst>
-              <a:ext uri="{FF2B5EF4-FFF2-40B4-BE49-F238E27FC236}">
-                <a16:creationId xmlns:a16="http://schemas.microsoft.com/office/drawing/2014/main" id="{E9BB5A2C-3CF7-4815-8D6B-8FAA55FC35EA}"/>
-              </a:ext>
-            </a:extLst>
-          </p:cNvPr>
-          <p:cNvSpPr>
-            <a:spLocks noGrp="1"/>
-          </p:cNvSpPr>
-          <p:nvPr>
-            <p:ph idx="1"/>
-          </p:nvPr>
-        </p:nvSpPr>
-        <p:spPr/>
-        <p:txBody>
-          <a:bodyPr/>
-          <a:lstStyle/>
-          <a:p>
-            <a:r>
-              <a:rPr lang="en-US" dirty="0"/>
-              <a:t>Network drivers</a:t>
-            </a:r>
-          </a:p>
-          <a:p>
-            <a:pPr lvl="1"/>
-            <a:r>
-              <a:rPr lang="en-US" dirty="0"/>
-              <a:t>bridge (default)</a:t>
-            </a:r>
-          </a:p>
-          <a:p>
-            <a:pPr lvl="1"/>
-            <a:r>
-              <a:rPr lang="en-US" dirty="0"/>
-              <a:t>overlay</a:t>
-            </a:r>
-          </a:p>
-          <a:p>
-            <a:pPr lvl="2"/>
-            <a:r>
-              <a:rPr lang="en-US" dirty="0"/>
-              <a:t>connect multiple docker daemons</a:t>
-            </a:r>
-          </a:p>
-          <a:p>
-            <a:pPr lvl="1"/>
-            <a:r>
-              <a:rPr lang="en-US" dirty="0"/>
-              <a:t>host</a:t>
-            </a:r>
-          </a:p>
-          <a:p>
-            <a:pPr lvl="2"/>
-            <a:r>
-              <a:rPr lang="en-US" dirty="0"/>
-              <a:t>for swarm services</a:t>
-            </a:r>
-          </a:p>
-          <a:p>
-            <a:pPr lvl="1"/>
-            <a:r>
-              <a:rPr lang="en-US" dirty="0" err="1"/>
-              <a:t>macvlan</a:t>
-            </a:r>
-            <a:endParaRPr lang="en-US" dirty="0"/>
-          </a:p>
-          <a:p>
-            <a:pPr lvl="2"/>
-            <a:r>
-              <a:rPr lang="en-US" dirty="0"/>
-              <a:t>container is assigned MAC address</a:t>
-            </a:r>
-          </a:p>
-          <a:p>
-            <a:pPr lvl="2"/>
-            <a:r>
-              <a:rPr lang="en-US" dirty="0"/>
-              <a:t>for legacy reasons</a:t>
-            </a:r>
-          </a:p>
-          <a:p>
-            <a:pPr lvl="1"/>
-            <a:r>
-              <a:rPr lang="en-US" dirty="0"/>
-              <a:t>none</a:t>
-            </a:r>
-          </a:p>
-          <a:p>
-            <a:pPr lvl="1"/>
-            <a:endParaRPr lang="en-US" dirty="0"/>
-          </a:p>
-        </p:txBody>
-      </p:sp>
-    </p:spTree>
-    <p:extLst>
-      <p:ext uri="{BB962C8B-B14F-4D97-AF65-F5344CB8AC3E}">
-        <p14:creationId xmlns:p14="http://schemas.microsoft.com/office/powerpoint/2010/main" val="625904788"/>
-      </p:ext>
-    </p:extLst>
-  </p:cSld>
-  <p:clrMapOvr>
-    <a:masterClrMapping/>
-  </p:clrMapOvr>
-</p:sld>
-</file>
-
-<file path=ppt/slides/slide16.xml><?xml version="1.0" encoding="utf-8"?>
-<p:sld xmlns:a="http://schemas.openxmlformats.org/drawingml/2006/main" xmlns:r="http://schemas.openxmlformats.org/officeDocument/2006/relationships" xmlns:p="http://schemas.openxmlformats.org/presentationml/2006/main">
-  <p:cSld>
-    <p:spTree>
-      <p:nvGrpSpPr>
-        <p:cNvPr id="1" name=""/>
-        <p:cNvGrpSpPr/>
-        <p:nvPr/>
-      </p:nvGrpSpPr>
-      <p:grpSpPr>
-        <a:xfrm>
-          <a:off x="0" y="0"/>
-          <a:ext cx="0" cy="0"/>
-          <a:chOff x="0" y="0"/>
-          <a:chExt cx="0" cy="0"/>
-        </a:xfrm>
-      </p:grpSpPr>
-      <p:sp>
-        <p:nvSpPr>
-          <p:cNvPr id="2" name="Title 1">
-            <a:extLst>
-              <a:ext uri="{FF2B5EF4-FFF2-40B4-BE49-F238E27FC236}">
-                <a16:creationId xmlns:a16="http://schemas.microsoft.com/office/drawing/2014/main" id="{BC3BA01F-AAE0-4BA1-9E4A-89D64DEC7B6A}"/>
-              </a:ext>
-            </a:extLst>
-          </p:cNvPr>
-          <p:cNvSpPr>
-            <a:spLocks noGrp="1"/>
-          </p:cNvSpPr>
-          <p:nvPr>
-            <p:ph type="title"/>
-          </p:nvPr>
-        </p:nvSpPr>
-        <p:spPr/>
-        <p:txBody>
-          <a:bodyPr/>
-          <a:lstStyle/>
-          <a:p>
-            <a:r>
-              <a:rPr lang="en-US" dirty="0"/>
-              <a:t>Bridge network</a:t>
-            </a:r>
-          </a:p>
-        </p:txBody>
-      </p:sp>
-      <p:sp>
-        <p:nvSpPr>
-          <p:cNvPr id="3" name="Content Placeholder 2">
-            <a:extLst>
-              <a:ext uri="{FF2B5EF4-FFF2-40B4-BE49-F238E27FC236}">
-                <a16:creationId xmlns:a16="http://schemas.microsoft.com/office/drawing/2014/main" id="{A35F4938-CA3E-4EF4-B8A3-CCAA14709FCF}"/>
-              </a:ext>
-            </a:extLst>
-          </p:cNvPr>
-          <p:cNvSpPr>
-            <a:spLocks noGrp="1"/>
-          </p:cNvSpPr>
-          <p:nvPr>
-            <p:ph idx="1"/>
-          </p:nvPr>
-        </p:nvSpPr>
-        <p:spPr/>
-        <p:txBody>
-          <a:bodyPr/>
-          <a:lstStyle/>
-          <a:p>
-            <a:r>
-              <a:rPr lang="en-US" dirty="0"/>
-              <a:t>communication between container on same docker daemon</a:t>
-            </a:r>
-          </a:p>
-          <a:p>
-            <a:r>
-              <a:rPr lang="en-US" dirty="0"/>
-              <a:t>default bridge network</a:t>
-            </a:r>
-          </a:p>
-          <a:p>
-            <a:pPr lvl="1"/>
-            <a:r>
-              <a:rPr lang="en-US" dirty="0"/>
-              <a:t>created automatically</a:t>
-            </a:r>
-          </a:p>
-          <a:p>
-            <a:pPr lvl="1"/>
-            <a:r>
-              <a:rPr lang="en-US" dirty="0"/>
-              <a:t>all container connect to it unless specified otherwise</a:t>
-            </a:r>
-          </a:p>
-          <a:p>
-            <a:pPr lvl="1"/>
-            <a:endParaRPr lang="en-US" dirty="0"/>
-          </a:p>
-          <a:p>
-            <a:r>
-              <a:rPr lang="en-US" dirty="0"/>
-              <a:t>User defined bridge networks</a:t>
-            </a:r>
-          </a:p>
-          <a:p>
-            <a:pPr lvl="1"/>
-            <a:r>
-              <a:rPr lang="en-US" dirty="0"/>
-              <a:t>Isolation (web front-end, database example)</a:t>
-            </a:r>
-          </a:p>
-          <a:p>
-            <a:pPr lvl="1"/>
-            <a:endParaRPr lang="en-US" dirty="0"/>
-          </a:p>
-        </p:txBody>
-      </p:sp>
-    </p:spTree>
-    <p:extLst>
-      <p:ext uri="{BB962C8B-B14F-4D97-AF65-F5344CB8AC3E}">
-        <p14:creationId xmlns:p14="http://schemas.microsoft.com/office/powerpoint/2010/main" val="765546256"/>
-      </p:ext>
-    </p:extLst>
-  </p:cSld>
-  <p:clrMapOvr>
-    <a:masterClrMapping/>
-  </p:clrMapOvr>
-</p:sld>
-</file>
-
 <file path=ppt/slides/slide17.xml><?xml version="1.0" encoding="utf-8"?>
 <p:sld xmlns:a="http://schemas.openxmlformats.org/drawingml/2006/main" xmlns:r="http://schemas.openxmlformats.org/officeDocument/2006/relationships" xmlns:p="http://schemas.openxmlformats.org/presentationml/2006/main">
   <p:cSld>
@@ -4548,7 +4445,7 @@
           <p:cNvPr id="2" name="Title 1">
             <a:extLst>
               <a:ext uri="{FF2B5EF4-FFF2-40B4-BE49-F238E27FC236}">
-                <a16:creationId xmlns:a16="http://schemas.microsoft.com/office/drawing/2014/main" id="{08164F56-94C2-49D0-9A26-CBAFAF8A5F53}"/>
+                <a16:creationId xmlns:a16="http://schemas.microsoft.com/office/drawing/2014/main" id="{4DA00555-4385-4FB6-AFB7-64E8E37A98D3}"/>
               </a:ext>
             </a:extLst>
           </p:cNvPr>
@@ -4566,7 +4463,7 @@
           <a:p>
             <a:r>
               <a:rPr lang="en-US" dirty="0"/>
-              <a:t>Docker networking</a:t>
+              <a:t>Docker - storage drivers</a:t>
             </a:r>
           </a:p>
         </p:txBody>
@@ -4576,7 +4473,7 @@
           <p:cNvPr id="3" name="Content Placeholder 2">
             <a:extLst>
               <a:ext uri="{FF2B5EF4-FFF2-40B4-BE49-F238E27FC236}">
-                <a16:creationId xmlns:a16="http://schemas.microsoft.com/office/drawing/2014/main" id="{53676A56-9A6B-458A-BBD3-A327BD173BC3}"/>
+                <a16:creationId xmlns:a16="http://schemas.microsoft.com/office/drawing/2014/main" id="{59D54D27-EC9C-4D9B-9467-EB646BB762F2}"/>
               </a:ext>
             </a:extLst>
           </p:cNvPr>
@@ -4596,54 +4493,173 @@
           <a:p>
             <a:r>
               <a:rPr lang="en-US" dirty="0"/>
-              <a:t>Containers have their own IPs (not accessible from outside)</a:t>
-            </a:r>
-          </a:p>
-          <a:p>
-            <a:r>
-              <a:rPr lang="en-US" dirty="0"/>
-              <a:t>Container MAC address is generated from its IP</a:t>
-            </a:r>
-          </a:p>
-          <a:p>
-            <a:r>
-              <a:rPr lang="en-US" dirty="0"/>
-              <a:t>DNS is the same as host uses</a:t>
-            </a:r>
-          </a:p>
-          <a:p>
-            <a:r>
-              <a:rPr lang="en-US" dirty="0"/>
-              <a:t>Docker host has IP (can be accessed from outside)</a:t>
-            </a:r>
-          </a:p>
-          <a:p>
+              <a:t>Control how images and containers are stored (important)</a:t>
+            </a:r>
+          </a:p>
+          <a:p>
+            <a:r>
+              <a:rPr lang="en-US" dirty="0"/>
+              <a:t>More than one is supported</a:t>
+            </a:r>
+          </a:p>
+          <a:p>
+            <a:r>
+              <a:rPr lang="en-US" dirty="0"/>
+              <a:t>overlay 2 , </a:t>
+            </a:r>
+            <a:r>
+              <a:rPr lang="en-US" dirty="0" err="1"/>
+              <a:t>aufs</a:t>
+            </a:r>
+            <a:r>
+              <a:rPr lang="en-US" dirty="0"/>
+              <a:t>, </a:t>
+            </a:r>
+            <a:r>
+              <a:rPr lang="en-US" dirty="0" err="1"/>
+              <a:t>devicemapper</a:t>
+            </a:r>
+            <a:r>
+              <a:rPr lang="en-US" dirty="0"/>
+              <a:t>, </a:t>
+            </a:r>
+            <a:r>
+              <a:rPr lang="en-US" dirty="0" err="1"/>
+              <a:t>vfs</a:t>
+            </a:r>
+            <a:r>
+              <a:rPr lang="en-US" dirty="0"/>
+              <a:t>, </a:t>
+            </a:r>
+            <a:r>
+              <a:rPr lang="en-US" dirty="0" err="1"/>
+              <a:t>zfs</a:t>
+            </a:r>
+            <a:r>
+              <a:rPr lang="en-US" dirty="0"/>
+              <a:t>, </a:t>
+            </a:r>
+            <a:r>
+              <a:rPr lang="en-US" dirty="0" err="1"/>
+              <a:t>brtfs</a:t>
+            </a:r>
+            <a:r>
+              <a:rPr lang="en-US" dirty="0"/>
+              <a:t> …</a:t>
+            </a:r>
+          </a:p>
+          <a:p>
+            <a:pPr lvl="1"/>
+            <a:r>
+              <a:rPr lang="en-US" dirty="0"/>
+              <a:t>Priority list – depend also on </a:t>
+            </a:r>
+            <a:r>
+              <a:rPr lang="en-US" dirty="0" err="1"/>
+              <a:t>linux</a:t>
+            </a:r>
+            <a:r>
+              <a:rPr lang="en-US" dirty="0"/>
+              <a:t> distribution (Ubuntu vs. Fedora)</a:t>
+            </a:r>
+          </a:p>
+          <a:p>
+            <a:pPr lvl="1"/>
+            <a:r>
+              <a:rPr lang="en-US" dirty="0"/>
+              <a:t>Can be modified (except for Windows and Mac)</a:t>
+            </a:r>
+          </a:p>
+          <a:p>
+            <a:pPr lvl="1"/>
+            <a:r>
+              <a:rPr lang="en-US" dirty="0"/>
+              <a:t>File level (</a:t>
+            </a:r>
+            <a:r>
+              <a:rPr lang="en-US" dirty="0" err="1"/>
+              <a:t>aufs</a:t>
+            </a:r>
+            <a:r>
+              <a:rPr lang="en-US" dirty="0"/>
+              <a:t>, overlay 2, …) vs. Block level (</a:t>
+            </a:r>
+            <a:r>
+              <a:rPr lang="en-US" dirty="0" err="1"/>
+              <a:t>brtfs</a:t>
+            </a:r>
+            <a:r>
+              <a:rPr lang="en-US" dirty="0"/>
+              <a:t>, </a:t>
+            </a:r>
+            <a:r>
+              <a:rPr lang="en-US" dirty="0" err="1"/>
+              <a:t>zfs</a:t>
+            </a:r>
+            <a:r>
+              <a:rPr lang="en-US" dirty="0"/>
+              <a:t>, …)</a:t>
+            </a:r>
+          </a:p>
+          <a:p>
+            <a:pPr marL="457200" lvl="1" indent="0">
+              <a:buNone/>
+            </a:pPr>
             <a:endParaRPr lang="en-US" dirty="0"/>
           </a:p>
           <a:p>
-            <a:r>
-              <a:rPr lang="en-US" dirty="0"/>
-              <a:t>Port binding (port forwarding)</a:t>
-            </a:r>
-          </a:p>
-          <a:p>
-            <a:pPr marL="0" indent="0">
+            <a:pPr marL="457200" lvl="1" indent="0">
               <a:buNone/>
             </a:pPr>
-            <a:r>
-              <a:rPr lang="en-US" dirty="0"/>
-              <a:t>- P option</a:t>
-            </a:r>
-          </a:p>
-          <a:p>
             <a:endParaRPr lang="en-US" dirty="0"/>
+          </a:p>
+        </p:txBody>
+      </p:sp>
+      <p:sp>
+        <p:nvSpPr>
+          <p:cNvPr id="6" name="TextBox 5">
+            <a:extLst>
+              <a:ext uri="{FF2B5EF4-FFF2-40B4-BE49-F238E27FC236}">
+                <a16:creationId xmlns:a16="http://schemas.microsoft.com/office/drawing/2014/main" id="{E79A8967-62F7-41FF-BFCC-D4A78E6502F5}"/>
+              </a:ext>
+            </a:extLst>
+          </p:cNvPr>
+          <p:cNvSpPr txBox="1"/>
+          <p:nvPr/>
+        </p:nvSpPr>
+        <p:spPr>
+          <a:xfrm>
+            <a:off x="0" y="6488668"/>
+            <a:ext cx="4305670" cy="369332"/>
+          </a:xfrm>
+          <a:prstGeom prst="rect">
+            <a:avLst/>
+          </a:prstGeom>
+          <a:noFill/>
+        </p:spPr>
+        <p:txBody>
+          <a:bodyPr wrap="square" rtlCol="0">
+            <a:spAutoFit/>
+          </a:bodyPr>
+          <a:lstStyle/>
+          <a:p>
+            <a:r>
+              <a:rPr lang="en-US" i="1" dirty="0">
+                <a:solidFill>
+                  <a:schemeClr val="accent2">
+                    <a:lumMod val="75000"/>
+                  </a:schemeClr>
+                </a:solidFill>
+              </a:rPr>
+              <a:t>docker info</a:t>
+            </a:r>
           </a:p>
         </p:txBody>
       </p:sp>
     </p:spTree>
     <p:extLst>
       <p:ext uri="{BB962C8B-B14F-4D97-AF65-F5344CB8AC3E}">
-        <p14:creationId xmlns:p14="http://schemas.microsoft.com/office/powerpoint/2010/main" val="2296211017"/>
+        <p14:creationId xmlns:p14="http://schemas.microsoft.com/office/powerpoint/2010/main" val="1018560530"/>
       </p:ext>
     </p:extLst>
   </p:cSld>
@@ -4675,7 +4691,7 @@
           <p:cNvPr id="2" name="Title 1">
             <a:extLst>
               <a:ext uri="{FF2B5EF4-FFF2-40B4-BE49-F238E27FC236}">
-                <a16:creationId xmlns:a16="http://schemas.microsoft.com/office/drawing/2014/main" id="{5CCF7BB9-FCCD-4590-8A50-ECC4E97B9632}"/>
+                <a16:creationId xmlns:a16="http://schemas.microsoft.com/office/drawing/2014/main" id="{E89F9279-F437-4036-A51B-F9F9F2853ADC}"/>
               </a:ext>
             </a:extLst>
           </p:cNvPr>
@@ -4693,7 +4709,7 @@
           <a:p>
             <a:r>
               <a:rPr lang="en-US" dirty="0"/>
-              <a:t>Swarm</a:t>
+              <a:t>Docker – Networking</a:t>
             </a:r>
           </a:p>
         </p:txBody>
@@ -4703,7 +4719,7 @@
           <p:cNvPr id="3" name="Content Placeholder 2">
             <a:extLst>
               <a:ext uri="{FF2B5EF4-FFF2-40B4-BE49-F238E27FC236}">
-                <a16:creationId xmlns:a16="http://schemas.microsoft.com/office/drawing/2014/main" id="{FCAE88A4-DA84-4C33-BA2F-2E035B09B324}"/>
+                <a16:creationId xmlns:a16="http://schemas.microsoft.com/office/drawing/2014/main" id="{E9BB5A2C-3CF7-4815-8D6B-8FAA55FC35EA}"/>
               </a:ext>
             </a:extLst>
           </p:cNvPr>
@@ -4721,15 +4737,83 @@
           <a:p>
             <a:r>
               <a:rPr lang="en-US" dirty="0"/>
-              <a:t>Cluster of docker engines</a:t>
-            </a:r>
+              <a:t>Network drivers</a:t>
+            </a:r>
+          </a:p>
+          <a:p>
+            <a:pPr lvl="1"/>
+            <a:r>
+              <a:rPr lang="en-US" dirty="0"/>
+              <a:t>bridge (default)</a:t>
+            </a:r>
+          </a:p>
+          <a:p>
+            <a:pPr lvl="1"/>
+            <a:r>
+              <a:rPr lang="en-US" dirty="0"/>
+              <a:t>overlay</a:t>
+            </a:r>
+          </a:p>
+          <a:p>
+            <a:pPr lvl="2"/>
+            <a:r>
+              <a:rPr lang="en-US" dirty="0"/>
+              <a:t>connect multiple docker daemons</a:t>
+            </a:r>
+          </a:p>
+          <a:p>
+            <a:pPr lvl="1"/>
+            <a:r>
+              <a:rPr lang="en-US" dirty="0"/>
+              <a:t>host</a:t>
+            </a:r>
+          </a:p>
+          <a:p>
+            <a:pPr lvl="2"/>
+            <a:r>
+              <a:rPr lang="en-US" dirty="0"/>
+              <a:t>for swarm services</a:t>
+            </a:r>
+          </a:p>
+          <a:p>
+            <a:pPr lvl="1"/>
+            <a:r>
+              <a:rPr lang="en-US" dirty="0" err="1"/>
+              <a:t>macvlan</a:t>
+            </a:r>
+            <a:endParaRPr lang="en-US" dirty="0"/>
+          </a:p>
+          <a:p>
+            <a:pPr lvl="2"/>
+            <a:r>
+              <a:rPr lang="en-US" dirty="0"/>
+              <a:t>container is assigned MAC address</a:t>
+            </a:r>
+          </a:p>
+          <a:p>
+            <a:pPr lvl="2"/>
+            <a:r>
+              <a:rPr lang="en-US" dirty="0"/>
+              <a:t>for legacy reasons</a:t>
+            </a:r>
+          </a:p>
+          <a:p>
+            <a:pPr lvl="1"/>
+            <a:r>
+              <a:rPr lang="en-US" dirty="0"/>
+              <a:t>none</a:t>
+            </a:r>
+          </a:p>
+          <a:p>
+            <a:pPr lvl="1"/>
+            <a:endParaRPr lang="en-US" dirty="0"/>
           </a:p>
         </p:txBody>
       </p:sp>
     </p:spTree>
     <p:extLst>
       <p:ext uri="{BB962C8B-B14F-4D97-AF65-F5344CB8AC3E}">
-        <p14:creationId xmlns:p14="http://schemas.microsoft.com/office/powerpoint/2010/main" val="3651795639"/>
+        <p14:creationId xmlns:p14="http://schemas.microsoft.com/office/powerpoint/2010/main" val="625904788"/>
       </p:ext>
     </p:extLst>
   </p:cSld>
@@ -4761,7 +4845,7 @@
           <p:cNvPr id="2" name="Title 1">
             <a:extLst>
               <a:ext uri="{FF2B5EF4-FFF2-40B4-BE49-F238E27FC236}">
-                <a16:creationId xmlns:a16="http://schemas.microsoft.com/office/drawing/2014/main" id="{483C5101-30B7-4B6D-A099-F4519FB24302}"/>
+                <a16:creationId xmlns:a16="http://schemas.microsoft.com/office/drawing/2014/main" id="{BC3BA01F-AAE0-4BA1-9E4A-89D64DEC7B6A}"/>
               </a:ext>
             </a:extLst>
           </p:cNvPr>
@@ -4779,7 +4863,7 @@
           <a:p>
             <a:r>
               <a:rPr lang="en-US" dirty="0"/>
-              <a:t>Docker commands</a:t>
+              <a:t>Bridge network</a:t>
             </a:r>
           </a:p>
         </p:txBody>
@@ -4789,7 +4873,7 @@
           <p:cNvPr id="3" name="Content Placeholder 2">
             <a:extLst>
               <a:ext uri="{FF2B5EF4-FFF2-40B4-BE49-F238E27FC236}">
-                <a16:creationId xmlns:a16="http://schemas.microsoft.com/office/drawing/2014/main" id="{CE7C328A-6CF9-4C4B-9C98-529A3D72D7E7}"/>
+                <a16:creationId xmlns:a16="http://schemas.microsoft.com/office/drawing/2014/main" id="{A35F4938-CA3E-4EF4-B8A3-CCAA14709FCF}"/>
               </a:ext>
             </a:extLst>
           </p:cNvPr>
@@ -4805,14 +4889,99 @@
           <a:bodyPr/>
           <a:lstStyle/>
           <a:p>
-            <a:endParaRPr lang="en-US"/>
+            <a:r>
+              <a:rPr lang="en-US" dirty="0"/>
+              <a:t>communication between containers on the same docker daemon</a:t>
+            </a:r>
+          </a:p>
+          <a:p>
+            <a:r>
+              <a:rPr lang="en-US" dirty="0"/>
+              <a:t>default bridge network</a:t>
+            </a:r>
+          </a:p>
+          <a:p>
+            <a:pPr lvl="1"/>
+            <a:r>
+              <a:rPr lang="en-US" dirty="0"/>
+              <a:t>created automatically</a:t>
+            </a:r>
+          </a:p>
+          <a:p>
+            <a:pPr lvl="1"/>
+            <a:r>
+              <a:rPr lang="en-US" dirty="0"/>
+              <a:t>all container connect to it unless specified otherwise</a:t>
+            </a:r>
+          </a:p>
+          <a:p>
+            <a:pPr lvl="1"/>
+            <a:endParaRPr lang="en-US" dirty="0"/>
+          </a:p>
+          <a:p>
+            <a:r>
+              <a:rPr lang="en-US" dirty="0"/>
+              <a:t>User defined bridge networks</a:t>
+            </a:r>
+          </a:p>
+          <a:p>
+            <a:pPr lvl="1"/>
+            <a:r>
+              <a:rPr lang="en-US" dirty="0"/>
+              <a:t>Isolation (web front-end, database example)</a:t>
+            </a:r>
+          </a:p>
+          <a:p>
+            <a:pPr lvl="1"/>
+            <a:endParaRPr lang="en-US" dirty="0"/>
+          </a:p>
+        </p:txBody>
+      </p:sp>
+      <p:sp>
+        <p:nvSpPr>
+          <p:cNvPr id="4" name="TextBox 3">
+            <a:extLst>
+              <a:ext uri="{FF2B5EF4-FFF2-40B4-BE49-F238E27FC236}">
+                <a16:creationId xmlns:a16="http://schemas.microsoft.com/office/drawing/2014/main" id="{1D1E5EA7-E3DB-49D7-900A-87C76C12636C}"/>
+              </a:ext>
+            </a:extLst>
+          </p:cNvPr>
+          <p:cNvSpPr txBox="1"/>
+          <p:nvPr/>
+        </p:nvSpPr>
+        <p:spPr>
+          <a:xfrm>
+            <a:off x="0" y="6488668"/>
+            <a:ext cx="12192000" cy="369332"/>
+          </a:xfrm>
+          <a:prstGeom prst="rect">
+            <a:avLst/>
+          </a:prstGeom>
+          <a:noFill/>
+        </p:spPr>
+        <p:txBody>
+          <a:bodyPr wrap="square" rtlCol="0">
+            <a:spAutoFit/>
+          </a:bodyPr>
+          <a:lstStyle/>
+          <a:p>
+            <a:r>
+              <a:rPr lang="en-US" i="1" dirty="0">
+                <a:solidFill>
+                  <a:schemeClr val="accent2">
+                    <a:lumMod val="75000"/>
+                  </a:schemeClr>
+                </a:solidFill>
+              </a:rPr>
+              <a:t>docker network ls; docker network inspect bridge</a:t>
+            </a:r>
           </a:p>
         </p:txBody>
       </p:sp>
     </p:spTree>
     <p:extLst>
       <p:ext uri="{BB962C8B-B14F-4D97-AF65-F5344CB8AC3E}">
-        <p14:creationId xmlns:p14="http://schemas.microsoft.com/office/powerpoint/2010/main" val="4128457706"/>
+        <p14:creationId xmlns:p14="http://schemas.microsoft.com/office/powerpoint/2010/main" val="765546256"/>
       </p:ext>
     </p:extLst>
   </p:cSld>
@@ -4885,12 +5054,20 @@
         </p:nvSpPr>
         <p:spPr/>
         <p:txBody>
-          <a:bodyPr/>
-          <a:lstStyle/>
-          <a:p>
-            <a:r>
-              <a:rPr lang="en-US" dirty="0"/>
-              <a:t>For hosting applications</a:t>
+          <a:bodyPr>
+            <a:normAutofit lnSpcReduction="10000"/>
+          </a:bodyPr>
+          <a:lstStyle/>
+          <a:p>
+            <a:r>
+              <a:rPr lang="en-US" dirty="0"/>
+              <a:t>For hosting applications </a:t>
+            </a:r>
+          </a:p>
+          <a:p>
+            <a:r>
+              <a:rPr lang="en-US" dirty="0"/>
+              <a:t>Isolated environments</a:t>
             </a:r>
           </a:p>
           <a:p>
@@ -4956,6 +5133,421 @@
     <p:extLst>
       <p:ext uri="{BB962C8B-B14F-4D97-AF65-F5344CB8AC3E}">
         <p14:creationId xmlns:p14="http://schemas.microsoft.com/office/powerpoint/2010/main" val="2580673948"/>
+      </p:ext>
+    </p:extLst>
+  </p:cSld>
+  <p:clrMapOvr>
+    <a:masterClrMapping/>
+  </p:clrMapOvr>
+</p:sld>
+</file>
+
+<file path=ppt/slides/slide20.xml><?xml version="1.0" encoding="utf-8"?>
+<p:sld xmlns:a="http://schemas.openxmlformats.org/drawingml/2006/main" xmlns:r="http://schemas.openxmlformats.org/officeDocument/2006/relationships" xmlns:p="http://schemas.openxmlformats.org/presentationml/2006/main">
+  <p:cSld>
+    <p:spTree>
+      <p:nvGrpSpPr>
+        <p:cNvPr id="1" name=""/>
+        <p:cNvGrpSpPr/>
+        <p:nvPr/>
+      </p:nvGrpSpPr>
+      <p:grpSpPr>
+        <a:xfrm>
+          <a:off x="0" y="0"/>
+          <a:ext cx="0" cy="0"/>
+          <a:chOff x="0" y="0"/>
+          <a:chExt cx="0" cy="0"/>
+        </a:xfrm>
+      </p:grpSpPr>
+      <p:sp>
+        <p:nvSpPr>
+          <p:cNvPr id="2" name="Title 1">
+            <a:extLst>
+              <a:ext uri="{FF2B5EF4-FFF2-40B4-BE49-F238E27FC236}">
+                <a16:creationId xmlns:a16="http://schemas.microsoft.com/office/drawing/2014/main" id="{464CA198-CBF7-407B-B8A2-CA003AD7CB41}"/>
+              </a:ext>
+            </a:extLst>
+          </p:cNvPr>
+          <p:cNvSpPr>
+            <a:spLocks noGrp="1"/>
+          </p:cNvSpPr>
+          <p:nvPr>
+            <p:ph type="title"/>
+          </p:nvPr>
+        </p:nvSpPr>
+        <p:spPr/>
+        <p:txBody>
+          <a:bodyPr/>
+          <a:lstStyle/>
+          <a:p>
+            <a:endParaRPr lang="en-US" dirty="0"/>
+          </a:p>
+        </p:txBody>
+      </p:sp>
+      <p:sp>
+        <p:nvSpPr>
+          <p:cNvPr id="3" name="Content Placeholder 2">
+            <a:extLst>
+              <a:ext uri="{FF2B5EF4-FFF2-40B4-BE49-F238E27FC236}">
+                <a16:creationId xmlns:a16="http://schemas.microsoft.com/office/drawing/2014/main" id="{C5FB6573-8C73-44D7-B5E6-65EBAF34FD85}"/>
+              </a:ext>
+            </a:extLst>
+          </p:cNvPr>
+          <p:cNvSpPr>
+            <a:spLocks noGrp="1"/>
+          </p:cNvSpPr>
+          <p:nvPr>
+            <p:ph idx="1"/>
+          </p:nvPr>
+        </p:nvSpPr>
+        <p:spPr/>
+        <p:txBody>
+          <a:bodyPr/>
+          <a:lstStyle/>
+          <a:p>
+            <a:pPr marL="0" indent="0">
+              <a:buNone/>
+            </a:pPr>
+            <a:endParaRPr lang="en-US" dirty="0"/>
+          </a:p>
+          <a:p>
+            <a:pPr marL="0" indent="0">
+              <a:buNone/>
+            </a:pPr>
+            <a:endParaRPr lang="en-US" dirty="0"/>
+          </a:p>
+          <a:p>
+            <a:pPr marL="0" indent="0">
+              <a:buNone/>
+            </a:pPr>
+            <a:endParaRPr lang="en-US" dirty="0"/>
+          </a:p>
+          <a:p>
+            <a:pPr marL="0" indent="0" algn="ctr">
+              <a:buNone/>
+            </a:pPr>
+            <a:r>
+              <a:rPr lang="en-US" sz="4800" dirty="0"/>
+              <a:t>MariaDB example</a:t>
+            </a:r>
+          </a:p>
+        </p:txBody>
+      </p:sp>
+    </p:spTree>
+    <p:extLst>
+      <p:ext uri="{BB962C8B-B14F-4D97-AF65-F5344CB8AC3E}">
+        <p14:creationId xmlns:p14="http://schemas.microsoft.com/office/powerpoint/2010/main" val="956687476"/>
+      </p:ext>
+    </p:extLst>
+  </p:cSld>
+  <p:clrMapOvr>
+    <a:masterClrMapping/>
+  </p:clrMapOvr>
+</p:sld>
+</file>
+
+<file path=ppt/slides/slide21.xml><?xml version="1.0" encoding="utf-8"?>
+<p:sld xmlns:a="http://schemas.openxmlformats.org/drawingml/2006/main" xmlns:r="http://schemas.openxmlformats.org/officeDocument/2006/relationships" xmlns:p="http://schemas.openxmlformats.org/presentationml/2006/main">
+  <p:cSld>
+    <p:spTree>
+      <p:nvGrpSpPr>
+        <p:cNvPr id="1" name=""/>
+        <p:cNvGrpSpPr/>
+        <p:nvPr/>
+      </p:nvGrpSpPr>
+      <p:grpSpPr>
+        <a:xfrm>
+          <a:off x="0" y="0"/>
+          <a:ext cx="0" cy="0"/>
+          <a:chOff x="0" y="0"/>
+          <a:chExt cx="0" cy="0"/>
+        </a:xfrm>
+      </p:grpSpPr>
+      <p:sp>
+        <p:nvSpPr>
+          <p:cNvPr id="2" name="Title 1">
+            <a:extLst>
+              <a:ext uri="{FF2B5EF4-FFF2-40B4-BE49-F238E27FC236}">
+                <a16:creationId xmlns:a16="http://schemas.microsoft.com/office/drawing/2014/main" id="{08164F56-94C2-49D0-9A26-CBAFAF8A5F53}"/>
+              </a:ext>
+            </a:extLst>
+          </p:cNvPr>
+          <p:cNvSpPr>
+            <a:spLocks noGrp="1"/>
+          </p:cNvSpPr>
+          <p:nvPr>
+            <p:ph type="title"/>
+          </p:nvPr>
+        </p:nvSpPr>
+        <p:spPr/>
+        <p:txBody>
+          <a:bodyPr/>
+          <a:lstStyle/>
+          <a:p>
+            <a:r>
+              <a:rPr lang="en-US" dirty="0"/>
+              <a:t>Docker networking</a:t>
+            </a:r>
+          </a:p>
+        </p:txBody>
+      </p:sp>
+      <p:sp>
+        <p:nvSpPr>
+          <p:cNvPr id="3" name="Content Placeholder 2">
+            <a:extLst>
+              <a:ext uri="{FF2B5EF4-FFF2-40B4-BE49-F238E27FC236}">
+                <a16:creationId xmlns:a16="http://schemas.microsoft.com/office/drawing/2014/main" id="{53676A56-9A6B-458A-BBD3-A327BD173BC3}"/>
+              </a:ext>
+            </a:extLst>
+          </p:cNvPr>
+          <p:cNvSpPr>
+            <a:spLocks noGrp="1"/>
+          </p:cNvSpPr>
+          <p:nvPr>
+            <p:ph idx="1"/>
+          </p:nvPr>
+        </p:nvSpPr>
+        <p:spPr/>
+        <p:txBody>
+          <a:bodyPr>
+            <a:normAutofit/>
+          </a:bodyPr>
+          <a:lstStyle/>
+          <a:p>
+            <a:r>
+              <a:rPr lang="en-US" dirty="0"/>
+              <a:t>Containers have their own IPs (not accessible from outside)</a:t>
+            </a:r>
+          </a:p>
+          <a:p>
+            <a:r>
+              <a:rPr lang="en-US" dirty="0"/>
+              <a:t>Container MAC address is generated from its IP</a:t>
+            </a:r>
+          </a:p>
+          <a:p>
+            <a:r>
+              <a:rPr lang="en-US" dirty="0"/>
+              <a:t>DNS is the same as host uses</a:t>
+            </a:r>
+          </a:p>
+          <a:p>
+            <a:r>
+              <a:rPr lang="en-US" dirty="0"/>
+              <a:t>Docker host has IP (can be accessed from outside)</a:t>
+            </a:r>
+          </a:p>
+          <a:p>
+            <a:endParaRPr lang="en-US" dirty="0"/>
+          </a:p>
+          <a:p>
+            <a:r>
+              <a:rPr lang="en-US" dirty="0"/>
+              <a:t>Port binding (port forwarding)</a:t>
+            </a:r>
+          </a:p>
+          <a:p>
+            <a:pPr marL="0" indent="0">
+              <a:buNone/>
+            </a:pPr>
+            <a:r>
+              <a:rPr lang="en-US" dirty="0"/>
+              <a:t>- P option</a:t>
+            </a:r>
+          </a:p>
+          <a:p>
+            <a:endParaRPr lang="en-US" dirty="0"/>
+          </a:p>
+        </p:txBody>
+      </p:sp>
+    </p:spTree>
+    <p:extLst>
+      <p:ext uri="{BB962C8B-B14F-4D97-AF65-F5344CB8AC3E}">
+        <p14:creationId xmlns:p14="http://schemas.microsoft.com/office/powerpoint/2010/main" val="2296211017"/>
+      </p:ext>
+    </p:extLst>
+  </p:cSld>
+  <p:clrMapOvr>
+    <a:masterClrMapping/>
+  </p:clrMapOvr>
+</p:sld>
+</file>
+
+<file path=ppt/slides/slide22.xml><?xml version="1.0" encoding="utf-8"?>
+<p:sld xmlns:a="http://schemas.openxmlformats.org/drawingml/2006/main" xmlns:r="http://schemas.openxmlformats.org/officeDocument/2006/relationships" xmlns:p="http://schemas.openxmlformats.org/presentationml/2006/main">
+  <p:cSld>
+    <p:spTree>
+      <p:nvGrpSpPr>
+        <p:cNvPr id="1" name=""/>
+        <p:cNvGrpSpPr/>
+        <p:nvPr/>
+      </p:nvGrpSpPr>
+      <p:grpSpPr>
+        <a:xfrm>
+          <a:off x="0" y="0"/>
+          <a:ext cx="0" cy="0"/>
+          <a:chOff x="0" y="0"/>
+          <a:chExt cx="0" cy="0"/>
+        </a:xfrm>
+      </p:grpSpPr>
+      <p:sp>
+        <p:nvSpPr>
+          <p:cNvPr id="2" name="Title 1">
+            <a:extLst>
+              <a:ext uri="{FF2B5EF4-FFF2-40B4-BE49-F238E27FC236}">
+                <a16:creationId xmlns:a16="http://schemas.microsoft.com/office/drawing/2014/main" id="{5CCF7BB9-FCCD-4590-8A50-ECC4E97B9632}"/>
+              </a:ext>
+            </a:extLst>
+          </p:cNvPr>
+          <p:cNvSpPr>
+            <a:spLocks noGrp="1"/>
+          </p:cNvSpPr>
+          <p:nvPr>
+            <p:ph type="title"/>
+          </p:nvPr>
+        </p:nvSpPr>
+        <p:spPr/>
+        <p:txBody>
+          <a:bodyPr/>
+          <a:lstStyle/>
+          <a:p>
+            <a:r>
+              <a:rPr lang="en-US" dirty="0"/>
+              <a:t>Swarm</a:t>
+            </a:r>
+          </a:p>
+        </p:txBody>
+      </p:sp>
+      <p:sp>
+        <p:nvSpPr>
+          <p:cNvPr id="3" name="Content Placeholder 2">
+            <a:extLst>
+              <a:ext uri="{FF2B5EF4-FFF2-40B4-BE49-F238E27FC236}">
+                <a16:creationId xmlns:a16="http://schemas.microsoft.com/office/drawing/2014/main" id="{FCAE88A4-DA84-4C33-BA2F-2E035B09B324}"/>
+              </a:ext>
+            </a:extLst>
+          </p:cNvPr>
+          <p:cNvSpPr>
+            <a:spLocks noGrp="1"/>
+          </p:cNvSpPr>
+          <p:nvPr>
+            <p:ph idx="1"/>
+          </p:nvPr>
+        </p:nvSpPr>
+        <p:spPr/>
+        <p:txBody>
+          <a:bodyPr/>
+          <a:lstStyle/>
+          <a:p>
+            <a:r>
+              <a:rPr lang="en-US" dirty="0"/>
+              <a:t>Cluster of docker engines</a:t>
+            </a:r>
+          </a:p>
+        </p:txBody>
+      </p:sp>
+    </p:spTree>
+    <p:extLst>
+      <p:ext uri="{BB962C8B-B14F-4D97-AF65-F5344CB8AC3E}">
+        <p14:creationId xmlns:p14="http://schemas.microsoft.com/office/powerpoint/2010/main" val="3651795639"/>
+      </p:ext>
+    </p:extLst>
+  </p:cSld>
+  <p:clrMapOvr>
+    <a:masterClrMapping/>
+  </p:clrMapOvr>
+</p:sld>
+</file>
+
+<file path=ppt/slides/slide23.xml><?xml version="1.0" encoding="utf-8"?>
+<p:sld xmlns:a="http://schemas.openxmlformats.org/drawingml/2006/main" xmlns:r="http://schemas.openxmlformats.org/officeDocument/2006/relationships" xmlns:p="http://schemas.openxmlformats.org/presentationml/2006/main">
+  <p:cSld>
+    <p:spTree>
+      <p:nvGrpSpPr>
+        <p:cNvPr id="1" name=""/>
+        <p:cNvGrpSpPr/>
+        <p:nvPr/>
+      </p:nvGrpSpPr>
+      <p:grpSpPr>
+        <a:xfrm>
+          <a:off x="0" y="0"/>
+          <a:ext cx="0" cy="0"/>
+          <a:chOff x="0" y="0"/>
+          <a:chExt cx="0" cy="0"/>
+        </a:xfrm>
+      </p:grpSpPr>
+      <p:sp>
+        <p:nvSpPr>
+          <p:cNvPr id="2" name="Title 1">
+            <a:extLst>
+              <a:ext uri="{FF2B5EF4-FFF2-40B4-BE49-F238E27FC236}">
+                <a16:creationId xmlns:a16="http://schemas.microsoft.com/office/drawing/2014/main" id="{483C5101-30B7-4B6D-A099-F4519FB24302}"/>
+              </a:ext>
+            </a:extLst>
+          </p:cNvPr>
+          <p:cNvSpPr>
+            <a:spLocks noGrp="1"/>
+          </p:cNvSpPr>
+          <p:nvPr>
+            <p:ph type="title"/>
+          </p:nvPr>
+        </p:nvSpPr>
+        <p:spPr/>
+        <p:txBody>
+          <a:bodyPr/>
+          <a:lstStyle/>
+          <a:p>
+            <a:r>
+              <a:rPr lang="en-US" dirty="0"/>
+              <a:t>Docker commands</a:t>
+            </a:r>
+          </a:p>
+        </p:txBody>
+      </p:sp>
+      <p:sp>
+        <p:nvSpPr>
+          <p:cNvPr id="3" name="Content Placeholder 2">
+            <a:extLst>
+              <a:ext uri="{FF2B5EF4-FFF2-40B4-BE49-F238E27FC236}">
+                <a16:creationId xmlns:a16="http://schemas.microsoft.com/office/drawing/2014/main" id="{CE7C328A-6CF9-4C4B-9C98-529A3D72D7E7}"/>
+              </a:ext>
+            </a:extLst>
+          </p:cNvPr>
+          <p:cNvSpPr>
+            <a:spLocks noGrp="1"/>
+          </p:cNvSpPr>
+          <p:nvPr>
+            <p:ph idx="1"/>
+          </p:nvPr>
+        </p:nvSpPr>
+        <p:spPr/>
+        <p:txBody>
+          <a:bodyPr/>
+          <a:lstStyle/>
+          <a:p>
+            <a:r>
+              <a:rPr lang="en-US" dirty="0"/>
+              <a:t>docker exec</a:t>
+            </a:r>
+          </a:p>
+          <a:p>
+            <a:r>
+              <a:rPr lang="en-US" dirty="0"/>
+              <a:t>docker attach</a:t>
+            </a:r>
+          </a:p>
+          <a:p>
+            <a:r>
+              <a:rPr lang="en-US" dirty="0"/>
+              <a:t>docker commit</a:t>
+            </a:r>
+          </a:p>
+        </p:txBody>
+      </p:sp>
+    </p:spTree>
+    <p:extLst>
+      <p:ext uri="{BB962C8B-B14F-4D97-AF65-F5344CB8AC3E}">
+        <p14:creationId xmlns:p14="http://schemas.microsoft.com/office/powerpoint/2010/main" val="4128457706"/>
       </p:ext>
     </p:extLst>
   </p:cSld>
@@ -5719,7 +6311,7 @@
           <p:cNvPr id="2" name="Title 1">
             <a:extLst>
               <a:ext uri="{FF2B5EF4-FFF2-40B4-BE49-F238E27FC236}">
-                <a16:creationId xmlns:a16="http://schemas.microsoft.com/office/drawing/2014/main" id="{FDDEB9F3-461B-4265-9B1D-4037824C205C}"/>
+                <a16:creationId xmlns:a16="http://schemas.microsoft.com/office/drawing/2014/main" id="{464CA198-CBF7-407B-B8A2-CA003AD7CB41}"/>
               </a:ext>
             </a:extLst>
           </p:cNvPr>
@@ -5735,10 +6327,6 @@
           <a:bodyPr/>
           <a:lstStyle/>
           <a:p>
-            <a:r>
-              <a:rPr lang="en-US" dirty="0" err="1"/>
-              <a:t>Dockerfile</a:t>
-            </a:r>
             <a:endParaRPr lang="en-US" dirty="0"/>
           </a:p>
         </p:txBody>
@@ -5748,7 +6336,7 @@
           <p:cNvPr id="3" name="Content Placeholder 2">
             <a:extLst>
               <a:ext uri="{FF2B5EF4-FFF2-40B4-BE49-F238E27FC236}">
-                <a16:creationId xmlns:a16="http://schemas.microsoft.com/office/drawing/2014/main" id="{C801C1B4-72B6-4993-AAF4-ED9C27918B8B}"/>
+                <a16:creationId xmlns:a16="http://schemas.microsoft.com/office/drawing/2014/main" id="{C5FB6573-8C73-44D7-B5E6-65EBAF34FD85}"/>
               </a:ext>
             </a:extLst>
           </p:cNvPr>
@@ -5764,60 +6352,159 @@
           <a:bodyPr/>
           <a:lstStyle/>
           <a:p>
-            <a:r>
-              <a:rPr lang="en-US" dirty="0"/>
-              <a:t>Instructions how to build docker image</a:t>
-            </a:r>
-          </a:p>
-          <a:p>
-            <a:r>
-              <a:rPr lang="en-US" dirty="0"/>
-              <a:t>Parent image</a:t>
-            </a:r>
-          </a:p>
-          <a:p>
-            <a:pPr lvl="1"/>
-            <a:r>
-              <a:rPr lang="en-US" dirty="0"/>
-              <a:t>Common starting point (.NET core, Ubuntu, database)</a:t>
-            </a:r>
-          </a:p>
-          <a:p>
-            <a:pPr lvl="1"/>
-            <a:r>
-              <a:rPr lang="en-US" dirty="0"/>
-              <a:t>FROM is always first instruction</a:t>
-            </a:r>
-          </a:p>
-          <a:p>
-            <a:r>
-              <a:rPr lang="en-US" dirty="0"/>
-              <a:t>Base image</a:t>
-            </a:r>
-          </a:p>
-          <a:p>
-            <a:pPr lvl="1"/>
-            <a:r>
-              <a:rPr lang="en-US" dirty="0"/>
-              <a:t>scratch (minimal image)</a:t>
-            </a:r>
-          </a:p>
-          <a:p>
-            <a:pPr lvl="1"/>
-            <a:r>
-              <a:rPr lang="en-US" dirty="0"/>
-              <a:t>no FROM or FROM scratch</a:t>
-            </a:r>
-          </a:p>
-          <a:p>
+            <a:pPr marL="0" indent="0">
+              <a:buNone/>
+            </a:pPr>
             <a:endParaRPr lang="en-US" dirty="0"/>
+          </a:p>
+          <a:p>
+            <a:pPr marL="0" indent="0">
+              <a:buNone/>
+            </a:pPr>
+            <a:endParaRPr lang="en-US" dirty="0"/>
+          </a:p>
+          <a:p>
+            <a:pPr marL="0" indent="0">
+              <a:buNone/>
+            </a:pPr>
+            <a:endParaRPr lang="en-US" dirty="0"/>
+          </a:p>
+          <a:p>
+            <a:pPr marL="0" indent="0" algn="ctr">
+              <a:buNone/>
+            </a:pPr>
+            <a:r>
+              <a:rPr lang="en-US" sz="4800" dirty="0"/>
+              <a:t>MariaDB example</a:t>
+            </a:r>
+          </a:p>
+        </p:txBody>
+      </p:sp>
+      <p:sp>
+        <p:nvSpPr>
+          <p:cNvPr id="4" name="TextBox 3">
+            <a:extLst>
+              <a:ext uri="{FF2B5EF4-FFF2-40B4-BE49-F238E27FC236}">
+                <a16:creationId xmlns:a16="http://schemas.microsoft.com/office/drawing/2014/main" id="{7A6F8156-3B86-422D-8C6F-DE4F8DDFCBFD}"/>
+              </a:ext>
+            </a:extLst>
+          </p:cNvPr>
+          <p:cNvSpPr txBox="1"/>
+          <p:nvPr/>
+        </p:nvSpPr>
+        <p:spPr>
+          <a:xfrm>
+            <a:off x="0" y="5103674"/>
+            <a:ext cx="9118833" cy="1754326"/>
+          </a:xfrm>
+          <a:prstGeom prst="rect">
+            <a:avLst/>
+          </a:prstGeom>
+          <a:noFill/>
+        </p:spPr>
+        <p:txBody>
+          <a:bodyPr wrap="square" rtlCol="0">
+            <a:spAutoFit/>
+          </a:bodyPr>
+          <a:lstStyle/>
+          <a:p>
+            <a:r>
+              <a:rPr lang="en-US" i="1" dirty="0">
+                <a:solidFill>
+                  <a:schemeClr val="accent2">
+                    <a:lumMod val="75000"/>
+                  </a:schemeClr>
+                </a:solidFill>
+              </a:rPr>
+              <a:t>docker pull</a:t>
+            </a:r>
+          </a:p>
+          <a:p>
+            <a:r>
+              <a:rPr lang="en-US" i="1" dirty="0">
+                <a:solidFill>
+                  <a:schemeClr val="accent2">
+                    <a:lumMod val="75000"/>
+                  </a:schemeClr>
+                </a:solidFill>
+              </a:rPr>
+              <a:t>docker images</a:t>
+            </a:r>
+          </a:p>
+          <a:p>
+            <a:r>
+              <a:rPr lang="en-US" i="1" dirty="0">
+                <a:solidFill>
+                  <a:schemeClr val="accent2">
+                    <a:lumMod val="75000"/>
+                  </a:schemeClr>
+                </a:solidFill>
+              </a:rPr>
+              <a:t>docker </a:t>
+            </a:r>
+            <a:r>
+              <a:rPr lang="en-US" i="1" dirty="0" err="1">
+                <a:solidFill>
+                  <a:schemeClr val="accent2">
+                    <a:lumMod val="75000"/>
+                  </a:schemeClr>
+                </a:solidFill>
+              </a:rPr>
+              <a:t>ps</a:t>
+            </a:r>
+            <a:r>
+              <a:rPr lang="en-US" i="1" dirty="0">
+                <a:solidFill>
+                  <a:schemeClr val="accent2">
+                    <a:lumMod val="75000"/>
+                  </a:schemeClr>
+                </a:solidFill>
+              </a:rPr>
+              <a:t> (-a)</a:t>
+            </a:r>
+          </a:p>
+          <a:p>
+            <a:r>
+              <a:rPr lang="en-US" i="1" dirty="0">
+                <a:solidFill>
+                  <a:schemeClr val="accent2">
+                    <a:lumMod val="75000"/>
+                  </a:schemeClr>
+                </a:solidFill>
+              </a:rPr>
+              <a:t>docker start</a:t>
+            </a:r>
+          </a:p>
+          <a:p>
+            <a:r>
+              <a:rPr lang="en-US" i="1" dirty="0">
+                <a:solidFill>
+                  <a:schemeClr val="accent2">
+                    <a:lumMod val="75000"/>
+                  </a:schemeClr>
+                </a:solidFill>
+              </a:rPr>
+              <a:t>docker run</a:t>
+            </a:r>
+          </a:p>
+          <a:p>
+            <a:r>
+              <a:rPr lang="en-US" i="1" dirty="0">
+                <a:solidFill>
+                  <a:schemeClr val="accent2">
+                    <a:lumMod val="75000"/>
+                  </a:schemeClr>
+                </a:solidFill>
+              </a:rPr>
+              <a:t>docker stop</a:t>
+            </a:r>
           </a:p>
         </p:txBody>
       </p:sp>
     </p:spTree>
     <p:extLst>
       <p:ext uri="{BB962C8B-B14F-4D97-AF65-F5344CB8AC3E}">
-        <p14:creationId xmlns:p14="http://schemas.microsoft.com/office/powerpoint/2010/main" val="956415270"/>
+        <p14:creationId xmlns:p14="http://schemas.microsoft.com/office/powerpoint/2010/main" val="1291629624"/>
       </p:ext>
     </p:extLst>
   </p:cSld>
@@ -5849,7 +6536,7 @@
           <p:cNvPr id="2" name="Title 1">
             <a:extLst>
               <a:ext uri="{FF2B5EF4-FFF2-40B4-BE49-F238E27FC236}">
-                <a16:creationId xmlns:a16="http://schemas.microsoft.com/office/drawing/2014/main" id="{BB21D77D-4C3A-4B66-84CE-9B062D14A330}"/>
+                <a16:creationId xmlns:a16="http://schemas.microsoft.com/office/drawing/2014/main" id="{FDDEB9F3-461B-4265-9B1D-4037824C205C}"/>
               </a:ext>
             </a:extLst>
           </p:cNvPr>
@@ -5866,9 +6553,10 @@
           <a:lstStyle/>
           <a:p>
             <a:r>
-              <a:rPr lang="en-US" dirty="0"/>
-              <a:t>docker-compose</a:t>
-            </a:r>
+              <a:rPr lang="en-US" dirty="0" err="1"/>
+              <a:t>Dockerfile</a:t>
+            </a:r>
+            <a:endParaRPr lang="en-US" dirty="0"/>
           </a:p>
         </p:txBody>
       </p:sp>
@@ -5877,7 +6565,7 @@
           <p:cNvPr id="3" name="Content Placeholder 2">
             <a:extLst>
               <a:ext uri="{FF2B5EF4-FFF2-40B4-BE49-F238E27FC236}">
-                <a16:creationId xmlns:a16="http://schemas.microsoft.com/office/drawing/2014/main" id="{E533342D-28AE-48F1-92F9-DB97BE6F87FE}"/>
+                <a16:creationId xmlns:a16="http://schemas.microsoft.com/office/drawing/2014/main" id="{C801C1B4-72B6-4993-AAF4-ED9C27918B8B}"/>
               </a:ext>
             </a:extLst>
           </p:cNvPr>
@@ -5895,35 +6583,64 @@
           <a:p>
             <a:r>
               <a:rPr lang="en-US" dirty="0"/>
-              <a:t>define and run multi-container Docker applications</a:t>
-            </a:r>
-          </a:p>
-          <a:p>
-            <a:r>
-              <a:rPr lang="en-US" dirty="0"/>
-              <a:t>yam configuration</a:t>
+              <a:t>Instructions how to build docker image</a:t>
+            </a:r>
+          </a:p>
+          <a:p>
+            <a:r>
+              <a:rPr lang="en-US" dirty="0"/>
+              <a:t>Parent image</a:t>
             </a:r>
           </a:p>
           <a:p>
             <a:pPr lvl="1"/>
             <a:r>
               <a:rPr lang="en-US" dirty="0"/>
-              <a:t>list of services</a:t>
+              <a:t>Common starting point (.NET core, Ubuntu, database)</a:t>
             </a:r>
           </a:p>
           <a:p>
             <a:pPr lvl="1"/>
             <a:r>
               <a:rPr lang="en-US" dirty="0"/>
-              <a:t>configuration how to build images for these services (can contain path to service docker file)</a:t>
-            </a:r>
+              <a:t>FROM is always first instruction</a:t>
+            </a:r>
+          </a:p>
+          <a:p>
+            <a:r>
+              <a:rPr lang="en-US" dirty="0"/>
+              <a:t>Base image</a:t>
+            </a:r>
+          </a:p>
+          <a:p>
+            <a:pPr lvl="1"/>
+            <a:r>
+              <a:rPr lang="en-US" dirty="0"/>
+              <a:t>scratch (minimal image)</a:t>
+            </a:r>
+          </a:p>
+          <a:p>
+            <a:pPr lvl="1"/>
+            <a:r>
+              <a:rPr lang="en-US" dirty="0"/>
+              <a:t>no FROM or FROM scratch</a:t>
+            </a:r>
+          </a:p>
+          <a:p>
+            <a:r>
+              <a:rPr lang="en-US" dirty="0"/>
+              <a:t>Build context</a:t>
+            </a:r>
+          </a:p>
+          <a:p>
+            <a:endParaRPr lang="en-US" dirty="0"/>
           </a:p>
         </p:txBody>
       </p:sp>
     </p:spTree>
     <p:extLst>
       <p:ext uri="{BB962C8B-B14F-4D97-AF65-F5344CB8AC3E}">
-        <p14:creationId xmlns:p14="http://schemas.microsoft.com/office/powerpoint/2010/main" val="3540793809"/>
+        <p14:creationId xmlns:p14="http://schemas.microsoft.com/office/powerpoint/2010/main" val="956415270"/>
       </p:ext>
     </p:extLst>
   </p:cSld>

</xml_diff>

<commit_message>
Updated docker intro presentation
</commit_message>
<xml_diff>
--- a/src/_data/docker.pptx
+++ b/src/_data/docker.pptx
@@ -26,8 +26,8 @@
     <p:sldId id="274" r:id="rId20"/>
     <p:sldId id="280" r:id="rId21"/>
     <p:sldId id="275" r:id="rId22"/>
-    <p:sldId id="270" r:id="rId23"/>
-    <p:sldId id="259" r:id="rId24"/>
+    <p:sldId id="259" r:id="rId23"/>
+    <p:sldId id="270" r:id="rId24"/>
   </p:sldIdLst>
   <p:sldSz cx="12192000" cy="6858000"/>
   <p:notesSz cx="6858000" cy="9144000"/>
@@ -4041,7 +4041,7 @@
           <a:p>
             <a:r>
               <a:rPr lang="en-US" dirty="0"/>
-              <a:t>Place for writing data</a:t>
+              <a:t>Recommended storage for writing data</a:t>
             </a:r>
           </a:p>
           <a:p>
@@ -4059,68 +4059,34 @@
           <a:p>
             <a:r>
               <a:rPr lang="en-US" dirty="0"/>
-              <a:t>management through Docker CLI</a:t>
-            </a:r>
-          </a:p>
-        </p:txBody>
-      </p:sp>
-      <p:sp>
-        <p:nvSpPr>
-          <p:cNvPr id="4" name="TextBox 3">
-            <a:extLst>
-              <a:ext uri="{FF2B5EF4-FFF2-40B4-BE49-F238E27FC236}">
-                <a16:creationId xmlns:a16="http://schemas.microsoft.com/office/drawing/2014/main" id="{68A0C521-0AF4-4866-B941-1D182D7AE9D8}"/>
-              </a:ext>
-            </a:extLst>
-          </p:cNvPr>
-          <p:cNvSpPr txBox="1"/>
-          <p:nvPr/>
-        </p:nvSpPr>
-        <p:spPr>
-          <a:xfrm>
-            <a:off x="-1" y="6488668"/>
-            <a:ext cx="9118833" cy="369332"/>
-          </a:xfrm>
-          <a:prstGeom prst="rect">
-            <a:avLst/>
-          </a:prstGeom>
-          <a:noFill/>
-        </p:spPr>
-        <p:txBody>
-          <a:bodyPr wrap="square" rtlCol="0">
-            <a:spAutoFit/>
-          </a:bodyPr>
-          <a:lstStyle/>
-          <a:p>
-            <a:r>
-              <a:rPr lang="en-US" i="1" dirty="0">
-                <a:solidFill>
-                  <a:schemeClr val="accent2">
-                    <a:lumMod val="75000"/>
-                  </a:schemeClr>
-                </a:solidFill>
-              </a:rPr>
-              <a:t>-mount source=</a:t>
-            </a:r>
-            <a:r>
-              <a:rPr lang="en-US" i="1" dirty="0" err="1">
-                <a:solidFill>
-                  <a:schemeClr val="accent2">
-                    <a:lumMod val="75000"/>
-                  </a:schemeClr>
-                </a:solidFill>
-              </a:rPr>
-              <a:t>volume_name,target</a:t>
-            </a:r>
-            <a:r>
-              <a:rPr lang="en-US" i="1" dirty="0">
-                <a:solidFill>
-                  <a:schemeClr val="accent2">
-                    <a:lumMod val="75000"/>
-                  </a:schemeClr>
-                </a:solidFill>
-              </a:rPr>
-              <a:t>=/app</a:t>
+              <a:t>Management through Docker CLI</a:t>
+            </a:r>
+          </a:p>
+          <a:p>
+            <a:r>
+              <a:rPr lang="en-US" dirty="0"/>
+              <a:t>Usages</a:t>
+            </a:r>
+          </a:p>
+          <a:p>
+            <a:pPr lvl="1"/>
+            <a:r>
+              <a:rPr lang="en-US" dirty="0"/>
+              <a:t>environment variables</a:t>
+            </a:r>
+          </a:p>
+          <a:p>
+            <a:pPr lvl="1"/>
+            <a:r>
+              <a:rPr lang="en-US" dirty="0"/>
+              <a:t>database</a:t>
+            </a:r>
+          </a:p>
+          <a:p>
+            <a:pPr lvl="1"/>
+            <a:r>
+              <a:rPr lang="en-US" dirty="0"/>
+              <a:t>…</a:t>
             </a:r>
           </a:p>
         </p:txBody>
@@ -4615,47 +4581,6 @@
           </a:p>
         </p:txBody>
       </p:sp>
-      <p:sp>
-        <p:nvSpPr>
-          <p:cNvPr id="6" name="TextBox 5">
-            <a:extLst>
-              <a:ext uri="{FF2B5EF4-FFF2-40B4-BE49-F238E27FC236}">
-                <a16:creationId xmlns:a16="http://schemas.microsoft.com/office/drawing/2014/main" id="{E79A8967-62F7-41FF-BFCC-D4A78E6502F5}"/>
-              </a:ext>
-            </a:extLst>
-          </p:cNvPr>
-          <p:cNvSpPr txBox="1"/>
-          <p:nvPr/>
-        </p:nvSpPr>
-        <p:spPr>
-          <a:xfrm>
-            <a:off x="0" y="6488668"/>
-            <a:ext cx="4305670" cy="369332"/>
-          </a:xfrm>
-          <a:prstGeom prst="rect">
-            <a:avLst/>
-          </a:prstGeom>
-          <a:noFill/>
-        </p:spPr>
-        <p:txBody>
-          <a:bodyPr wrap="square" rtlCol="0">
-            <a:spAutoFit/>
-          </a:bodyPr>
-          <a:lstStyle/>
-          <a:p>
-            <a:r>
-              <a:rPr lang="en-US" i="1" dirty="0">
-                <a:solidFill>
-                  <a:schemeClr val="accent2">
-                    <a:lumMod val="75000"/>
-                  </a:schemeClr>
-                </a:solidFill>
-              </a:rPr>
-              <a:t>docker info</a:t>
-            </a:r>
-          </a:p>
-        </p:txBody>
-      </p:sp>
     </p:spTree>
     <p:extLst>
       <p:ext uri="{BB962C8B-B14F-4D97-AF65-F5344CB8AC3E}">
@@ -4904,14 +4829,14 @@
             <a:pPr lvl="1"/>
             <a:r>
               <a:rPr lang="en-US" dirty="0"/>
-              <a:t>created automatically</a:t>
+              <a:t>created automatically (all container connect to it unless specified otherwise)</a:t>
             </a:r>
           </a:p>
           <a:p>
             <a:pPr lvl="1"/>
             <a:r>
               <a:rPr lang="en-US" dirty="0"/>
-              <a:t>all container connect to it unless specified otherwise</a:t>
+              <a:t>Communication via IP address</a:t>
             </a:r>
           </a:p>
           <a:p>
@@ -4928,52 +4853,36 @@
             <a:pPr lvl="1"/>
             <a:r>
               <a:rPr lang="en-US" dirty="0"/>
-              <a:t>Isolation (web front-end, database example)</a:t>
+              <a:t>containers expose all ports to each other</a:t>
             </a:r>
           </a:p>
           <a:p>
             <a:pPr lvl="1"/>
-            <a:endParaRPr lang="en-US" dirty="0"/>
-          </a:p>
-        </p:txBody>
-      </p:sp>
-      <p:sp>
-        <p:nvSpPr>
-          <p:cNvPr id="4" name="TextBox 3">
-            <a:extLst>
-              <a:ext uri="{FF2B5EF4-FFF2-40B4-BE49-F238E27FC236}">
-                <a16:creationId xmlns:a16="http://schemas.microsoft.com/office/drawing/2014/main" id="{1D1E5EA7-E3DB-49D7-900A-87C76C12636C}"/>
-              </a:ext>
-            </a:extLst>
-          </p:cNvPr>
-          <p:cNvSpPr txBox="1"/>
-          <p:nvPr/>
-        </p:nvSpPr>
-        <p:spPr>
-          <a:xfrm>
-            <a:off x="0" y="6488668"/>
-            <a:ext cx="12192000" cy="369332"/>
-          </a:xfrm>
-          <a:prstGeom prst="rect">
-            <a:avLst/>
-          </a:prstGeom>
-          <a:noFill/>
-        </p:spPr>
-        <p:txBody>
-          <a:bodyPr wrap="square" rtlCol="0">
-            <a:spAutoFit/>
-          </a:bodyPr>
-          <a:lstStyle/>
-          <a:p>
-            <a:r>
-              <a:rPr lang="en-US" i="1" dirty="0">
-                <a:solidFill>
-                  <a:schemeClr val="accent2">
-                    <a:lumMod val="75000"/>
-                  </a:schemeClr>
-                </a:solidFill>
-              </a:rPr>
-              <a:t>docker network ls; docker network inspect bridge</a:t>
+            <a:r>
+              <a:rPr lang="en-US" dirty="0"/>
+              <a:t>no ports are exposed to the outside world</a:t>
+            </a:r>
+          </a:p>
+          <a:p>
+            <a:pPr lvl="1"/>
+            <a:r>
+              <a:rPr lang="en-US" dirty="0"/>
+              <a:t>communication via </a:t>
+            </a:r>
+            <a:r>
+              <a:rPr lang="en-US" dirty="0" err="1"/>
+              <a:t>cotainer</a:t>
+            </a:r>
+            <a:r>
+              <a:rPr lang="en-US" dirty="0"/>
+              <a:t> name</a:t>
+            </a:r>
+          </a:p>
+          <a:p>
+            <a:pPr lvl="1"/>
+            <a:r>
+              <a:rPr lang="en-US" dirty="0"/>
+              <a:t>can connect/disconnect on fly</a:t>
             </a:r>
           </a:p>
         </p:txBody>
@@ -5233,6 +5142,115 @@
           </a:p>
         </p:txBody>
       </p:sp>
+      <p:sp>
+        <p:nvSpPr>
+          <p:cNvPr id="4" name="TextBox 3">
+            <a:extLst>
+              <a:ext uri="{FF2B5EF4-FFF2-40B4-BE49-F238E27FC236}">
+                <a16:creationId xmlns:a16="http://schemas.microsoft.com/office/drawing/2014/main" id="{AF9FF586-EB8B-4FCB-B32C-5ED37D449B20}"/>
+              </a:ext>
+            </a:extLst>
+          </p:cNvPr>
+          <p:cNvSpPr txBox="1"/>
+          <p:nvPr/>
+        </p:nvSpPr>
+        <p:spPr>
+          <a:xfrm>
+            <a:off x="0" y="4852653"/>
+            <a:ext cx="9118833" cy="1477328"/>
+          </a:xfrm>
+          <a:prstGeom prst="rect">
+            <a:avLst/>
+          </a:prstGeom>
+          <a:noFill/>
+        </p:spPr>
+        <p:txBody>
+          <a:bodyPr wrap="square" rtlCol="0">
+            <a:spAutoFit/>
+          </a:bodyPr>
+          <a:lstStyle/>
+          <a:p>
+            <a:r>
+              <a:rPr lang="en-US" i="1" dirty="0">
+                <a:solidFill>
+                  <a:schemeClr val="accent2">
+                    <a:lumMod val="75000"/>
+                  </a:schemeClr>
+                </a:solidFill>
+              </a:rPr>
+              <a:t>docker network create</a:t>
+            </a:r>
+          </a:p>
+          <a:p>
+            <a:r>
+              <a:rPr lang="en-US" i="1" dirty="0">
+                <a:solidFill>
+                  <a:schemeClr val="accent2">
+                    <a:lumMod val="75000"/>
+                  </a:schemeClr>
+                </a:solidFill>
+              </a:rPr>
+              <a:t>docker network inspect</a:t>
+            </a:r>
+          </a:p>
+          <a:p>
+            <a:r>
+              <a:rPr lang="en-US" i="1" dirty="0">
+                <a:solidFill>
+                  <a:schemeClr val="accent2">
+                    <a:lumMod val="75000"/>
+                  </a:schemeClr>
+                </a:solidFill>
+              </a:rPr>
+              <a:t>docker network connect</a:t>
+            </a:r>
+          </a:p>
+          <a:p>
+            <a:r>
+              <a:rPr lang="en-US" i="1" dirty="0">
+                <a:solidFill>
+                  <a:schemeClr val="accent2">
+                    <a:lumMod val="75000"/>
+                  </a:schemeClr>
+                </a:solidFill>
+              </a:rPr>
+              <a:t>docker --mount source=</a:t>
+            </a:r>
+            <a:r>
+              <a:rPr lang="en-US" i="1" dirty="0" err="1">
+                <a:solidFill>
+                  <a:schemeClr val="accent2">
+                    <a:lumMod val="75000"/>
+                  </a:schemeClr>
+                </a:solidFill>
+              </a:rPr>
+              <a:t>volume_name,target</a:t>
+            </a:r>
+            <a:r>
+              <a:rPr lang="en-US" i="1" dirty="0">
+                <a:solidFill>
+                  <a:schemeClr val="accent2">
+                    <a:lumMod val="75000"/>
+                  </a:schemeClr>
+                </a:solidFill>
+              </a:rPr>
+              <a:t>=/path</a:t>
+            </a:r>
+          </a:p>
+          <a:p>
+            <a:r>
+              <a:rPr lang="en-US" i="1" dirty="0">
+                <a:solidFill>
+                  <a:schemeClr val="accent2">
+                    <a:lumMod val="75000"/>
+                  </a:schemeClr>
+                </a:solidFill>
+              </a:rPr>
+              <a:t>docker volume create</a:t>
+            </a:r>
+          </a:p>
+        </p:txBody>
+      </p:sp>
     </p:spTree>
     <p:extLst>
       <p:ext uri="{BB962C8B-B14F-4D97-AF65-F5344CB8AC3E}">
@@ -5395,7 +5413,7 @@
           <p:cNvPr id="2" name="Title 1">
             <a:extLst>
               <a:ext uri="{FF2B5EF4-FFF2-40B4-BE49-F238E27FC236}">
-                <a16:creationId xmlns:a16="http://schemas.microsoft.com/office/drawing/2014/main" id="{5CCF7BB9-FCCD-4590-8A50-ECC4E97B9632}"/>
+                <a16:creationId xmlns:a16="http://schemas.microsoft.com/office/drawing/2014/main" id="{483C5101-30B7-4B6D-A099-F4519FB24302}"/>
               </a:ext>
             </a:extLst>
           </p:cNvPr>
@@ -5413,7 +5431,7 @@
           <a:p>
             <a:r>
               <a:rPr lang="en-US" dirty="0"/>
-              <a:t>Swarm</a:t>
+              <a:t>Docker commands</a:t>
             </a:r>
           </a:p>
         </p:txBody>
@@ -5423,7 +5441,7 @@
           <p:cNvPr id="3" name="Content Placeholder 2">
             <a:extLst>
               <a:ext uri="{FF2B5EF4-FFF2-40B4-BE49-F238E27FC236}">
-                <a16:creationId xmlns:a16="http://schemas.microsoft.com/office/drawing/2014/main" id="{FCAE88A4-DA84-4C33-BA2F-2E035B09B324}"/>
+                <a16:creationId xmlns:a16="http://schemas.microsoft.com/office/drawing/2014/main" id="{CE7C328A-6CF9-4C4B-9C98-529A3D72D7E7}"/>
               </a:ext>
             </a:extLst>
           </p:cNvPr>
@@ -5441,7 +5459,19 @@
           <a:p>
             <a:r>
               <a:rPr lang="en-US" dirty="0"/>
-              <a:t>Cluster of docker engines</a:t>
+              <a:t>docker exec</a:t>
+            </a:r>
+          </a:p>
+          <a:p>
+            <a:r>
+              <a:rPr lang="en-US" dirty="0"/>
+              <a:t>docker attach</a:t>
+            </a:r>
+          </a:p>
+          <a:p>
+            <a:r>
+              <a:rPr lang="en-US" dirty="0"/>
+              <a:t>docker commit</a:t>
             </a:r>
           </a:p>
         </p:txBody>
@@ -5449,7 +5479,7 @@
     </p:spTree>
     <p:extLst>
       <p:ext uri="{BB962C8B-B14F-4D97-AF65-F5344CB8AC3E}">
-        <p14:creationId xmlns:p14="http://schemas.microsoft.com/office/powerpoint/2010/main" val="3651795639"/>
+        <p14:creationId xmlns:p14="http://schemas.microsoft.com/office/powerpoint/2010/main" val="4128457706"/>
       </p:ext>
     </p:extLst>
   </p:cSld>
@@ -5481,7 +5511,7 @@
           <p:cNvPr id="2" name="Title 1">
             <a:extLst>
               <a:ext uri="{FF2B5EF4-FFF2-40B4-BE49-F238E27FC236}">
-                <a16:creationId xmlns:a16="http://schemas.microsoft.com/office/drawing/2014/main" id="{483C5101-30B7-4B6D-A099-F4519FB24302}"/>
+                <a16:creationId xmlns:a16="http://schemas.microsoft.com/office/drawing/2014/main" id="{5CCF7BB9-FCCD-4590-8A50-ECC4E97B9632}"/>
               </a:ext>
             </a:extLst>
           </p:cNvPr>
@@ -5499,7 +5529,7 @@
           <a:p>
             <a:r>
               <a:rPr lang="en-US" dirty="0"/>
-              <a:t>Docker commands</a:t>
+              <a:t>Swarm</a:t>
             </a:r>
           </a:p>
         </p:txBody>
@@ -5509,7 +5539,7 @@
           <p:cNvPr id="3" name="Content Placeholder 2">
             <a:extLst>
               <a:ext uri="{FF2B5EF4-FFF2-40B4-BE49-F238E27FC236}">
-                <a16:creationId xmlns:a16="http://schemas.microsoft.com/office/drawing/2014/main" id="{CE7C328A-6CF9-4C4B-9C98-529A3D72D7E7}"/>
+                <a16:creationId xmlns:a16="http://schemas.microsoft.com/office/drawing/2014/main" id="{FCAE88A4-DA84-4C33-BA2F-2E035B09B324}"/>
               </a:ext>
             </a:extLst>
           </p:cNvPr>
@@ -5522,24 +5552,74 @@
         </p:nvSpPr>
         <p:spPr/>
         <p:txBody>
-          <a:bodyPr/>
-          <a:lstStyle/>
-          <a:p>
-            <a:r>
-              <a:rPr lang="en-US" dirty="0"/>
-              <a:t>docker exec</a:t>
-            </a:r>
-          </a:p>
-          <a:p>
-            <a:r>
-              <a:rPr lang="en-US" dirty="0"/>
-              <a:t>docker attach</a:t>
-            </a:r>
-          </a:p>
-          <a:p>
-            <a:r>
-              <a:rPr lang="en-US" dirty="0"/>
-              <a:t>docker commit</a:t>
+          <a:bodyPr>
+            <a:normAutofit lnSpcReduction="10000"/>
+          </a:bodyPr>
+          <a:lstStyle/>
+          <a:p>
+            <a:r>
+              <a:rPr lang="en-US" dirty="0"/>
+              <a:t>Cluster of docker engines (pool of docker hosts becomes one)</a:t>
+            </a:r>
+          </a:p>
+          <a:p>
+            <a:r>
+              <a:rPr lang="en-US" dirty="0"/>
+              <a:t>Node</a:t>
+            </a:r>
+          </a:p>
+          <a:p>
+            <a:pPr lvl="1"/>
+            <a:r>
+              <a:rPr lang="en-US" dirty="0"/>
+              <a:t>physical or virtual machine running docker engine</a:t>
+            </a:r>
+          </a:p>
+          <a:p>
+            <a:pPr lvl="1"/>
+            <a:r>
+              <a:rPr lang="en-US" dirty="0"/>
+              <a:t>manager (scheduling, cluster state maintenance, …)</a:t>
+            </a:r>
+          </a:p>
+          <a:p>
+            <a:pPr lvl="1"/>
+            <a:r>
+              <a:rPr lang="en-US" dirty="0"/>
+              <a:t>worker</a:t>
+            </a:r>
+          </a:p>
+          <a:p>
+            <a:r>
+              <a:rPr lang="en-US" dirty="0"/>
+              <a:t>Define state -&gt; docker maintains it</a:t>
+            </a:r>
+          </a:p>
+          <a:p>
+            <a:r>
+              <a:rPr lang="en-US" dirty="0"/>
+              <a:t>Service</a:t>
+            </a:r>
+          </a:p>
+          <a:p>
+            <a:pPr lvl="1"/>
+            <a:r>
+              <a:rPr lang="en-US" dirty="0"/>
+              <a:t>image representing microservice</a:t>
+            </a:r>
+          </a:p>
+          <a:p>
+            <a:pPr lvl="1"/>
+            <a:r>
+              <a:rPr lang="en-US" dirty="0"/>
+              <a:t>deployed to swarm (after service creation/update orchestrator schedules tasks)</a:t>
+            </a:r>
+          </a:p>
+          <a:p>
+            <a:pPr lvl="1"/>
+            <a:r>
+              <a:rPr lang="en-US" dirty="0"/>
+              <a:t>Replicated/global services</a:t>
             </a:r>
           </a:p>
         </p:txBody>
@@ -5547,7 +5627,7 @@
     </p:spTree>
     <p:extLst>
       <p:ext uri="{BB962C8B-B14F-4D97-AF65-F5344CB8AC3E}">
-        <p14:creationId xmlns:p14="http://schemas.microsoft.com/office/powerpoint/2010/main" val="4128457706"/>
+        <p14:creationId xmlns:p14="http://schemas.microsoft.com/office/powerpoint/2010/main" val="3651795639"/>
       </p:ext>
     </p:extLst>
   </p:cSld>

</xml_diff>

<commit_message>
update of docker intro presentation
</commit_message>
<xml_diff>
--- a/src/_data/docker.pptx
+++ b/src/_data/docker.pptx
@@ -14,18 +14,18 @@
     <p:sldId id="271" r:id="rId8"/>
     <p:sldId id="278" r:id="rId9"/>
     <p:sldId id="276" r:id="rId10"/>
-    <p:sldId id="260" r:id="rId11"/>
-    <p:sldId id="277" r:id="rId12"/>
+    <p:sldId id="277" r:id="rId11"/>
+    <p:sldId id="260" r:id="rId12"/>
     <p:sldId id="281" r:id="rId13"/>
-    <p:sldId id="268" r:id="rId14"/>
-    <p:sldId id="266" r:id="rId15"/>
-    <p:sldId id="279" r:id="rId16"/>
-    <p:sldId id="261" r:id="rId17"/>
-    <p:sldId id="267" r:id="rId18"/>
+    <p:sldId id="261" r:id="rId14"/>
+    <p:sldId id="267" r:id="rId15"/>
+    <p:sldId id="268" r:id="rId16"/>
+    <p:sldId id="266" r:id="rId17"/>
+    <p:sldId id="279" r:id="rId18"/>
     <p:sldId id="269" r:id="rId19"/>
     <p:sldId id="274" r:id="rId20"/>
-    <p:sldId id="280" r:id="rId21"/>
-    <p:sldId id="275" r:id="rId22"/>
+    <p:sldId id="275" r:id="rId21"/>
+    <p:sldId id="280" r:id="rId22"/>
     <p:sldId id="259" r:id="rId23"/>
     <p:sldId id="270" r:id="rId24"/>
   </p:sldIdLst>
@@ -281,7 +281,7 @@
           <a:p>
             <a:fld id="{D697FA50-5596-4026-B625-4A0202262A1E}" type="datetimeFigureOut">
               <a:rPr lang="en-US" smtClean="0"/>
-              <a:t>3/10/2018</a:t>
+              <a:t>3/11/2018</a:t>
             </a:fld>
             <a:endParaRPr lang="en-US"/>
           </a:p>
@@ -479,7 +479,7 @@
           <a:p>
             <a:fld id="{D697FA50-5596-4026-B625-4A0202262A1E}" type="datetimeFigureOut">
               <a:rPr lang="en-US" smtClean="0"/>
-              <a:t>3/10/2018</a:t>
+              <a:t>3/11/2018</a:t>
             </a:fld>
             <a:endParaRPr lang="en-US"/>
           </a:p>
@@ -687,7 +687,7 @@
           <a:p>
             <a:fld id="{D697FA50-5596-4026-B625-4A0202262A1E}" type="datetimeFigureOut">
               <a:rPr lang="en-US" smtClean="0"/>
-              <a:t>3/10/2018</a:t>
+              <a:t>3/11/2018</a:t>
             </a:fld>
             <a:endParaRPr lang="en-US"/>
           </a:p>
@@ -885,7 +885,7 @@
           <a:p>
             <a:fld id="{D697FA50-5596-4026-B625-4A0202262A1E}" type="datetimeFigureOut">
               <a:rPr lang="en-US" smtClean="0"/>
-              <a:t>3/10/2018</a:t>
+              <a:t>3/11/2018</a:t>
             </a:fld>
             <a:endParaRPr lang="en-US"/>
           </a:p>
@@ -1160,7 +1160,7 @@
           <a:p>
             <a:fld id="{D697FA50-5596-4026-B625-4A0202262A1E}" type="datetimeFigureOut">
               <a:rPr lang="en-US" smtClean="0"/>
-              <a:t>3/10/2018</a:t>
+              <a:t>3/11/2018</a:t>
             </a:fld>
             <a:endParaRPr lang="en-US"/>
           </a:p>
@@ -1425,7 +1425,7 @@
           <a:p>
             <a:fld id="{D697FA50-5596-4026-B625-4A0202262A1E}" type="datetimeFigureOut">
               <a:rPr lang="en-US" smtClean="0"/>
-              <a:t>3/10/2018</a:t>
+              <a:t>3/11/2018</a:t>
             </a:fld>
             <a:endParaRPr lang="en-US"/>
           </a:p>
@@ -1837,7 +1837,7 @@
           <a:p>
             <a:fld id="{D697FA50-5596-4026-B625-4A0202262A1E}" type="datetimeFigureOut">
               <a:rPr lang="en-US" smtClean="0"/>
-              <a:t>3/10/2018</a:t>
+              <a:t>3/11/2018</a:t>
             </a:fld>
             <a:endParaRPr lang="en-US"/>
           </a:p>
@@ -1978,7 +1978,7 @@
           <a:p>
             <a:fld id="{D697FA50-5596-4026-B625-4A0202262A1E}" type="datetimeFigureOut">
               <a:rPr lang="en-US" smtClean="0"/>
-              <a:t>3/10/2018</a:t>
+              <a:t>3/11/2018</a:t>
             </a:fld>
             <a:endParaRPr lang="en-US"/>
           </a:p>
@@ -2091,7 +2091,7 @@
           <a:p>
             <a:fld id="{D697FA50-5596-4026-B625-4A0202262A1E}" type="datetimeFigureOut">
               <a:rPr lang="en-US" smtClean="0"/>
-              <a:t>3/10/2018</a:t>
+              <a:t>3/11/2018</a:t>
             </a:fld>
             <a:endParaRPr lang="en-US"/>
           </a:p>
@@ -2402,7 +2402,7 @@
           <a:p>
             <a:fld id="{D697FA50-5596-4026-B625-4A0202262A1E}" type="datetimeFigureOut">
               <a:rPr lang="en-US" smtClean="0"/>
-              <a:t>3/10/2018</a:t>
+              <a:t>3/11/2018</a:t>
             </a:fld>
             <a:endParaRPr lang="en-US"/>
           </a:p>
@@ -2690,7 +2690,7 @@
           <a:p>
             <a:fld id="{D697FA50-5596-4026-B625-4A0202262A1E}" type="datetimeFigureOut">
               <a:rPr lang="en-US" smtClean="0"/>
-              <a:t>3/10/2018</a:t>
+              <a:t>3/11/2018</a:t>
             </a:fld>
             <a:endParaRPr lang="en-US"/>
           </a:p>
@@ -2931,7 +2931,7 @@
           <a:p>
             <a:fld id="{D697FA50-5596-4026-B625-4A0202262A1E}" type="datetimeFigureOut">
               <a:rPr lang="en-US" smtClean="0"/>
-              <a:t>3/10/2018</a:t>
+              <a:t>3/11/2018</a:t>
             </a:fld>
             <a:endParaRPr lang="en-US"/>
           </a:p>
@@ -3460,8 +3460,13 @@
           <a:p>
             <a:r>
               <a:rPr lang="en-US" dirty="0"/>
-              <a:t>docker-compose</a:t>
-            </a:r>
+              <a:t>.</a:t>
+            </a:r>
+            <a:r>
+              <a:rPr lang="en-US" dirty="0" err="1"/>
+              <a:t>dockerignore</a:t>
+            </a:r>
+            <a:endParaRPr lang="en-US" dirty="0"/>
           </a:p>
         </p:txBody>
       </p:sp>
@@ -3488,35 +3493,70 @@
           <a:p>
             <a:r>
               <a:rPr lang="en-US" dirty="0"/>
-              <a:t>define and run multi-container Docker applications</a:t>
-            </a:r>
-          </a:p>
-          <a:p>
-            <a:r>
-              <a:rPr lang="en-US" dirty="0"/>
-              <a:t>yam configuration</a:t>
+              <a:t>build context</a:t>
             </a:r>
           </a:p>
           <a:p>
             <a:pPr lvl="1"/>
             <a:r>
-              <a:rPr lang="en-US" dirty="0"/>
-              <a:t>list of services</a:t>
+              <a:rPr lang="en-US" dirty="0" err="1"/>
+              <a:t>Dockerfile</a:t>
+            </a:r>
+            <a:r>
+              <a:rPr lang="en-US" dirty="0"/>
+              <a:t> is part of it</a:t>
             </a:r>
           </a:p>
           <a:p>
             <a:pPr lvl="1"/>
             <a:r>
               <a:rPr lang="en-US" dirty="0"/>
-              <a:t>configuration how to build images for these services (can contain path to service docker file)</a:t>
-            </a:r>
+              <a:t>can be defined recursively</a:t>
+            </a:r>
+          </a:p>
+          <a:p>
+            <a:pPr lvl="1"/>
+            <a:r>
+              <a:rPr lang="en-US" dirty="0"/>
+              <a:t>is sent to Docker daemon </a:t>
+            </a:r>
+            <a:r>
+              <a:rPr lang="en-US" sz="2000" i="1" dirty="0"/>
+              <a:t>“Sending build context to Docker daemon  35.33kB”</a:t>
+            </a:r>
+          </a:p>
+          <a:p>
+            <a:r>
+              <a:rPr lang="en-US" dirty="0"/>
+              <a:t>.</a:t>
+            </a:r>
+            <a:r>
+              <a:rPr lang="en-US" dirty="0" err="1"/>
+              <a:t>dockerignore</a:t>
+            </a:r>
+            <a:r>
+              <a:rPr lang="en-US" dirty="0"/>
+              <a:t> file excludes files that are not relevant for build</a:t>
+            </a:r>
+          </a:p>
+          <a:p>
+            <a:pPr lvl="1"/>
+            <a:r>
+              <a:rPr lang="en-US" dirty="0"/>
+              <a:t>similar syntax as .</a:t>
+            </a:r>
+            <a:r>
+              <a:rPr lang="en-US" dirty="0" err="1"/>
+              <a:t>gitignore</a:t>
+            </a:r>
+            <a:endParaRPr lang="en-US" dirty="0"/>
           </a:p>
         </p:txBody>
       </p:sp>
     </p:spTree>
     <p:extLst>
       <p:ext uri="{BB962C8B-B14F-4D97-AF65-F5344CB8AC3E}">
-        <p14:creationId xmlns:p14="http://schemas.microsoft.com/office/powerpoint/2010/main" val="3540793809"/>
+        <p14:creationId xmlns:p14="http://schemas.microsoft.com/office/powerpoint/2010/main" val="1402545555"/>
       </p:ext>
     </p:extLst>
   </p:cSld>
@@ -3566,13 +3606,8 @@
           <a:p>
             <a:r>
               <a:rPr lang="en-US" dirty="0"/>
-              <a:t>.</a:t>
-            </a:r>
-            <a:r>
-              <a:rPr lang="en-US" dirty="0" err="1"/>
-              <a:t>dockerignore</a:t>
-            </a:r>
-            <a:endParaRPr lang="en-US" dirty="0"/>
+              <a:t>docker-compose</a:t>
+            </a:r>
           </a:p>
         </p:txBody>
       </p:sp>
@@ -3599,70 +3634,35 @@
           <a:p>
             <a:r>
               <a:rPr lang="en-US" dirty="0"/>
-              <a:t>build context</a:t>
+              <a:t>define and run multi-container Docker applications</a:t>
+            </a:r>
+          </a:p>
+          <a:p>
+            <a:r>
+              <a:rPr lang="en-US" dirty="0"/>
+              <a:t>yam configuration</a:t>
             </a:r>
           </a:p>
           <a:p>
             <a:pPr lvl="1"/>
             <a:r>
-              <a:rPr lang="en-US" dirty="0" err="1"/>
-              <a:t>Dockerfile</a:t>
-            </a:r>
-            <a:r>
-              <a:rPr lang="en-US" dirty="0"/>
-              <a:t> is part of it</a:t>
+              <a:rPr lang="en-US" dirty="0"/>
+              <a:t>list of services</a:t>
             </a:r>
           </a:p>
           <a:p>
             <a:pPr lvl="1"/>
             <a:r>
               <a:rPr lang="en-US" dirty="0"/>
-              <a:t>can be defined recursively</a:t>
-            </a:r>
-          </a:p>
-          <a:p>
-            <a:pPr lvl="1"/>
-            <a:r>
-              <a:rPr lang="en-US" dirty="0"/>
-              <a:t>is sent to Docker daemon </a:t>
-            </a:r>
-            <a:r>
-              <a:rPr lang="en-US" sz="2000" i="1" dirty="0"/>
-              <a:t>“Sending build context to Docker daemon  35.33kB”</a:t>
-            </a:r>
-          </a:p>
-          <a:p>
-            <a:r>
-              <a:rPr lang="en-US" dirty="0"/>
-              <a:t>.</a:t>
-            </a:r>
-            <a:r>
-              <a:rPr lang="en-US" dirty="0" err="1"/>
-              <a:t>dockerignore</a:t>
-            </a:r>
-            <a:r>
-              <a:rPr lang="en-US" dirty="0"/>
-              <a:t> file excludes files that are not relevant for build</a:t>
-            </a:r>
-          </a:p>
-          <a:p>
-            <a:pPr lvl="1"/>
-            <a:r>
-              <a:rPr lang="en-US" dirty="0"/>
-              <a:t>similar purpose as .</a:t>
-            </a:r>
-            <a:r>
-              <a:rPr lang="en-US" dirty="0" err="1"/>
-              <a:t>gitignore</a:t>
-            </a:r>
-            <a:endParaRPr lang="en-US" dirty="0"/>
+              <a:t>configuration how to build images for these services (can contain path to service docker file)</a:t>
+            </a:r>
           </a:p>
         </p:txBody>
       </p:sp>
     </p:spTree>
     <p:extLst>
       <p:ext uri="{BB962C8B-B14F-4D97-AF65-F5344CB8AC3E}">
-        <p14:creationId xmlns:p14="http://schemas.microsoft.com/office/powerpoint/2010/main" val="1402545555"/>
+        <p14:creationId xmlns:p14="http://schemas.microsoft.com/office/powerpoint/2010/main" val="3540793809"/>
       </p:ext>
     </p:extLst>
   </p:cSld>
@@ -3830,438 +3830,6 @@
 </file>
 
 <file path=ppt/slides/slide13.xml><?xml version="1.0" encoding="utf-8"?>
-<p:sld xmlns:a="http://schemas.openxmlformats.org/drawingml/2006/main" xmlns:r="http://schemas.openxmlformats.org/officeDocument/2006/relationships" xmlns:p="http://schemas.openxmlformats.org/presentationml/2006/main">
-  <p:cSld>
-    <p:spTree>
-      <p:nvGrpSpPr>
-        <p:cNvPr id="1" name=""/>
-        <p:cNvGrpSpPr/>
-        <p:nvPr/>
-      </p:nvGrpSpPr>
-      <p:grpSpPr>
-        <a:xfrm>
-          <a:off x="0" y="0"/>
-          <a:ext cx="0" cy="0"/>
-          <a:chOff x="0" y="0"/>
-          <a:chExt cx="0" cy="0"/>
-        </a:xfrm>
-      </p:grpSpPr>
-      <p:sp>
-        <p:nvSpPr>
-          <p:cNvPr id="2" name="Title 1">
-            <a:extLst>
-              <a:ext uri="{FF2B5EF4-FFF2-40B4-BE49-F238E27FC236}">
-                <a16:creationId xmlns:a16="http://schemas.microsoft.com/office/drawing/2014/main" id="{55FC709F-AA0C-4631-9258-FE9EBED3D402}"/>
-              </a:ext>
-            </a:extLst>
-          </p:cNvPr>
-          <p:cNvSpPr>
-            <a:spLocks noGrp="1"/>
-          </p:cNvSpPr>
-          <p:nvPr>
-            <p:ph type="title"/>
-          </p:nvPr>
-        </p:nvSpPr>
-        <p:spPr/>
-        <p:txBody>
-          <a:bodyPr/>
-          <a:lstStyle/>
-          <a:p>
-            <a:r>
-              <a:rPr lang="en-US" dirty="0"/>
-              <a:t>Docker – application data</a:t>
-            </a:r>
-          </a:p>
-        </p:txBody>
-      </p:sp>
-      <p:sp>
-        <p:nvSpPr>
-          <p:cNvPr id="3" name="Content Placeholder 2">
-            <a:extLst>
-              <a:ext uri="{FF2B5EF4-FFF2-40B4-BE49-F238E27FC236}">
-                <a16:creationId xmlns:a16="http://schemas.microsoft.com/office/drawing/2014/main" id="{3222C25C-A151-4E2F-9DAD-C0964E88C089}"/>
-              </a:ext>
-            </a:extLst>
-          </p:cNvPr>
-          <p:cNvSpPr>
-            <a:spLocks noGrp="1"/>
-          </p:cNvSpPr>
-          <p:nvPr>
-            <p:ph idx="1"/>
-          </p:nvPr>
-        </p:nvSpPr>
-        <p:spPr/>
-        <p:txBody>
-          <a:bodyPr/>
-          <a:lstStyle/>
-          <a:p>
-            <a:r>
-              <a:rPr lang="en-US" dirty="0"/>
-              <a:t>Volumes</a:t>
-            </a:r>
-          </a:p>
-          <a:p>
-            <a:pPr lvl="1"/>
-            <a:r>
-              <a:rPr lang="en-US" dirty="0"/>
-              <a:t>file/directory on host machine is mounted into a container</a:t>
-            </a:r>
-          </a:p>
-          <a:p>
-            <a:pPr lvl="1"/>
-            <a:r>
-              <a:rPr lang="en-US" dirty="0"/>
-              <a:t>best choice for data storing</a:t>
-            </a:r>
-          </a:p>
-          <a:p>
-            <a:r>
-              <a:rPr lang="en-US" dirty="0"/>
-              <a:t>Bind mounts</a:t>
-            </a:r>
-          </a:p>
-          <a:p>
-            <a:pPr lvl="1"/>
-            <a:r>
-              <a:rPr lang="en-US" dirty="0"/>
-              <a:t>file/directory on host machine is mounted into a container</a:t>
-            </a:r>
-          </a:p>
-          <a:p>
-            <a:pPr lvl="1"/>
-            <a:r>
-              <a:rPr lang="en-US" dirty="0"/>
-              <a:t>Docker CLI cannot be used to manage bind-mounts</a:t>
-            </a:r>
-          </a:p>
-          <a:p>
-            <a:r>
-              <a:rPr lang="en-US" dirty="0" err="1"/>
-              <a:t>tmpfs</a:t>
-            </a:r>
-            <a:r>
-              <a:rPr lang="en-US" dirty="0"/>
-              <a:t> mounts</a:t>
-            </a:r>
-          </a:p>
-          <a:p>
-            <a:pPr lvl="1"/>
-            <a:r>
-              <a:rPr lang="en-US" dirty="0"/>
-              <a:t>stored in memory/swap (nor container R/W layer, nor host filesystem)</a:t>
-            </a:r>
-          </a:p>
-          <a:p>
-            <a:pPr lvl="1"/>
-            <a:r>
-              <a:rPr lang="en-US" dirty="0"/>
-              <a:t>cleared when container is stopped</a:t>
-            </a:r>
-          </a:p>
-        </p:txBody>
-      </p:sp>
-    </p:spTree>
-    <p:extLst>
-      <p:ext uri="{BB962C8B-B14F-4D97-AF65-F5344CB8AC3E}">
-        <p14:creationId xmlns:p14="http://schemas.microsoft.com/office/powerpoint/2010/main" val="3692977509"/>
-      </p:ext>
-    </p:extLst>
-  </p:cSld>
-  <p:clrMapOvr>
-    <a:masterClrMapping/>
-  </p:clrMapOvr>
-</p:sld>
-</file>
-
-<file path=ppt/slides/slide14.xml><?xml version="1.0" encoding="utf-8"?>
-<p:sld xmlns:a="http://schemas.openxmlformats.org/drawingml/2006/main" xmlns:r="http://schemas.openxmlformats.org/officeDocument/2006/relationships" xmlns:p="http://schemas.openxmlformats.org/presentationml/2006/main">
-  <p:cSld>
-    <p:spTree>
-      <p:nvGrpSpPr>
-        <p:cNvPr id="1" name=""/>
-        <p:cNvGrpSpPr/>
-        <p:nvPr/>
-      </p:nvGrpSpPr>
-      <p:grpSpPr>
-        <a:xfrm>
-          <a:off x="0" y="0"/>
-          <a:ext cx="0" cy="0"/>
-          <a:chOff x="0" y="0"/>
-          <a:chExt cx="0" cy="0"/>
-        </a:xfrm>
-      </p:grpSpPr>
-      <p:sp>
-        <p:nvSpPr>
-          <p:cNvPr id="2" name="Title 1">
-            <a:extLst>
-              <a:ext uri="{FF2B5EF4-FFF2-40B4-BE49-F238E27FC236}">
-                <a16:creationId xmlns:a16="http://schemas.microsoft.com/office/drawing/2014/main" id="{08578D90-C595-4221-9910-97011CA30B58}"/>
-              </a:ext>
-            </a:extLst>
-          </p:cNvPr>
-          <p:cNvSpPr>
-            <a:spLocks noGrp="1"/>
-          </p:cNvSpPr>
-          <p:nvPr>
-            <p:ph type="title"/>
-          </p:nvPr>
-        </p:nvSpPr>
-        <p:spPr/>
-        <p:txBody>
-          <a:bodyPr/>
-          <a:lstStyle/>
-          <a:p>
-            <a:r>
-              <a:rPr lang="en-US" dirty="0"/>
-              <a:t>Docker volumes</a:t>
-            </a:r>
-          </a:p>
-        </p:txBody>
-      </p:sp>
-      <p:sp>
-        <p:nvSpPr>
-          <p:cNvPr id="3" name="Content Placeholder 2">
-            <a:extLst>
-              <a:ext uri="{FF2B5EF4-FFF2-40B4-BE49-F238E27FC236}">
-                <a16:creationId xmlns:a16="http://schemas.microsoft.com/office/drawing/2014/main" id="{8F18DF23-793A-4C4C-93ED-F1508EF16A24}"/>
-              </a:ext>
-            </a:extLst>
-          </p:cNvPr>
-          <p:cNvSpPr>
-            <a:spLocks noGrp="1"/>
-          </p:cNvSpPr>
-          <p:nvPr>
-            <p:ph idx="1"/>
-          </p:nvPr>
-        </p:nvSpPr>
-        <p:spPr/>
-        <p:txBody>
-          <a:bodyPr/>
-          <a:lstStyle/>
-          <a:p>
-            <a:r>
-              <a:rPr lang="en-US" dirty="0"/>
-              <a:t>Recommended storage for writing data</a:t>
-            </a:r>
-          </a:p>
-          <a:p>
-            <a:r>
-              <a:rPr lang="en-US" dirty="0"/>
-              <a:t>Persistent</a:t>
-            </a:r>
-          </a:p>
-          <a:p>
-            <a:r>
-              <a:rPr lang="en-US" dirty="0"/>
-              <a:t>Shared between containers</a:t>
-            </a:r>
-          </a:p>
-          <a:p>
-            <a:r>
-              <a:rPr lang="en-US" dirty="0"/>
-              <a:t>Management through Docker CLI</a:t>
-            </a:r>
-          </a:p>
-          <a:p>
-            <a:r>
-              <a:rPr lang="en-US" dirty="0"/>
-              <a:t>Usages</a:t>
-            </a:r>
-          </a:p>
-          <a:p>
-            <a:pPr lvl="1"/>
-            <a:r>
-              <a:rPr lang="en-US" dirty="0"/>
-              <a:t>environment variables</a:t>
-            </a:r>
-          </a:p>
-          <a:p>
-            <a:pPr lvl="1"/>
-            <a:r>
-              <a:rPr lang="en-US" dirty="0"/>
-              <a:t>database</a:t>
-            </a:r>
-          </a:p>
-          <a:p>
-            <a:pPr lvl="1"/>
-            <a:r>
-              <a:rPr lang="en-US" dirty="0"/>
-              <a:t>…</a:t>
-            </a:r>
-          </a:p>
-        </p:txBody>
-      </p:sp>
-    </p:spTree>
-    <p:extLst>
-      <p:ext uri="{BB962C8B-B14F-4D97-AF65-F5344CB8AC3E}">
-        <p14:creationId xmlns:p14="http://schemas.microsoft.com/office/powerpoint/2010/main" val="2745753165"/>
-      </p:ext>
-    </p:extLst>
-  </p:cSld>
-  <p:clrMapOvr>
-    <a:masterClrMapping/>
-  </p:clrMapOvr>
-</p:sld>
-</file>
-
-<file path=ppt/slides/slide15.xml><?xml version="1.0" encoding="utf-8"?>
-<p:sld xmlns:a="http://schemas.openxmlformats.org/drawingml/2006/main" xmlns:r="http://schemas.openxmlformats.org/officeDocument/2006/relationships" xmlns:p="http://schemas.openxmlformats.org/presentationml/2006/main">
-  <p:cSld>
-    <p:spTree>
-      <p:nvGrpSpPr>
-        <p:cNvPr id="1" name=""/>
-        <p:cNvGrpSpPr/>
-        <p:nvPr/>
-      </p:nvGrpSpPr>
-      <p:grpSpPr>
-        <a:xfrm>
-          <a:off x="0" y="0"/>
-          <a:ext cx="0" cy="0"/>
-          <a:chOff x="0" y="0"/>
-          <a:chExt cx="0" cy="0"/>
-        </a:xfrm>
-      </p:grpSpPr>
-      <p:sp>
-        <p:nvSpPr>
-          <p:cNvPr id="2" name="Title 1">
-            <a:extLst>
-              <a:ext uri="{FF2B5EF4-FFF2-40B4-BE49-F238E27FC236}">
-                <a16:creationId xmlns:a16="http://schemas.microsoft.com/office/drawing/2014/main" id="{464CA198-CBF7-407B-B8A2-CA003AD7CB41}"/>
-              </a:ext>
-            </a:extLst>
-          </p:cNvPr>
-          <p:cNvSpPr>
-            <a:spLocks noGrp="1"/>
-          </p:cNvSpPr>
-          <p:nvPr>
-            <p:ph type="title"/>
-          </p:nvPr>
-        </p:nvSpPr>
-        <p:spPr/>
-        <p:txBody>
-          <a:bodyPr/>
-          <a:lstStyle/>
-          <a:p>
-            <a:endParaRPr lang="en-US" dirty="0"/>
-          </a:p>
-        </p:txBody>
-      </p:sp>
-      <p:sp>
-        <p:nvSpPr>
-          <p:cNvPr id="3" name="Content Placeholder 2">
-            <a:extLst>
-              <a:ext uri="{FF2B5EF4-FFF2-40B4-BE49-F238E27FC236}">
-                <a16:creationId xmlns:a16="http://schemas.microsoft.com/office/drawing/2014/main" id="{C5FB6573-8C73-44D7-B5E6-65EBAF34FD85}"/>
-              </a:ext>
-            </a:extLst>
-          </p:cNvPr>
-          <p:cNvSpPr>
-            <a:spLocks noGrp="1"/>
-          </p:cNvSpPr>
-          <p:nvPr>
-            <p:ph idx="1"/>
-          </p:nvPr>
-        </p:nvSpPr>
-        <p:spPr/>
-        <p:txBody>
-          <a:bodyPr/>
-          <a:lstStyle/>
-          <a:p>
-            <a:pPr marL="0" indent="0">
-              <a:buNone/>
-            </a:pPr>
-            <a:endParaRPr lang="en-US" dirty="0"/>
-          </a:p>
-          <a:p>
-            <a:pPr marL="0" indent="0">
-              <a:buNone/>
-            </a:pPr>
-            <a:endParaRPr lang="en-US" dirty="0"/>
-          </a:p>
-          <a:p>
-            <a:pPr marL="0" indent="0">
-              <a:buNone/>
-            </a:pPr>
-            <a:endParaRPr lang="en-US" dirty="0"/>
-          </a:p>
-          <a:p>
-            <a:pPr marL="0" indent="0" algn="ctr">
-              <a:buNone/>
-            </a:pPr>
-            <a:r>
-              <a:rPr lang="en-US" sz="4800" dirty="0"/>
-              <a:t>MariaDB example</a:t>
-            </a:r>
-          </a:p>
-        </p:txBody>
-      </p:sp>
-      <p:sp>
-        <p:nvSpPr>
-          <p:cNvPr id="4" name="TextBox 3">
-            <a:extLst>
-              <a:ext uri="{FF2B5EF4-FFF2-40B4-BE49-F238E27FC236}">
-                <a16:creationId xmlns:a16="http://schemas.microsoft.com/office/drawing/2014/main" id="{83E2DF29-AB33-496B-BAE8-521C2E7569EF}"/>
-              </a:ext>
-            </a:extLst>
-          </p:cNvPr>
-          <p:cNvSpPr txBox="1"/>
-          <p:nvPr/>
-        </p:nvSpPr>
-        <p:spPr>
-          <a:xfrm>
-            <a:off x="0" y="6211669"/>
-            <a:ext cx="9118833" cy="646331"/>
-          </a:xfrm>
-          <a:prstGeom prst="rect">
-            <a:avLst/>
-          </a:prstGeom>
-          <a:noFill/>
-        </p:spPr>
-        <p:txBody>
-          <a:bodyPr wrap="square" rtlCol="0">
-            <a:spAutoFit/>
-          </a:bodyPr>
-          <a:lstStyle/>
-          <a:p>
-            <a:r>
-              <a:rPr lang="en-US" i="1" dirty="0">
-                <a:solidFill>
-                  <a:schemeClr val="accent2">
-                    <a:lumMod val="75000"/>
-                  </a:schemeClr>
-                </a:solidFill>
-              </a:rPr>
-              <a:t>docker volume</a:t>
-            </a:r>
-          </a:p>
-          <a:p>
-            <a:r>
-              <a:rPr lang="en-US" i="1" dirty="0">
-                <a:solidFill>
-                  <a:schemeClr val="accent2">
-                    <a:lumMod val="75000"/>
-                  </a:schemeClr>
-                </a:solidFill>
-              </a:rPr>
-              <a:t>docker inspect</a:t>
-            </a:r>
-          </a:p>
-        </p:txBody>
-      </p:sp>
-    </p:spTree>
-    <p:extLst>
-      <p:ext uri="{BB962C8B-B14F-4D97-AF65-F5344CB8AC3E}">
-        <p14:creationId xmlns:p14="http://schemas.microsoft.com/office/powerpoint/2010/main" val="3335794604"/>
-      </p:ext>
-    </p:extLst>
-  </p:cSld>
-  <p:clrMapOvr>
-    <a:masterClrMapping/>
-  </p:clrMapOvr>
-</p:sld>
-</file>
-
-<file path=ppt/slides/slide16.xml><?xml version="1.0" encoding="utf-8"?>
 <p:sld xmlns:a="http://schemas.openxmlformats.org/drawingml/2006/main" xmlns:r="http://schemas.openxmlformats.org/officeDocument/2006/relationships" xmlns:p="http://schemas.openxmlformats.org/presentationml/2006/main">
   <p:cSld>
     <p:spTree>
@@ -4389,6 +3957,504 @@
 </p:sld>
 </file>
 
+<file path=ppt/slides/slide14.xml><?xml version="1.0" encoding="utf-8"?>
+<p:sld xmlns:a="http://schemas.openxmlformats.org/drawingml/2006/main" xmlns:r="http://schemas.openxmlformats.org/officeDocument/2006/relationships" xmlns:p="http://schemas.openxmlformats.org/presentationml/2006/main">
+  <p:cSld>
+    <p:spTree>
+      <p:nvGrpSpPr>
+        <p:cNvPr id="1" name=""/>
+        <p:cNvGrpSpPr/>
+        <p:nvPr/>
+      </p:nvGrpSpPr>
+      <p:grpSpPr>
+        <a:xfrm>
+          <a:off x="0" y="0"/>
+          <a:ext cx="0" cy="0"/>
+          <a:chOff x="0" y="0"/>
+          <a:chExt cx="0" cy="0"/>
+        </a:xfrm>
+      </p:grpSpPr>
+      <p:sp>
+        <p:nvSpPr>
+          <p:cNvPr id="2" name="Title 1">
+            <a:extLst>
+              <a:ext uri="{FF2B5EF4-FFF2-40B4-BE49-F238E27FC236}">
+                <a16:creationId xmlns:a16="http://schemas.microsoft.com/office/drawing/2014/main" id="{4DA00555-4385-4FB6-AFB7-64E8E37A98D3}"/>
+              </a:ext>
+            </a:extLst>
+          </p:cNvPr>
+          <p:cNvSpPr>
+            <a:spLocks noGrp="1"/>
+          </p:cNvSpPr>
+          <p:nvPr>
+            <p:ph type="title"/>
+          </p:nvPr>
+        </p:nvSpPr>
+        <p:spPr/>
+        <p:txBody>
+          <a:bodyPr/>
+          <a:lstStyle/>
+          <a:p>
+            <a:r>
+              <a:rPr lang="en-US" dirty="0"/>
+              <a:t>Docker - storage drivers</a:t>
+            </a:r>
+          </a:p>
+        </p:txBody>
+      </p:sp>
+      <p:sp>
+        <p:nvSpPr>
+          <p:cNvPr id="3" name="Content Placeholder 2">
+            <a:extLst>
+              <a:ext uri="{FF2B5EF4-FFF2-40B4-BE49-F238E27FC236}">
+                <a16:creationId xmlns:a16="http://schemas.microsoft.com/office/drawing/2014/main" id="{59D54D27-EC9C-4D9B-9467-EB646BB762F2}"/>
+              </a:ext>
+            </a:extLst>
+          </p:cNvPr>
+          <p:cNvSpPr>
+            <a:spLocks noGrp="1"/>
+          </p:cNvSpPr>
+          <p:nvPr>
+            <p:ph idx="1"/>
+          </p:nvPr>
+        </p:nvSpPr>
+        <p:spPr/>
+        <p:txBody>
+          <a:bodyPr>
+            <a:normAutofit/>
+          </a:bodyPr>
+          <a:lstStyle/>
+          <a:p>
+            <a:r>
+              <a:rPr lang="en-US" dirty="0"/>
+              <a:t>Control how images and containers are stored (important)</a:t>
+            </a:r>
+          </a:p>
+          <a:p>
+            <a:r>
+              <a:rPr lang="en-US" dirty="0"/>
+              <a:t>More than one is supported</a:t>
+            </a:r>
+          </a:p>
+          <a:p>
+            <a:r>
+              <a:rPr lang="en-US" dirty="0"/>
+              <a:t>overlay 2 , </a:t>
+            </a:r>
+            <a:r>
+              <a:rPr lang="en-US" dirty="0" err="1"/>
+              <a:t>aufs</a:t>
+            </a:r>
+            <a:r>
+              <a:rPr lang="en-US" dirty="0"/>
+              <a:t>, </a:t>
+            </a:r>
+            <a:r>
+              <a:rPr lang="en-US" dirty="0" err="1"/>
+              <a:t>devicemapper</a:t>
+            </a:r>
+            <a:r>
+              <a:rPr lang="en-US" dirty="0"/>
+              <a:t>, </a:t>
+            </a:r>
+            <a:r>
+              <a:rPr lang="en-US" dirty="0" err="1"/>
+              <a:t>vfs</a:t>
+            </a:r>
+            <a:r>
+              <a:rPr lang="en-US" dirty="0"/>
+              <a:t>, </a:t>
+            </a:r>
+            <a:r>
+              <a:rPr lang="en-US" dirty="0" err="1"/>
+              <a:t>zfs</a:t>
+            </a:r>
+            <a:r>
+              <a:rPr lang="en-US" dirty="0"/>
+              <a:t>, </a:t>
+            </a:r>
+            <a:r>
+              <a:rPr lang="en-US" dirty="0" err="1"/>
+              <a:t>brtfs</a:t>
+            </a:r>
+            <a:r>
+              <a:rPr lang="en-US" dirty="0"/>
+              <a:t> …</a:t>
+            </a:r>
+          </a:p>
+          <a:p>
+            <a:pPr lvl="1"/>
+            <a:r>
+              <a:rPr lang="en-US" dirty="0"/>
+              <a:t>Priority list – depend also on </a:t>
+            </a:r>
+            <a:r>
+              <a:rPr lang="en-US" dirty="0" err="1"/>
+              <a:t>linux</a:t>
+            </a:r>
+            <a:r>
+              <a:rPr lang="en-US" dirty="0"/>
+              <a:t> distribution (Ubuntu vs. Fedora)</a:t>
+            </a:r>
+          </a:p>
+          <a:p>
+            <a:pPr lvl="1"/>
+            <a:r>
+              <a:rPr lang="en-US" dirty="0"/>
+              <a:t>Can be modified (except for Windows and Mac)</a:t>
+            </a:r>
+          </a:p>
+          <a:p>
+            <a:pPr lvl="1"/>
+            <a:r>
+              <a:rPr lang="en-US" dirty="0"/>
+              <a:t>File level (</a:t>
+            </a:r>
+            <a:r>
+              <a:rPr lang="en-US" dirty="0" err="1"/>
+              <a:t>aufs</a:t>
+            </a:r>
+            <a:r>
+              <a:rPr lang="en-US" dirty="0"/>
+              <a:t>, overlay 2, …) vs. Block level (</a:t>
+            </a:r>
+            <a:r>
+              <a:rPr lang="en-US" dirty="0" err="1"/>
+              <a:t>brtfs</a:t>
+            </a:r>
+            <a:r>
+              <a:rPr lang="en-US" dirty="0"/>
+              <a:t>, </a:t>
+            </a:r>
+            <a:r>
+              <a:rPr lang="en-US" dirty="0" err="1"/>
+              <a:t>zfs</a:t>
+            </a:r>
+            <a:r>
+              <a:rPr lang="en-US" dirty="0"/>
+              <a:t>, …)</a:t>
+            </a:r>
+          </a:p>
+          <a:p>
+            <a:pPr marL="457200" lvl="1" indent="0">
+              <a:buNone/>
+            </a:pPr>
+            <a:endParaRPr lang="en-US" dirty="0"/>
+          </a:p>
+          <a:p>
+            <a:pPr marL="457200" lvl="1" indent="0">
+              <a:buNone/>
+            </a:pPr>
+            <a:endParaRPr lang="en-US" dirty="0"/>
+          </a:p>
+        </p:txBody>
+      </p:sp>
+    </p:spTree>
+    <p:extLst>
+      <p:ext uri="{BB962C8B-B14F-4D97-AF65-F5344CB8AC3E}">
+        <p14:creationId xmlns:p14="http://schemas.microsoft.com/office/powerpoint/2010/main" val="1018560530"/>
+      </p:ext>
+    </p:extLst>
+  </p:cSld>
+  <p:clrMapOvr>
+    <a:masterClrMapping/>
+  </p:clrMapOvr>
+</p:sld>
+</file>
+
+<file path=ppt/slides/slide15.xml><?xml version="1.0" encoding="utf-8"?>
+<p:sld xmlns:a="http://schemas.openxmlformats.org/drawingml/2006/main" xmlns:r="http://schemas.openxmlformats.org/officeDocument/2006/relationships" xmlns:p="http://schemas.openxmlformats.org/presentationml/2006/main">
+  <p:cSld>
+    <p:spTree>
+      <p:nvGrpSpPr>
+        <p:cNvPr id="1" name=""/>
+        <p:cNvGrpSpPr/>
+        <p:nvPr/>
+      </p:nvGrpSpPr>
+      <p:grpSpPr>
+        <a:xfrm>
+          <a:off x="0" y="0"/>
+          <a:ext cx="0" cy="0"/>
+          <a:chOff x="0" y="0"/>
+          <a:chExt cx="0" cy="0"/>
+        </a:xfrm>
+      </p:grpSpPr>
+      <p:sp>
+        <p:nvSpPr>
+          <p:cNvPr id="2" name="Title 1">
+            <a:extLst>
+              <a:ext uri="{FF2B5EF4-FFF2-40B4-BE49-F238E27FC236}">
+                <a16:creationId xmlns:a16="http://schemas.microsoft.com/office/drawing/2014/main" id="{55FC709F-AA0C-4631-9258-FE9EBED3D402}"/>
+              </a:ext>
+            </a:extLst>
+          </p:cNvPr>
+          <p:cNvSpPr>
+            <a:spLocks noGrp="1"/>
+          </p:cNvSpPr>
+          <p:nvPr>
+            <p:ph type="title"/>
+          </p:nvPr>
+        </p:nvSpPr>
+        <p:spPr/>
+        <p:txBody>
+          <a:bodyPr/>
+          <a:lstStyle/>
+          <a:p>
+            <a:r>
+              <a:rPr lang="en-US" dirty="0"/>
+              <a:t>Docker – application data</a:t>
+            </a:r>
+          </a:p>
+        </p:txBody>
+      </p:sp>
+      <p:sp>
+        <p:nvSpPr>
+          <p:cNvPr id="3" name="Content Placeholder 2">
+            <a:extLst>
+              <a:ext uri="{FF2B5EF4-FFF2-40B4-BE49-F238E27FC236}">
+                <a16:creationId xmlns:a16="http://schemas.microsoft.com/office/drawing/2014/main" id="{3222C25C-A151-4E2F-9DAD-C0964E88C089}"/>
+              </a:ext>
+            </a:extLst>
+          </p:cNvPr>
+          <p:cNvSpPr>
+            <a:spLocks noGrp="1"/>
+          </p:cNvSpPr>
+          <p:nvPr>
+            <p:ph idx="1"/>
+          </p:nvPr>
+        </p:nvSpPr>
+        <p:spPr/>
+        <p:txBody>
+          <a:bodyPr>
+            <a:normAutofit/>
+          </a:bodyPr>
+          <a:lstStyle/>
+          <a:p>
+            <a:r>
+              <a:rPr lang="en-US" dirty="0"/>
+              <a:t>Volumes</a:t>
+            </a:r>
+          </a:p>
+          <a:p>
+            <a:pPr lvl="1"/>
+            <a:r>
+              <a:rPr lang="en-US" dirty="0"/>
+              <a:t>file/directory on host machine is mounted into a container</a:t>
+            </a:r>
+          </a:p>
+          <a:p>
+            <a:pPr lvl="1"/>
+            <a:r>
+              <a:rPr lang="en-US" dirty="0"/>
+              <a:t>best choice for data storing</a:t>
+            </a:r>
+          </a:p>
+          <a:p>
+            <a:r>
+              <a:rPr lang="en-US" dirty="0"/>
+              <a:t>Bind mounts</a:t>
+            </a:r>
+          </a:p>
+          <a:p>
+            <a:pPr lvl="1"/>
+            <a:r>
+              <a:rPr lang="en-US" dirty="0"/>
+              <a:t>file/directory on host machine is mounted into a container</a:t>
+            </a:r>
+          </a:p>
+          <a:p>
+            <a:pPr lvl="1"/>
+            <a:r>
+              <a:rPr lang="en-US" dirty="0"/>
+              <a:t>Docker CLI cannot be used to manage bind-mounts</a:t>
+            </a:r>
+          </a:p>
+          <a:p>
+            <a:r>
+              <a:rPr lang="en-US" dirty="0" err="1"/>
+              <a:t>tmpfs</a:t>
+            </a:r>
+            <a:r>
+              <a:rPr lang="en-US" dirty="0"/>
+              <a:t> mounts</a:t>
+            </a:r>
+          </a:p>
+          <a:p>
+            <a:pPr lvl="1"/>
+            <a:r>
+              <a:rPr lang="en-US" dirty="0"/>
+              <a:t>stored in memory/swap (nor container R/W layer, nor host filesystem)</a:t>
+            </a:r>
+          </a:p>
+          <a:p>
+            <a:pPr lvl="1"/>
+            <a:r>
+              <a:rPr lang="en-US" dirty="0"/>
+              <a:t>cleared when container is stopped</a:t>
+            </a:r>
+          </a:p>
+        </p:txBody>
+      </p:sp>
+    </p:spTree>
+    <p:extLst>
+      <p:ext uri="{BB962C8B-B14F-4D97-AF65-F5344CB8AC3E}">
+        <p14:creationId xmlns:p14="http://schemas.microsoft.com/office/powerpoint/2010/main" val="3692977509"/>
+      </p:ext>
+    </p:extLst>
+  </p:cSld>
+  <p:clrMapOvr>
+    <a:masterClrMapping/>
+  </p:clrMapOvr>
+</p:sld>
+</file>
+
+<file path=ppt/slides/slide16.xml><?xml version="1.0" encoding="utf-8"?>
+<p:sld xmlns:a="http://schemas.openxmlformats.org/drawingml/2006/main" xmlns:r="http://schemas.openxmlformats.org/officeDocument/2006/relationships" xmlns:p="http://schemas.openxmlformats.org/presentationml/2006/main">
+  <p:cSld>
+    <p:spTree>
+      <p:nvGrpSpPr>
+        <p:cNvPr id="1" name=""/>
+        <p:cNvGrpSpPr/>
+        <p:nvPr/>
+      </p:nvGrpSpPr>
+      <p:grpSpPr>
+        <a:xfrm>
+          <a:off x="0" y="0"/>
+          <a:ext cx="0" cy="0"/>
+          <a:chOff x="0" y="0"/>
+          <a:chExt cx="0" cy="0"/>
+        </a:xfrm>
+      </p:grpSpPr>
+      <p:sp>
+        <p:nvSpPr>
+          <p:cNvPr id="2" name="Title 1">
+            <a:extLst>
+              <a:ext uri="{FF2B5EF4-FFF2-40B4-BE49-F238E27FC236}">
+                <a16:creationId xmlns:a16="http://schemas.microsoft.com/office/drawing/2014/main" id="{08578D90-C595-4221-9910-97011CA30B58}"/>
+              </a:ext>
+            </a:extLst>
+          </p:cNvPr>
+          <p:cNvSpPr>
+            <a:spLocks noGrp="1"/>
+          </p:cNvSpPr>
+          <p:nvPr>
+            <p:ph type="title"/>
+          </p:nvPr>
+        </p:nvSpPr>
+        <p:spPr/>
+        <p:txBody>
+          <a:bodyPr/>
+          <a:lstStyle/>
+          <a:p>
+            <a:r>
+              <a:rPr lang="en-US" dirty="0"/>
+              <a:t>Docker volumes</a:t>
+            </a:r>
+          </a:p>
+        </p:txBody>
+      </p:sp>
+      <p:sp>
+        <p:nvSpPr>
+          <p:cNvPr id="3" name="Content Placeholder 2">
+            <a:extLst>
+              <a:ext uri="{FF2B5EF4-FFF2-40B4-BE49-F238E27FC236}">
+                <a16:creationId xmlns:a16="http://schemas.microsoft.com/office/drawing/2014/main" id="{8F18DF23-793A-4C4C-93ED-F1508EF16A24}"/>
+              </a:ext>
+            </a:extLst>
+          </p:cNvPr>
+          <p:cNvSpPr>
+            <a:spLocks noGrp="1"/>
+          </p:cNvSpPr>
+          <p:nvPr>
+            <p:ph idx="1"/>
+          </p:nvPr>
+        </p:nvSpPr>
+        <p:spPr/>
+        <p:txBody>
+          <a:bodyPr>
+            <a:normAutofit/>
+          </a:bodyPr>
+          <a:lstStyle/>
+          <a:p>
+            <a:r>
+              <a:rPr lang="en-US" dirty="0"/>
+              <a:t>Recommended storage for writing data</a:t>
+            </a:r>
+          </a:p>
+          <a:p>
+            <a:r>
+              <a:rPr lang="en-US" dirty="0"/>
+              <a:t>/</a:t>
+            </a:r>
+            <a:r>
+              <a:rPr lang="en-US" dirty="0" err="1"/>
+              <a:t>var</a:t>
+            </a:r>
+            <a:r>
+              <a:rPr lang="en-US" dirty="0"/>
+              <a:t>/lib/docker/volumes/</a:t>
+            </a:r>
+          </a:p>
+          <a:p>
+            <a:r>
+              <a:rPr lang="en-US" dirty="0"/>
+              <a:t>Persistent</a:t>
+            </a:r>
+          </a:p>
+          <a:p>
+            <a:r>
+              <a:rPr lang="en-US" dirty="0"/>
+              <a:t>Shared between containers</a:t>
+            </a:r>
+          </a:p>
+          <a:p>
+            <a:r>
+              <a:rPr lang="en-US" dirty="0"/>
+              <a:t>Management through Docker CLI</a:t>
+            </a:r>
+          </a:p>
+          <a:p>
+            <a:r>
+              <a:rPr lang="en-US" dirty="0"/>
+              <a:t>Usages</a:t>
+            </a:r>
+          </a:p>
+          <a:p>
+            <a:pPr lvl="1"/>
+            <a:r>
+              <a:rPr lang="en-US" dirty="0"/>
+              <a:t>environment variables</a:t>
+            </a:r>
+          </a:p>
+          <a:p>
+            <a:pPr lvl="1"/>
+            <a:r>
+              <a:rPr lang="en-US" dirty="0"/>
+              <a:t>database</a:t>
+            </a:r>
+          </a:p>
+          <a:p>
+            <a:pPr lvl="1"/>
+            <a:r>
+              <a:rPr lang="en-US" dirty="0"/>
+              <a:t>…</a:t>
+            </a:r>
+          </a:p>
+        </p:txBody>
+      </p:sp>
+    </p:spTree>
+    <p:extLst>
+      <p:ext uri="{BB962C8B-B14F-4D97-AF65-F5344CB8AC3E}">
+        <p14:creationId xmlns:p14="http://schemas.microsoft.com/office/powerpoint/2010/main" val="2745753165"/>
+      </p:ext>
+    </p:extLst>
+  </p:cSld>
+  <p:clrMapOvr>
+    <a:masterClrMapping/>
+  </p:clrMapOvr>
+</p:sld>
+</file>
+
 <file path=ppt/slides/slide17.xml><?xml version="1.0" encoding="utf-8"?>
 <p:sld xmlns:a="http://schemas.openxmlformats.org/drawingml/2006/main" xmlns:r="http://schemas.openxmlformats.org/officeDocument/2006/relationships" xmlns:p="http://schemas.openxmlformats.org/presentationml/2006/main">
   <p:cSld>
@@ -4411,7 +4477,7 @@
           <p:cNvPr id="2" name="Title 1">
             <a:extLst>
               <a:ext uri="{FF2B5EF4-FFF2-40B4-BE49-F238E27FC236}">
-                <a16:creationId xmlns:a16="http://schemas.microsoft.com/office/drawing/2014/main" id="{4DA00555-4385-4FB6-AFB7-64E8E37A98D3}"/>
+                <a16:creationId xmlns:a16="http://schemas.microsoft.com/office/drawing/2014/main" id="{464CA198-CBF7-407B-B8A2-CA003AD7CB41}"/>
               </a:ext>
             </a:extLst>
           </p:cNvPr>
@@ -4427,10 +4493,7 @@
           <a:bodyPr/>
           <a:lstStyle/>
           <a:p>
-            <a:r>
-              <a:rPr lang="en-US" dirty="0"/>
-              <a:t>Docker - storage drivers</a:t>
-            </a:r>
+            <a:endParaRPr lang="en-US" dirty="0"/>
           </a:p>
         </p:txBody>
       </p:sp>
@@ -4439,7 +4502,7 @@
           <p:cNvPr id="3" name="Content Placeholder 2">
             <a:extLst>
               <a:ext uri="{FF2B5EF4-FFF2-40B4-BE49-F238E27FC236}">
-                <a16:creationId xmlns:a16="http://schemas.microsoft.com/office/drawing/2014/main" id="{59D54D27-EC9C-4D9B-9467-EB646BB762F2}"/>
+                <a16:creationId xmlns:a16="http://schemas.microsoft.com/office/drawing/2014/main" id="{C5FB6573-8C73-44D7-B5E6-65EBAF34FD85}"/>
               </a:ext>
             </a:extLst>
           </p:cNvPr>
@@ -4452,139 +4515,138 @@
         </p:nvSpPr>
         <p:spPr/>
         <p:txBody>
-          <a:bodyPr>
-            <a:normAutofit/>
-          </a:bodyPr>
-          <a:lstStyle/>
-          <a:p>
-            <a:r>
-              <a:rPr lang="en-US" dirty="0"/>
-              <a:t>Control how images and containers are stored (important)</a:t>
-            </a:r>
-          </a:p>
-          <a:p>
-            <a:r>
-              <a:rPr lang="en-US" dirty="0"/>
-              <a:t>More than one is supported</a:t>
-            </a:r>
-          </a:p>
-          <a:p>
-            <a:r>
-              <a:rPr lang="en-US" dirty="0"/>
-              <a:t>overlay 2 , </a:t>
-            </a:r>
-            <a:r>
-              <a:rPr lang="en-US" dirty="0" err="1"/>
-              <a:t>aufs</a:t>
-            </a:r>
-            <a:r>
-              <a:rPr lang="en-US" dirty="0"/>
-              <a:t>, </a:t>
-            </a:r>
-            <a:r>
-              <a:rPr lang="en-US" dirty="0" err="1"/>
-              <a:t>devicemapper</a:t>
-            </a:r>
-            <a:r>
-              <a:rPr lang="en-US" dirty="0"/>
-              <a:t>, </a:t>
-            </a:r>
-            <a:r>
-              <a:rPr lang="en-US" dirty="0" err="1"/>
-              <a:t>vfs</a:t>
-            </a:r>
-            <a:r>
-              <a:rPr lang="en-US" dirty="0"/>
-              <a:t>, </a:t>
-            </a:r>
-            <a:r>
-              <a:rPr lang="en-US" dirty="0" err="1"/>
-              <a:t>zfs</a:t>
-            </a:r>
-            <a:r>
-              <a:rPr lang="en-US" dirty="0"/>
-              <a:t>, </a:t>
-            </a:r>
-            <a:r>
-              <a:rPr lang="en-US" dirty="0" err="1"/>
-              <a:t>brtfs</a:t>
-            </a:r>
-            <a:r>
-              <a:rPr lang="en-US" dirty="0"/>
-              <a:t> …</a:t>
-            </a:r>
-          </a:p>
-          <a:p>
-            <a:pPr lvl="1"/>
-            <a:r>
-              <a:rPr lang="en-US" dirty="0"/>
-              <a:t>Priority list – depend also on </a:t>
-            </a:r>
-            <a:r>
-              <a:rPr lang="en-US" dirty="0" err="1"/>
-              <a:t>linux</a:t>
-            </a:r>
-            <a:r>
-              <a:rPr lang="en-US" dirty="0"/>
-              <a:t> distribution (Ubuntu vs. Fedora)</a:t>
-            </a:r>
-          </a:p>
-          <a:p>
-            <a:pPr lvl="1"/>
-            <a:r>
-              <a:rPr lang="en-US" dirty="0"/>
-              <a:t>Can be modified (except for Windows and Mac)</a:t>
-            </a:r>
-          </a:p>
-          <a:p>
-            <a:pPr lvl="1"/>
-            <a:r>
-              <a:rPr lang="en-US" dirty="0"/>
-              <a:t>File level (</a:t>
-            </a:r>
-            <a:r>
-              <a:rPr lang="en-US" dirty="0" err="1"/>
-              <a:t>aufs</a:t>
-            </a:r>
-            <a:r>
-              <a:rPr lang="en-US" dirty="0"/>
-              <a:t>, overlay 2, …) vs. Block level (</a:t>
-            </a:r>
-            <a:r>
-              <a:rPr lang="en-US" dirty="0" err="1"/>
-              <a:t>brtfs</a:t>
-            </a:r>
-            <a:r>
-              <a:rPr lang="en-US" dirty="0"/>
-              <a:t>, </a:t>
-            </a:r>
-            <a:r>
-              <a:rPr lang="en-US" dirty="0" err="1"/>
-              <a:t>zfs</a:t>
-            </a:r>
-            <a:r>
-              <a:rPr lang="en-US" dirty="0"/>
-              <a:t>, …)</a:t>
-            </a:r>
-          </a:p>
-          <a:p>
-            <a:pPr marL="457200" lvl="1" indent="0">
+          <a:bodyPr/>
+          <a:lstStyle/>
+          <a:p>
+            <a:pPr marL="0" indent="0">
               <a:buNone/>
             </a:pPr>
             <a:endParaRPr lang="en-US" dirty="0"/>
           </a:p>
           <a:p>
-            <a:pPr marL="457200" lvl="1" indent="0">
+            <a:pPr marL="0" indent="0">
               <a:buNone/>
             </a:pPr>
             <a:endParaRPr lang="en-US" dirty="0"/>
+          </a:p>
+          <a:p>
+            <a:pPr marL="0" indent="0">
+              <a:buNone/>
+            </a:pPr>
+            <a:endParaRPr lang="en-US" dirty="0"/>
+          </a:p>
+          <a:p>
+            <a:pPr marL="0" indent="0" algn="ctr">
+              <a:buNone/>
+            </a:pPr>
+            <a:r>
+              <a:rPr lang="en-US" sz="4800" dirty="0"/>
+              <a:t>MariaDB example</a:t>
+            </a:r>
+          </a:p>
+        </p:txBody>
+      </p:sp>
+      <p:sp>
+        <p:nvSpPr>
+          <p:cNvPr id="4" name="TextBox 3">
+            <a:extLst>
+              <a:ext uri="{FF2B5EF4-FFF2-40B4-BE49-F238E27FC236}">
+                <a16:creationId xmlns:a16="http://schemas.microsoft.com/office/drawing/2014/main" id="{83E2DF29-AB33-496B-BAE8-521C2E7569EF}"/>
+              </a:ext>
+            </a:extLst>
+          </p:cNvPr>
+          <p:cNvSpPr txBox="1"/>
+          <p:nvPr/>
+        </p:nvSpPr>
+        <p:spPr>
+          <a:xfrm>
+            <a:off x="0" y="5666384"/>
+            <a:ext cx="9118833" cy="1200329"/>
+          </a:xfrm>
+          <a:prstGeom prst="rect">
+            <a:avLst/>
+          </a:prstGeom>
+          <a:noFill/>
+        </p:spPr>
+        <p:txBody>
+          <a:bodyPr wrap="square" rtlCol="0">
+            <a:spAutoFit/>
+          </a:bodyPr>
+          <a:lstStyle/>
+          <a:p>
+            <a:r>
+              <a:rPr lang="en-US" i="1" dirty="0">
+                <a:solidFill>
+                  <a:schemeClr val="accent2">
+                    <a:lumMod val="75000"/>
+                  </a:schemeClr>
+                </a:solidFill>
+              </a:rPr>
+              <a:t>docker volume</a:t>
+            </a:r>
+          </a:p>
+          <a:p>
+            <a:r>
+              <a:rPr lang="en-US" i="1" dirty="0">
+                <a:solidFill>
+                  <a:schemeClr val="accent2">
+                    <a:lumMod val="75000"/>
+                  </a:schemeClr>
+                </a:solidFill>
+              </a:rPr>
+              <a:t>docker inspect</a:t>
+            </a:r>
+          </a:p>
+          <a:p>
+            <a:r>
+              <a:rPr lang="en-US" i="1" dirty="0">
+                <a:solidFill>
+                  <a:schemeClr val="accent2">
+                    <a:lumMod val="75000"/>
+                  </a:schemeClr>
+                </a:solidFill>
+              </a:rPr>
+              <a:t>docker --mount source=</a:t>
+            </a:r>
+            <a:r>
+              <a:rPr lang="en-US" i="1" dirty="0" err="1">
+                <a:solidFill>
+                  <a:schemeClr val="accent2">
+                    <a:lumMod val="75000"/>
+                  </a:schemeClr>
+                </a:solidFill>
+              </a:rPr>
+              <a:t>volume_name,target</a:t>
+            </a:r>
+            <a:r>
+              <a:rPr lang="en-US" i="1" dirty="0">
+                <a:solidFill>
+                  <a:schemeClr val="accent2">
+                    <a:lumMod val="75000"/>
+                  </a:schemeClr>
+                </a:solidFill>
+              </a:rPr>
+              <a:t>=/path</a:t>
+            </a:r>
+          </a:p>
+          <a:p>
+            <a:r>
+              <a:rPr lang="en-US" i="1" dirty="0">
+                <a:solidFill>
+                  <a:schemeClr val="accent2">
+                    <a:lumMod val="75000"/>
+                  </a:schemeClr>
+                </a:solidFill>
+              </a:rPr>
+              <a:t>docker volume create</a:t>
+            </a:r>
           </a:p>
         </p:txBody>
       </p:sp>
     </p:spTree>
     <p:extLst>
       <p:ext uri="{BB962C8B-B14F-4D97-AF65-F5344CB8AC3E}">
-        <p14:creationId xmlns:p14="http://schemas.microsoft.com/office/powerpoint/2010/main" val="1018560530"/>
+        <p14:creationId xmlns:p14="http://schemas.microsoft.com/office/powerpoint/2010/main" val="3335794604"/>
       </p:ext>
     </p:extLst>
   </p:cSld>
@@ -4697,7 +4759,14 @@
             <a:pPr lvl="2"/>
             <a:r>
               <a:rPr lang="en-US" dirty="0"/>
-              <a:t>for swarm services</a:t>
+              <a:t>host’s network is used directly</a:t>
+            </a:r>
+          </a:p>
+          <a:p>
+            <a:pPr lvl="2"/>
+            <a:r>
+              <a:rPr lang="en-US" dirty="0"/>
+              <a:t>available for swarm services</a:t>
             </a:r>
           </a:p>
           <a:p>
@@ -4816,7 +4885,7 @@
           <a:p>
             <a:r>
               <a:rPr lang="en-US" dirty="0"/>
-              <a:t>communication between containers on the same docker daemon</a:t>
+              <a:t>communication between containers on the same docker host</a:t>
             </a:r>
           </a:p>
           <a:p>
@@ -4836,7 +4905,7 @@
             <a:pPr lvl="1"/>
             <a:r>
               <a:rPr lang="en-US" dirty="0"/>
-              <a:t>Communication via IP address</a:t>
+              <a:t>communication via IP address</a:t>
             </a:r>
           </a:p>
           <a:p>
@@ -4867,15 +4936,7 @@
             <a:pPr lvl="1"/>
             <a:r>
               <a:rPr lang="en-US" dirty="0"/>
-              <a:t>communication via </a:t>
-            </a:r>
-            <a:r>
-              <a:rPr lang="en-US" dirty="0" err="1"/>
-              <a:t>cotainer</a:t>
-            </a:r>
-            <a:r>
-              <a:rPr lang="en-US" dirty="0"/>
-              <a:t> name</a:t>
+              <a:t>communication via container name</a:t>
             </a:r>
           </a:p>
           <a:p>
@@ -4964,7 +5025,7 @@
         <p:spPr/>
         <p:txBody>
           <a:bodyPr>
-            <a:normAutofit lnSpcReduction="10000"/>
+            <a:normAutofit/>
           </a:bodyPr>
           <a:lstStyle/>
           <a:p>
@@ -5000,37 +5061,34 @@
             </a:r>
           </a:p>
           <a:p>
-            <a:pPr marL="457200" lvl="1" indent="0">
+            <a:pPr marL="0" indent="0">
               <a:buNone/>
             </a:pPr>
+            <a:r>
+              <a:rPr lang="en-US" dirty="0"/>
+              <a:t>Benefits:</a:t>
+            </a:r>
+          </a:p>
+          <a:p>
+            <a:r>
+              <a:rPr lang="en-US" dirty="0"/>
+              <a:t>Consistent environment</a:t>
+            </a:r>
+          </a:p>
+          <a:p>
+            <a:r>
+              <a:rPr lang="en-US" dirty="0"/>
+              <a:t>Run anywhere (portability)</a:t>
+            </a:r>
+          </a:p>
+          <a:p>
+            <a:r>
+              <a:rPr lang="en-US" dirty="0"/>
+              <a:t>Isolation (cleanup, uncontrolled resource usage, …)</a:t>
+            </a:r>
+          </a:p>
+          <a:p>
             <a:endParaRPr lang="en-US" dirty="0"/>
-          </a:p>
-          <a:p>
-            <a:pPr marL="0" indent="0">
-              <a:buNone/>
-            </a:pPr>
-            <a:r>
-              <a:rPr lang="en-US" dirty="0"/>
-              <a:t>Benefits:</a:t>
-            </a:r>
-          </a:p>
-          <a:p>
-            <a:r>
-              <a:rPr lang="en-US" dirty="0"/>
-              <a:t>Consistent environment</a:t>
-            </a:r>
-          </a:p>
-          <a:p>
-            <a:r>
-              <a:rPr lang="en-US" dirty="0"/>
-              <a:t>Run anywhere</a:t>
-            </a:r>
-          </a:p>
-          <a:p>
-            <a:r>
-              <a:rPr lang="en-US" dirty="0"/>
-              <a:t>Isolation</a:t>
-            </a:r>
           </a:p>
           <a:p>
             <a:pPr lvl="1"/>
@@ -5073,7 +5131,7 @@
           <p:cNvPr id="2" name="Title 1">
             <a:extLst>
               <a:ext uri="{FF2B5EF4-FFF2-40B4-BE49-F238E27FC236}">
-                <a16:creationId xmlns:a16="http://schemas.microsoft.com/office/drawing/2014/main" id="{464CA198-CBF7-407B-B8A2-CA003AD7CB41}"/>
+                <a16:creationId xmlns:a16="http://schemas.microsoft.com/office/drawing/2014/main" id="{08164F56-94C2-49D0-9A26-CBAFAF8A5F53}"/>
               </a:ext>
             </a:extLst>
           </p:cNvPr>
@@ -5089,172 +5147,91 @@
           <a:bodyPr/>
           <a:lstStyle/>
           <a:p>
+            <a:r>
+              <a:rPr lang="en-US" dirty="0"/>
+              <a:t>Docker networking</a:t>
+            </a:r>
+          </a:p>
+        </p:txBody>
+      </p:sp>
+      <p:sp>
+        <p:nvSpPr>
+          <p:cNvPr id="3" name="Content Placeholder 2">
+            <a:extLst>
+              <a:ext uri="{FF2B5EF4-FFF2-40B4-BE49-F238E27FC236}">
+                <a16:creationId xmlns:a16="http://schemas.microsoft.com/office/drawing/2014/main" id="{53676A56-9A6B-458A-BBD3-A327BD173BC3}"/>
+              </a:ext>
+            </a:extLst>
+          </p:cNvPr>
+          <p:cNvSpPr>
+            <a:spLocks noGrp="1"/>
+          </p:cNvSpPr>
+          <p:nvPr>
+            <p:ph idx="1"/>
+          </p:nvPr>
+        </p:nvSpPr>
+        <p:spPr/>
+        <p:txBody>
+          <a:bodyPr>
+            <a:normAutofit/>
+          </a:bodyPr>
+          <a:lstStyle/>
+          <a:p>
+            <a:r>
+              <a:rPr lang="en-US" dirty="0"/>
+              <a:t>Containers have their own IPs (not accessible from outside)</a:t>
+            </a:r>
+          </a:p>
+          <a:p>
+            <a:pPr lvl="1"/>
+            <a:r>
+              <a:rPr lang="en-US" dirty="0"/>
+              <a:t>outgoing connections are allowed</a:t>
+            </a:r>
+          </a:p>
+          <a:p>
+            <a:r>
+              <a:rPr lang="en-US" dirty="0"/>
+              <a:t>Container MAC address is generated from its IP</a:t>
+            </a:r>
+          </a:p>
+          <a:p>
+            <a:r>
+              <a:rPr lang="en-US" dirty="0"/>
+              <a:t>DNS is the same as host uses</a:t>
+            </a:r>
+          </a:p>
+          <a:p>
+            <a:r>
+              <a:rPr lang="en-US" dirty="0"/>
+              <a:t>Docker host has IP (can be accessed from outside)</a:t>
+            </a:r>
+          </a:p>
+          <a:p>
             <a:endParaRPr lang="en-US" dirty="0"/>
           </a:p>
-        </p:txBody>
-      </p:sp>
-      <p:sp>
-        <p:nvSpPr>
-          <p:cNvPr id="3" name="Content Placeholder 2">
-            <a:extLst>
-              <a:ext uri="{FF2B5EF4-FFF2-40B4-BE49-F238E27FC236}">
-                <a16:creationId xmlns:a16="http://schemas.microsoft.com/office/drawing/2014/main" id="{C5FB6573-8C73-44D7-B5E6-65EBAF34FD85}"/>
-              </a:ext>
-            </a:extLst>
-          </p:cNvPr>
-          <p:cNvSpPr>
-            <a:spLocks noGrp="1"/>
-          </p:cNvSpPr>
-          <p:nvPr>
-            <p:ph idx="1"/>
-          </p:nvPr>
-        </p:nvSpPr>
-        <p:spPr/>
-        <p:txBody>
-          <a:bodyPr/>
-          <a:lstStyle/>
-          <a:p>
-            <a:pPr marL="0" indent="0">
-              <a:buNone/>
-            </a:pPr>
+          <a:p>
+            <a:r>
+              <a:rPr lang="en-US" dirty="0"/>
+              <a:t>Port binding (port forwarding)</a:t>
+            </a:r>
+          </a:p>
+          <a:p>
+            <a:pPr lvl="1"/>
+            <a:r>
+              <a:rPr lang="en-US" dirty="0"/>
+              <a:t>must be set during creation</a:t>
+            </a:r>
+          </a:p>
+          <a:p>
             <a:endParaRPr lang="en-US" dirty="0"/>
-          </a:p>
-          <a:p>
-            <a:pPr marL="0" indent="0">
-              <a:buNone/>
-            </a:pPr>
-            <a:endParaRPr lang="en-US" dirty="0"/>
-          </a:p>
-          <a:p>
-            <a:pPr marL="0" indent="0">
-              <a:buNone/>
-            </a:pPr>
-            <a:endParaRPr lang="en-US" dirty="0"/>
-          </a:p>
-          <a:p>
-            <a:pPr marL="0" indent="0" algn="ctr">
-              <a:buNone/>
-            </a:pPr>
-            <a:r>
-              <a:rPr lang="en-US" sz="4800" dirty="0"/>
-              <a:t>MariaDB example</a:t>
-            </a:r>
-          </a:p>
-        </p:txBody>
-      </p:sp>
-      <p:sp>
-        <p:nvSpPr>
-          <p:cNvPr id="4" name="TextBox 3">
-            <a:extLst>
-              <a:ext uri="{FF2B5EF4-FFF2-40B4-BE49-F238E27FC236}">
-                <a16:creationId xmlns:a16="http://schemas.microsoft.com/office/drawing/2014/main" id="{AF9FF586-EB8B-4FCB-B32C-5ED37D449B20}"/>
-              </a:ext>
-            </a:extLst>
-          </p:cNvPr>
-          <p:cNvSpPr txBox="1"/>
-          <p:nvPr/>
-        </p:nvSpPr>
-        <p:spPr>
-          <a:xfrm>
-            <a:off x="0" y="4852653"/>
-            <a:ext cx="9118833" cy="1477328"/>
-          </a:xfrm>
-          <a:prstGeom prst="rect">
-            <a:avLst/>
-          </a:prstGeom>
-          <a:noFill/>
-        </p:spPr>
-        <p:txBody>
-          <a:bodyPr wrap="square" rtlCol="0">
-            <a:spAutoFit/>
-          </a:bodyPr>
-          <a:lstStyle/>
-          <a:p>
-            <a:r>
-              <a:rPr lang="en-US" i="1" dirty="0">
-                <a:solidFill>
-                  <a:schemeClr val="accent2">
-                    <a:lumMod val="75000"/>
-                  </a:schemeClr>
-                </a:solidFill>
-              </a:rPr>
-              <a:t>docker network create</a:t>
-            </a:r>
-          </a:p>
-          <a:p>
-            <a:r>
-              <a:rPr lang="en-US" i="1" dirty="0">
-                <a:solidFill>
-                  <a:schemeClr val="accent2">
-                    <a:lumMod val="75000"/>
-                  </a:schemeClr>
-                </a:solidFill>
-              </a:rPr>
-              <a:t>docker network inspect</a:t>
-            </a:r>
-          </a:p>
-          <a:p>
-            <a:r>
-              <a:rPr lang="en-US" i="1" dirty="0">
-                <a:solidFill>
-                  <a:schemeClr val="accent2">
-                    <a:lumMod val="75000"/>
-                  </a:schemeClr>
-                </a:solidFill>
-              </a:rPr>
-              <a:t>docker network connect</a:t>
-            </a:r>
-          </a:p>
-          <a:p>
-            <a:r>
-              <a:rPr lang="en-US" i="1" dirty="0">
-                <a:solidFill>
-                  <a:schemeClr val="accent2">
-                    <a:lumMod val="75000"/>
-                  </a:schemeClr>
-                </a:solidFill>
-              </a:rPr>
-              <a:t>docker --mount source=</a:t>
-            </a:r>
-            <a:r>
-              <a:rPr lang="en-US" i="1" dirty="0" err="1">
-                <a:solidFill>
-                  <a:schemeClr val="accent2">
-                    <a:lumMod val="75000"/>
-                  </a:schemeClr>
-                </a:solidFill>
-              </a:rPr>
-              <a:t>volume_name,target</a:t>
-            </a:r>
-            <a:r>
-              <a:rPr lang="en-US" i="1" dirty="0">
-                <a:solidFill>
-                  <a:schemeClr val="accent2">
-                    <a:lumMod val="75000"/>
-                  </a:schemeClr>
-                </a:solidFill>
-              </a:rPr>
-              <a:t>=/path</a:t>
-            </a:r>
-          </a:p>
-          <a:p>
-            <a:r>
-              <a:rPr lang="en-US" i="1" dirty="0">
-                <a:solidFill>
-                  <a:schemeClr val="accent2">
-                    <a:lumMod val="75000"/>
-                  </a:schemeClr>
-                </a:solidFill>
-              </a:rPr>
-              <a:t>docker volume create</a:t>
-            </a:r>
           </a:p>
         </p:txBody>
       </p:sp>
     </p:spTree>
     <p:extLst>
       <p:ext uri="{BB962C8B-B14F-4D97-AF65-F5344CB8AC3E}">
-        <p14:creationId xmlns:p14="http://schemas.microsoft.com/office/powerpoint/2010/main" val="956687476"/>
+        <p14:creationId xmlns:p14="http://schemas.microsoft.com/office/powerpoint/2010/main" val="2296211017"/>
       </p:ext>
     </p:extLst>
   </p:cSld>
@@ -5286,7 +5263,7 @@
           <p:cNvPr id="2" name="Title 1">
             <a:extLst>
               <a:ext uri="{FF2B5EF4-FFF2-40B4-BE49-F238E27FC236}">
-                <a16:creationId xmlns:a16="http://schemas.microsoft.com/office/drawing/2014/main" id="{08164F56-94C2-49D0-9A26-CBAFAF8A5F53}"/>
+                <a16:creationId xmlns:a16="http://schemas.microsoft.com/office/drawing/2014/main" id="{464CA198-CBF7-407B-B8A2-CA003AD7CB41}"/>
               </a:ext>
             </a:extLst>
           </p:cNvPr>
@@ -5302,10 +5279,7 @@
           <a:bodyPr/>
           <a:lstStyle/>
           <a:p>
-            <a:r>
-              <a:rPr lang="en-US" dirty="0"/>
-              <a:t>Docker networking</a:t>
-            </a:r>
+            <a:endParaRPr lang="en-US" dirty="0"/>
           </a:p>
         </p:txBody>
       </p:sp>
@@ -5314,7 +5288,7 @@
           <p:cNvPr id="3" name="Content Placeholder 2">
             <a:extLst>
               <a:ext uri="{FF2B5EF4-FFF2-40B4-BE49-F238E27FC236}">
-                <a16:creationId xmlns:a16="http://schemas.microsoft.com/office/drawing/2014/main" id="{53676A56-9A6B-458A-BBD3-A327BD173BC3}"/>
+                <a16:creationId xmlns:a16="http://schemas.microsoft.com/office/drawing/2014/main" id="{C5FB6573-8C73-44D7-B5E6-65EBAF34FD85}"/>
               </a:ext>
             </a:extLst>
           </p:cNvPr>
@@ -5327,61 +5301,128 @@
         </p:nvSpPr>
         <p:spPr/>
         <p:txBody>
-          <a:bodyPr>
-            <a:normAutofit/>
+          <a:bodyPr/>
+          <a:lstStyle/>
+          <a:p>
+            <a:pPr marL="0" indent="0">
+              <a:buNone/>
+            </a:pPr>
+            <a:endParaRPr lang="en-US" dirty="0"/>
+          </a:p>
+          <a:p>
+            <a:pPr marL="0" indent="0">
+              <a:buNone/>
+            </a:pPr>
+            <a:endParaRPr lang="en-US" dirty="0"/>
+          </a:p>
+          <a:p>
+            <a:pPr marL="0" indent="0">
+              <a:buNone/>
+            </a:pPr>
+            <a:endParaRPr lang="en-US" dirty="0"/>
+          </a:p>
+          <a:p>
+            <a:pPr marL="0" indent="0" algn="ctr">
+              <a:buNone/>
+            </a:pPr>
+            <a:r>
+              <a:rPr lang="en-US" sz="4800" dirty="0"/>
+              <a:t>MariaDB example</a:t>
+            </a:r>
+          </a:p>
+        </p:txBody>
+      </p:sp>
+      <p:sp>
+        <p:nvSpPr>
+          <p:cNvPr id="4" name="TextBox 3">
+            <a:extLst>
+              <a:ext uri="{FF2B5EF4-FFF2-40B4-BE49-F238E27FC236}">
+                <a16:creationId xmlns:a16="http://schemas.microsoft.com/office/drawing/2014/main" id="{AF9FF586-EB8B-4FCB-B32C-5ED37D449B20}"/>
+              </a:ext>
+            </a:extLst>
+          </p:cNvPr>
+          <p:cNvSpPr txBox="1"/>
+          <p:nvPr/>
+        </p:nvSpPr>
+        <p:spPr>
+          <a:xfrm>
+            <a:off x="0" y="4852653"/>
+            <a:ext cx="9118833" cy="1200329"/>
+          </a:xfrm>
+          <a:prstGeom prst="rect">
+            <a:avLst/>
+          </a:prstGeom>
+          <a:noFill/>
+        </p:spPr>
+        <p:txBody>
+          <a:bodyPr wrap="square" rtlCol="0">
+            <a:spAutoFit/>
           </a:bodyPr>
           <a:lstStyle/>
           <a:p>
             <a:r>
-              <a:rPr lang="en-US" dirty="0"/>
-              <a:t>Containers have their own IPs (not accessible from outside)</a:t>
-            </a:r>
-          </a:p>
-          <a:p>
-            <a:r>
-              <a:rPr lang="en-US" dirty="0"/>
-              <a:t>Container MAC address is generated from its IP</a:t>
-            </a:r>
-          </a:p>
-          <a:p>
-            <a:r>
-              <a:rPr lang="en-US" dirty="0"/>
-              <a:t>DNS is the same as host uses</a:t>
-            </a:r>
-          </a:p>
-          <a:p>
-            <a:r>
-              <a:rPr lang="en-US" dirty="0"/>
-              <a:t>Docker host has IP (can be accessed from outside)</a:t>
-            </a:r>
-          </a:p>
-          <a:p>
-            <a:endParaRPr lang="en-US" dirty="0"/>
-          </a:p>
-          <a:p>
-            <a:r>
-              <a:rPr lang="en-US" dirty="0"/>
-              <a:t>Port binding (port forwarding)</a:t>
-            </a:r>
-          </a:p>
-          <a:p>
-            <a:pPr marL="0" indent="0">
-              <a:buNone/>
-            </a:pPr>
-            <a:r>
-              <a:rPr lang="en-US" dirty="0"/>
-              <a:t>- P option</a:t>
-            </a:r>
-          </a:p>
-          <a:p>
-            <a:endParaRPr lang="en-US" dirty="0"/>
+              <a:rPr lang="en-US" i="1" dirty="0">
+                <a:solidFill>
+                  <a:schemeClr val="accent2">
+                    <a:lumMod val="75000"/>
+                  </a:schemeClr>
+                </a:solidFill>
+              </a:rPr>
+              <a:t>docker network create</a:t>
+            </a:r>
+          </a:p>
+          <a:p>
+            <a:r>
+              <a:rPr lang="en-US" i="1" dirty="0">
+                <a:solidFill>
+                  <a:schemeClr val="accent2">
+                    <a:lumMod val="75000"/>
+                  </a:schemeClr>
+                </a:solidFill>
+              </a:rPr>
+              <a:t>docker network inspect</a:t>
+            </a:r>
+          </a:p>
+          <a:p>
+            <a:r>
+              <a:rPr lang="en-US" i="1" dirty="0">
+                <a:solidFill>
+                  <a:schemeClr val="accent2">
+                    <a:lumMod val="75000"/>
+                  </a:schemeClr>
+                </a:solidFill>
+              </a:rPr>
+              <a:t>docker network connect</a:t>
+            </a:r>
+          </a:p>
+          <a:p>
+            <a:r>
+              <a:rPr lang="en-US" i="1">
+                <a:solidFill>
+                  <a:schemeClr val="accent2">
+                    <a:lumMod val="75000"/>
+                  </a:schemeClr>
+                </a:solidFill>
+              </a:rPr>
+              <a:t>docker -p</a:t>
+            </a:r>
+            <a:r>
+              <a:rPr lang="en-US" i="1" dirty="0">
+                <a:solidFill>
+                  <a:schemeClr val="accent2">
+                    <a:lumMod val="75000"/>
+                  </a:schemeClr>
+                </a:solidFill>
+              </a:rPr>
+              <a:t>:8080:80</a:t>
+            </a:r>
           </a:p>
         </p:txBody>
       </p:sp>
     </p:spTree>
     <p:extLst>
       <p:ext uri="{BB962C8B-B14F-4D97-AF65-F5344CB8AC3E}">
-        <p14:creationId xmlns:p14="http://schemas.microsoft.com/office/powerpoint/2010/main" val="2296211017"/>
+        <p14:creationId xmlns:p14="http://schemas.microsoft.com/office/powerpoint/2010/main" val="956687476"/>
       </p:ext>
     </p:extLst>
   </p:cSld>
@@ -6291,8 +6332,20 @@
             <a:pPr lvl="1"/>
             <a:r>
               <a:rPr lang="en-US" dirty="0"/>
-              <a:t>Build from docker file</a:t>
-            </a:r>
+              <a:t>“snapshot” of container, immutable</a:t>
+            </a:r>
+          </a:p>
+          <a:p>
+            <a:pPr lvl="1"/>
+            <a:r>
+              <a:rPr lang="en-US" dirty="0"/>
+              <a:t>build from </a:t>
+            </a:r>
+            <a:r>
+              <a:rPr lang="en-US" dirty="0" err="1"/>
+              <a:t>dockerfile</a:t>
+            </a:r>
+            <a:endParaRPr lang="en-US" dirty="0"/>
           </a:p>
           <a:p>
             <a:r>
@@ -6304,14 +6357,7 @@
             <a:pPr lvl="1"/>
             <a:r>
               <a:rPr lang="en-US" dirty="0"/>
-              <a:t>Becomes from executed image</a:t>
-            </a:r>
-          </a:p>
-          <a:p>
-            <a:pPr lvl="1"/>
-            <a:r>
-              <a:rPr lang="en-US" dirty="0"/>
-              <a:t>Applications are running in containers</a:t>
+              <a:t>Instance of image</a:t>
             </a:r>
           </a:p>
           <a:p>
@@ -6474,8 +6520,8 @@
         </p:nvSpPr>
         <p:spPr>
           <a:xfrm>
-            <a:off x="0" y="5103674"/>
-            <a:ext cx="9118833" cy="1754326"/>
+            <a:off x="0" y="4826675"/>
+            <a:ext cx="9118833" cy="2031325"/>
           </a:xfrm>
           <a:prstGeom prst="rect">
             <a:avLst/>
@@ -6552,7 +6598,7 @@
                   </a:schemeClr>
                 </a:solidFill>
               </a:rPr>
-              <a:t>docker start</a:t>
+              <a:t>docker run</a:t>
             </a:r>
           </a:p>
           <a:p>
@@ -6564,7 +6610,7 @@
                   </a:schemeClr>
                 </a:solidFill>
               </a:rPr>
-              <a:t>docker run</a:t>
+              <a:t>docker start</a:t>
             </a:r>
           </a:p>
           <a:p>
@@ -6577,6 +6623,58 @@
                 </a:solidFill>
               </a:rPr>
               <a:t>docker stop</a:t>
+            </a:r>
+          </a:p>
+          <a:p>
+            <a:r>
+              <a:rPr lang="en-US" i="1" dirty="0">
+                <a:solidFill>
+                  <a:schemeClr val="accent2">
+                    <a:lumMod val="75000"/>
+                  </a:schemeClr>
+                </a:solidFill>
+              </a:rPr>
+              <a:t>docker </a:t>
+            </a:r>
+            <a:r>
+              <a:rPr lang="en-US" i="1" dirty="0" err="1">
+                <a:solidFill>
+                  <a:schemeClr val="accent2">
+                    <a:lumMod val="75000"/>
+                  </a:schemeClr>
+                </a:solidFill>
+              </a:rPr>
+              <a:t>rm</a:t>
+            </a:r>
+            <a:r>
+              <a:rPr lang="en-US" i="1" dirty="0">
+                <a:solidFill>
+                  <a:schemeClr val="accent2">
+                    <a:lumMod val="75000"/>
+                  </a:schemeClr>
+                </a:solidFill>
+              </a:rPr>
+              <a:t>(</a:t>
+            </a:r>
+            <a:r>
+              <a:rPr lang="en-US" i="1" dirty="0" err="1">
+                <a:solidFill>
+                  <a:schemeClr val="accent2">
+                    <a:lumMod val="75000"/>
+                  </a:schemeClr>
+                </a:solidFill>
+              </a:rPr>
+              <a:t>i</a:t>
+            </a:r>
+            <a:r>
+              <a:rPr lang="en-US" i="1" dirty="0">
+                <a:solidFill>
+                  <a:schemeClr val="accent2">
+                    <a:lumMod val="75000"/>
+                  </a:schemeClr>
+                </a:solidFill>
+              </a:rPr>
+              <a:t>)</a:t>
             </a:r>
           </a:p>
         </p:txBody>

</xml_diff>

<commit_message>
update docker intro presentation
</commit_message>
<xml_diff>
--- a/src/_data/docker.pptx
+++ b/src/_data/docker.pptx
@@ -22,12 +22,13 @@
     <p:sldId id="268" r:id="rId16"/>
     <p:sldId id="266" r:id="rId17"/>
     <p:sldId id="279" r:id="rId18"/>
-    <p:sldId id="269" r:id="rId19"/>
-    <p:sldId id="274" r:id="rId20"/>
-    <p:sldId id="275" r:id="rId21"/>
+    <p:sldId id="275" r:id="rId19"/>
+    <p:sldId id="269" r:id="rId20"/>
+    <p:sldId id="274" r:id="rId21"/>
     <p:sldId id="280" r:id="rId22"/>
     <p:sldId id="259" r:id="rId23"/>
     <p:sldId id="270" r:id="rId24"/>
+    <p:sldId id="282" r:id="rId25"/>
   </p:sldIdLst>
   <p:sldSz cx="12192000" cy="6858000"/>
   <p:notesSz cx="6858000" cy="9144000"/>
@@ -281,7 +282,7 @@
           <a:p>
             <a:fld id="{D697FA50-5596-4026-B625-4A0202262A1E}" type="datetimeFigureOut">
               <a:rPr lang="en-US" smtClean="0"/>
-              <a:t>3/11/2018</a:t>
+              <a:t>3/12/2018</a:t>
             </a:fld>
             <a:endParaRPr lang="en-US"/>
           </a:p>
@@ -479,7 +480,7 @@
           <a:p>
             <a:fld id="{D697FA50-5596-4026-B625-4A0202262A1E}" type="datetimeFigureOut">
               <a:rPr lang="en-US" smtClean="0"/>
-              <a:t>3/11/2018</a:t>
+              <a:t>3/12/2018</a:t>
             </a:fld>
             <a:endParaRPr lang="en-US"/>
           </a:p>
@@ -687,7 +688,7 @@
           <a:p>
             <a:fld id="{D697FA50-5596-4026-B625-4A0202262A1E}" type="datetimeFigureOut">
               <a:rPr lang="en-US" smtClean="0"/>
-              <a:t>3/11/2018</a:t>
+              <a:t>3/12/2018</a:t>
             </a:fld>
             <a:endParaRPr lang="en-US"/>
           </a:p>
@@ -885,7 +886,7 @@
           <a:p>
             <a:fld id="{D697FA50-5596-4026-B625-4A0202262A1E}" type="datetimeFigureOut">
               <a:rPr lang="en-US" smtClean="0"/>
-              <a:t>3/11/2018</a:t>
+              <a:t>3/12/2018</a:t>
             </a:fld>
             <a:endParaRPr lang="en-US"/>
           </a:p>
@@ -1160,7 +1161,7 @@
           <a:p>
             <a:fld id="{D697FA50-5596-4026-B625-4A0202262A1E}" type="datetimeFigureOut">
               <a:rPr lang="en-US" smtClean="0"/>
-              <a:t>3/11/2018</a:t>
+              <a:t>3/12/2018</a:t>
             </a:fld>
             <a:endParaRPr lang="en-US"/>
           </a:p>
@@ -1425,7 +1426,7 @@
           <a:p>
             <a:fld id="{D697FA50-5596-4026-B625-4A0202262A1E}" type="datetimeFigureOut">
               <a:rPr lang="en-US" smtClean="0"/>
-              <a:t>3/11/2018</a:t>
+              <a:t>3/12/2018</a:t>
             </a:fld>
             <a:endParaRPr lang="en-US"/>
           </a:p>
@@ -1837,7 +1838,7 @@
           <a:p>
             <a:fld id="{D697FA50-5596-4026-B625-4A0202262A1E}" type="datetimeFigureOut">
               <a:rPr lang="en-US" smtClean="0"/>
-              <a:t>3/11/2018</a:t>
+              <a:t>3/12/2018</a:t>
             </a:fld>
             <a:endParaRPr lang="en-US"/>
           </a:p>
@@ -1978,7 +1979,7 @@
           <a:p>
             <a:fld id="{D697FA50-5596-4026-B625-4A0202262A1E}" type="datetimeFigureOut">
               <a:rPr lang="en-US" smtClean="0"/>
-              <a:t>3/11/2018</a:t>
+              <a:t>3/12/2018</a:t>
             </a:fld>
             <a:endParaRPr lang="en-US"/>
           </a:p>
@@ -2091,7 +2092,7 @@
           <a:p>
             <a:fld id="{D697FA50-5596-4026-B625-4A0202262A1E}" type="datetimeFigureOut">
               <a:rPr lang="en-US" smtClean="0"/>
-              <a:t>3/11/2018</a:t>
+              <a:t>3/12/2018</a:t>
             </a:fld>
             <a:endParaRPr lang="en-US"/>
           </a:p>
@@ -2402,7 +2403,7 @@
           <a:p>
             <a:fld id="{D697FA50-5596-4026-B625-4A0202262A1E}" type="datetimeFigureOut">
               <a:rPr lang="en-US" smtClean="0"/>
-              <a:t>3/11/2018</a:t>
+              <a:t>3/12/2018</a:t>
             </a:fld>
             <a:endParaRPr lang="en-US"/>
           </a:p>
@@ -2690,7 +2691,7 @@
           <a:p>
             <a:fld id="{D697FA50-5596-4026-B625-4A0202262A1E}" type="datetimeFigureOut">
               <a:rPr lang="en-US" smtClean="0"/>
-              <a:t>3/11/2018</a:t>
+              <a:t>3/12/2018</a:t>
             </a:fld>
             <a:endParaRPr lang="en-US"/>
           </a:p>
@@ -2931,7 +2932,7 @@
           <a:p>
             <a:fld id="{D697FA50-5596-4026-B625-4A0202262A1E}" type="datetimeFigureOut">
               <a:rPr lang="en-US" smtClean="0"/>
-              <a:t>3/11/2018</a:t>
+              <a:t>3/12/2018</a:t>
             </a:fld>
             <a:endParaRPr lang="en-US"/>
           </a:p>
@@ -3634,13 +3635,17 @@
           <a:p>
             <a:r>
               <a:rPr lang="en-US" dirty="0"/>
-              <a:t>define and run multi-container Docker applications</a:t>
-            </a:r>
-          </a:p>
-          <a:p>
-            <a:r>
-              <a:rPr lang="en-US" dirty="0"/>
-              <a:t>yam configuration</a:t>
+              <a:t>tool for defining and running multi-container Docker applications</a:t>
+            </a:r>
+          </a:p>
+          <a:p>
+            <a:r>
+              <a:rPr lang="en-US" dirty="0" err="1"/>
+              <a:t>yaml</a:t>
+            </a:r>
+            <a:r>
+              <a:rPr lang="en-US" dirty="0"/>
+              <a:t> configuration</a:t>
             </a:r>
           </a:p>
           <a:p>
@@ -3777,8 +3782,8 @@
         </p:nvSpPr>
         <p:spPr>
           <a:xfrm>
-            <a:off x="-8389" y="6211232"/>
-            <a:ext cx="9118833" cy="646331"/>
+            <a:off x="0" y="5387965"/>
+            <a:ext cx="9118833" cy="923330"/>
           </a:xfrm>
           <a:prstGeom prst="rect">
             <a:avLst/>
@@ -3799,7 +3804,7 @@
                   </a:schemeClr>
                 </a:solidFill>
               </a:rPr>
-              <a:t>docker build</a:t>
+              <a:t>docker build -t (can target git repository)</a:t>
             </a:r>
           </a:p>
           <a:p>
@@ -3811,7 +3816,19 @@
                   </a:schemeClr>
                 </a:solidFill>
               </a:rPr>
-              <a:t>docker compose-up</a:t>
+              <a:t>docker-compose build</a:t>
+            </a:r>
+          </a:p>
+          <a:p>
+            <a:r>
+              <a:rPr lang="en-US" i="1" dirty="0">
+                <a:solidFill>
+                  <a:schemeClr val="accent2">
+                    <a:lumMod val="75000"/>
+                  </a:schemeClr>
+                </a:solidFill>
+              </a:rPr>
+              <a:t>docker-compose up</a:t>
             </a:r>
           </a:p>
         </p:txBody>
@@ -3892,7 +3909,9 @@
         </p:nvSpPr>
         <p:spPr/>
         <p:txBody>
-          <a:bodyPr/>
+          <a:bodyPr>
+            <a:normAutofit lnSpcReduction="10000"/>
+          </a:bodyPr>
           <a:lstStyle/>
           <a:p>
             <a:r>
@@ -3910,6 +3929,37 @@
             <a:r>
               <a:rPr lang="en-US" dirty="0"/>
               <a:t>Containers are top R/W layer</a:t>
+            </a:r>
+          </a:p>
+          <a:p>
+            <a:pPr lvl="1"/>
+            <a:r>
+              <a:rPr lang="en-US" dirty="0"/>
+              <a:t>not persistent</a:t>
+            </a:r>
+          </a:p>
+          <a:p>
+            <a:endParaRPr lang="en-US" dirty="0"/>
+          </a:p>
+          <a:p>
+            <a:endParaRPr lang="en-US" dirty="0"/>
+          </a:p>
+          <a:p>
+            <a:pPr marL="0" indent="0">
+              <a:buNone/>
+            </a:pPr>
+            <a:endParaRPr lang="en-US" dirty="0"/>
+          </a:p>
+          <a:p>
+            <a:pPr marL="0" indent="0">
+              <a:buNone/>
+            </a:pPr>
+            <a:endParaRPr lang="en-US" dirty="0"/>
+          </a:p>
+          <a:p>
+            <a:r>
+              <a:rPr lang="en-US" dirty="0"/>
+              <a:t>Next layer is set of differences compared to previous one</a:t>
             </a:r>
           </a:p>
         </p:txBody>
@@ -3936,8 +3986,38 @@
         </p:blipFill>
         <p:spPr>
           <a:xfrm>
-            <a:off x="5636602" y="1709605"/>
-            <a:ext cx="6660667" cy="4583378"/>
+            <a:off x="5546441" y="1586440"/>
+            <a:ext cx="5545923" cy="3816294"/>
+          </a:xfrm>
+          <a:prstGeom prst="rect">
+            <a:avLst/>
+          </a:prstGeom>
+        </p:spPr>
+      </p:pic>
+      <p:pic>
+        <p:nvPicPr>
+          <p:cNvPr id="5" name="Picture 4">
+            <a:extLst>
+              <a:ext uri="{FF2B5EF4-FFF2-40B4-BE49-F238E27FC236}">
+                <a16:creationId xmlns:a16="http://schemas.microsoft.com/office/drawing/2014/main" id="{2CD2E3D1-1DA8-44C7-BFC0-46435B33C029}"/>
+              </a:ext>
+            </a:extLst>
+          </p:cNvPr>
+          <p:cNvPicPr>
+            <a:picLocks noChangeAspect="1"/>
+          </p:cNvPicPr>
+          <p:nvPr/>
+        </p:nvPicPr>
+        <p:blipFill>
+          <a:blip r:embed="rId3"/>
+          <a:stretch>
+            <a:fillRect/>
+          </a:stretch>
+        </p:blipFill>
+        <p:spPr>
+          <a:xfrm>
+            <a:off x="10277907" y="2102014"/>
+            <a:ext cx="1753309" cy="886183"/>
           </a:xfrm>
           <a:prstGeom prst="rect">
             <a:avLst/>
@@ -4027,7 +4107,7 @@
           <a:p>
             <a:r>
               <a:rPr lang="en-US" dirty="0"/>
-              <a:t>Control how images and containers are stored (important)</a:t>
+              <a:t>Control how images and containers are stored and managed</a:t>
             </a:r>
           </a:p>
           <a:p>
@@ -4133,6 +4213,25 @@
             <a:r>
               <a:rPr lang="en-US" dirty="0"/>
               <a:t>, …)</a:t>
+            </a:r>
+          </a:p>
+          <a:p>
+            <a:pPr lvl="1"/>
+            <a:endParaRPr lang="en-US" dirty="0"/>
+          </a:p>
+          <a:p>
+            <a:pPr marL="0" indent="0">
+              <a:buNone/>
+            </a:pPr>
+            <a:endParaRPr lang="en-US" dirty="0"/>
+          </a:p>
+          <a:p>
+            <a:pPr marL="0" indent="0">
+              <a:buNone/>
+            </a:pPr>
+            <a:r>
+              <a:rPr lang="en-US" dirty="0"/>
+              <a:t>What happens when you change storage drive?</a:t>
             </a:r>
           </a:p>
           <a:p>
@@ -4678,7 +4777,7 @@
           <p:cNvPr id="2" name="Title 1">
             <a:extLst>
               <a:ext uri="{FF2B5EF4-FFF2-40B4-BE49-F238E27FC236}">
-                <a16:creationId xmlns:a16="http://schemas.microsoft.com/office/drawing/2014/main" id="{E89F9279-F437-4036-A51B-F9F9F2853ADC}"/>
+                <a16:creationId xmlns:a16="http://schemas.microsoft.com/office/drawing/2014/main" id="{08164F56-94C2-49D0-9A26-CBAFAF8A5F53}"/>
               </a:ext>
             </a:extLst>
           </p:cNvPr>
@@ -4696,7 +4795,7 @@
           <a:p>
             <a:r>
               <a:rPr lang="en-US" dirty="0"/>
-              <a:t>Docker – Networking</a:t>
+              <a:t>Docker - Networking</a:t>
             </a:r>
           </a:p>
         </p:txBody>
@@ -4706,7 +4805,7 @@
           <p:cNvPr id="3" name="Content Placeholder 2">
             <a:extLst>
               <a:ext uri="{FF2B5EF4-FFF2-40B4-BE49-F238E27FC236}">
-                <a16:creationId xmlns:a16="http://schemas.microsoft.com/office/drawing/2014/main" id="{E9BB5A2C-3CF7-4815-8D6B-8FAA55FC35EA}"/>
+                <a16:creationId xmlns:a16="http://schemas.microsoft.com/office/drawing/2014/main" id="{53676A56-9A6B-458A-BBD3-A327BD173BC3}"/>
               </a:ext>
             </a:extLst>
           </p:cNvPr>
@@ -4719,87 +4818,66 @@
         </p:nvSpPr>
         <p:spPr/>
         <p:txBody>
-          <a:bodyPr/>
-          <a:lstStyle/>
-          <a:p>
-            <a:r>
-              <a:rPr lang="en-US" dirty="0"/>
-              <a:t>Network drivers</a:t>
+          <a:bodyPr>
+            <a:normAutofit/>
+          </a:bodyPr>
+          <a:lstStyle/>
+          <a:p>
+            <a:r>
+              <a:rPr lang="en-US" dirty="0"/>
+              <a:t>Containers have their own IPs (not accessible from outside)</a:t>
             </a:r>
           </a:p>
           <a:p>
             <a:pPr lvl="1"/>
             <a:r>
               <a:rPr lang="en-US" dirty="0"/>
-              <a:t>bridge (default)</a:t>
+              <a:t>outgoing connections are allowed</a:t>
+            </a:r>
+          </a:p>
+          <a:p>
+            <a:r>
+              <a:rPr lang="en-US" dirty="0"/>
+              <a:t>Container MAC address is generated from its IP</a:t>
+            </a:r>
+          </a:p>
+          <a:p>
+            <a:r>
+              <a:rPr lang="en-US" dirty="0"/>
+              <a:t>DNS is the same as host uses</a:t>
+            </a:r>
+          </a:p>
+          <a:p>
+            <a:r>
+              <a:rPr lang="en-US" dirty="0"/>
+              <a:t>Docker host has IP (can be accessed from outside)</a:t>
+            </a:r>
+          </a:p>
+          <a:p>
+            <a:endParaRPr lang="en-US" dirty="0"/>
+          </a:p>
+          <a:p>
+            <a:r>
+              <a:rPr lang="en-US" dirty="0"/>
+              <a:t>Port binding (port forwarding)</a:t>
             </a:r>
           </a:p>
           <a:p>
             <a:pPr lvl="1"/>
             <a:r>
               <a:rPr lang="en-US" dirty="0"/>
-              <a:t>overlay</a:t>
-            </a:r>
-          </a:p>
-          <a:p>
-            <a:pPr lvl="2"/>
-            <a:r>
-              <a:rPr lang="en-US" dirty="0"/>
-              <a:t>connect multiple docker daemons</a:t>
+              <a:t>must be set during creation</a:t>
             </a:r>
           </a:p>
           <a:p>
             <a:pPr lvl="1"/>
             <a:r>
-              <a:rPr lang="en-US" dirty="0"/>
-              <a:t>host</a:t>
-            </a:r>
-          </a:p>
-          <a:p>
-            <a:pPr lvl="2"/>
-            <a:r>
-              <a:rPr lang="en-US" dirty="0"/>
-              <a:t>host’s network is used directly</a:t>
-            </a:r>
-          </a:p>
-          <a:p>
-            <a:pPr lvl="2"/>
-            <a:r>
-              <a:rPr lang="en-US" dirty="0"/>
-              <a:t>available for swarm services</a:t>
-            </a:r>
-          </a:p>
-          <a:p>
-            <a:pPr lvl="1"/>
-            <a:r>
               <a:rPr lang="en-US" dirty="0" err="1"/>
-              <a:t>macvlan</a:t>
+              <a:t>nginx</a:t>
             </a:r>
             <a:endParaRPr lang="en-US" dirty="0"/>
           </a:p>
           <a:p>
-            <a:pPr lvl="2"/>
-            <a:r>
-              <a:rPr lang="en-US" dirty="0"/>
-              <a:t>container is assigned MAC address</a:t>
-            </a:r>
-          </a:p>
-          <a:p>
-            <a:pPr lvl="2"/>
-            <a:r>
-              <a:rPr lang="en-US" dirty="0"/>
-              <a:t>for legacy reasons</a:t>
-            </a:r>
-          </a:p>
-          <a:p>
-            <a:pPr lvl="1"/>
-            <a:r>
-              <a:rPr lang="en-US" dirty="0"/>
-              <a:t>none</a:t>
-            </a:r>
-          </a:p>
-          <a:p>
-            <a:pPr lvl="1"/>
             <a:endParaRPr lang="en-US" dirty="0"/>
           </a:p>
         </p:txBody>
@@ -4807,7 +4885,7 @@
     </p:spTree>
     <p:extLst>
       <p:ext uri="{BB962C8B-B14F-4D97-AF65-F5344CB8AC3E}">
-        <p14:creationId xmlns:p14="http://schemas.microsoft.com/office/powerpoint/2010/main" val="625904788"/>
+        <p14:creationId xmlns:p14="http://schemas.microsoft.com/office/powerpoint/2010/main" val="2296211017"/>
       </p:ext>
     </p:extLst>
   </p:cSld>
@@ -4839,7 +4917,7 @@
           <p:cNvPr id="2" name="Title 1">
             <a:extLst>
               <a:ext uri="{FF2B5EF4-FFF2-40B4-BE49-F238E27FC236}">
-                <a16:creationId xmlns:a16="http://schemas.microsoft.com/office/drawing/2014/main" id="{BC3BA01F-AAE0-4BA1-9E4A-89D64DEC7B6A}"/>
+                <a16:creationId xmlns:a16="http://schemas.microsoft.com/office/drawing/2014/main" id="{E89F9279-F437-4036-A51B-F9F9F2853ADC}"/>
               </a:ext>
             </a:extLst>
           </p:cNvPr>
@@ -4857,7 +4935,7 @@
           <a:p>
             <a:r>
               <a:rPr lang="en-US" dirty="0"/>
-              <a:t>Bridge network</a:t>
+              <a:t>Docker – Networking</a:t>
             </a:r>
           </a:p>
         </p:txBody>
@@ -4867,7 +4945,7 @@
           <p:cNvPr id="3" name="Content Placeholder 2">
             <a:extLst>
               <a:ext uri="{FF2B5EF4-FFF2-40B4-BE49-F238E27FC236}">
-                <a16:creationId xmlns:a16="http://schemas.microsoft.com/office/drawing/2014/main" id="{A35F4938-CA3E-4EF4-B8A3-CCAA14709FCF}"/>
+                <a16:creationId xmlns:a16="http://schemas.microsoft.com/office/drawing/2014/main" id="{E9BB5A2C-3CF7-4815-8D6B-8FAA55FC35EA}"/>
               </a:ext>
             </a:extLst>
           </p:cNvPr>
@@ -4885,73 +4963,90 @@
           <a:p>
             <a:r>
               <a:rPr lang="en-US" dirty="0"/>
-              <a:t>communication between containers on the same docker host</a:t>
-            </a:r>
-          </a:p>
-          <a:p>
-            <a:r>
-              <a:rPr lang="en-US" dirty="0"/>
-              <a:t>default bridge network</a:t>
+              <a:t>Network drivers</a:t>
             </a:r>
           </a:p>
           <a:p>
             <a:pPr lvl="1"/>
             <a:r>
               <a:rPr lang="en-US" dirty="0"/>
-              <a:t>created automatically (all container connect to it unless specified otherwise)</a:t>
+              <a:t>bridge (default)</a:t>
             </a:r>
           </a:p>
           <a:p>
             <a:pPr lvl="1"/>
             <a:r>
               <a:rPr lang="en-US" dirty="0"/>
-              <a:t>communication via IP address</a:t>
+              <a:t>overlay</a:t>
+            </a:r>
+          </a:p>
+          <a:p>
+            <a:pPr lvl="2"/>
+            <a:r>
+              <a:rPr lang="en-US" dirty="0"/>
+              <a:t>connect multiple docker daemons</a:t>
+            </a:r>
+          </a:p>
+          <a:p>
+            <a:pPr lvl="1"/>
+            <a:r>
+              <a:rPr lang="en-US" dirty="0"/>
+              <a:t>host</a:t>
+            </a:r>
+          </a:p>
+          <a:p>
+            <a:pPr lvl="2"/>
+            <a:r>
+              <a:rPr lang="en-US" dirty="0"/>
+              <a:t>host’s network is used directly</a:t>
+            </a:r>
+          </a:p>
+          <a:p>
+            <a:pPr lvl="2"/>
+            <a:r>
+              <a:rPr lang="en-US" dirty="0"/>
+              <a:t>available for swarm services</a:t>
+            </a:r>
+          </a:p>
+          <a:p>
+            <a:pPr lvl="1"/>
+            <a:r>
+              <a:rPr lang="en-US" dirty="0" err="1"/>
+              <a:t>macvlan</a:t>
+            </a:r>
+            <a:endParaRPr lang="en-US" dirty="0"/>
+          </a:p>
+          <a:p>
+            <a:pPr lvl="2"/>
+            <a:r>
+              <a:rPr lang="en-US" dirty="0"/>
+              <a:t>container is assigned MAC address</a:t>
+            </a:r>
+          </a:p>
+          <a:p>
+            <a:pPr lvl="2"/>
+            <a:r>
+              <a:rPr lang="en-US" dirty="0"/>
+              <a:t>for legacy reasons</a:t>
+            </a:r>
+          </a:p>
+          <a:p>
+            <a:pPr lvl="1"/>
+            <a:r>
+              <a:rPr lang="en-US" dirty="0"/>
+              <a:t>none</a:t>
             </a:r>
           </a:p>
           <a:p>
             <a:pPr lvl="1"/>
             <a:endParaRPr lang="en-US" dirty="0"/>
-          </a:p>
-          <a:p>
-            <a:r>
-              <a:rPr lang="en-US" dirty="0"/>
-              <a:t>User defined bridge networks</a:t>
-            </a:r>
-          </a:p>
-          <a:p>
-            <a:pPr lvl="1"/>
-            <a:r>
-              <a:rPr lang="en-US" dirty="0"/>
-              <a:t>containers expose all ports to each other</a:t>
-            </a:r>
-          </a:p>
-          <a:p>
-            <a:pPr lvl="1"/>
-            <a:r>
-              <a:rPr lang="en-US" dirty="0"/>
-              <a:t>no ports are exposed to the outside world</a:t>
-            </a:r>
-          </a:p>
-          <a:p>
-            <a:pPr lvl="1"/>
-            <a:r>
-              <a:rPr lang="en-US" dirty="0"/>
-              <a:t>communication via container name</a:t>
-            </a:r>
-          </a:p>
-          <a:p>
-            <a:pPr lvl="1"/>
-            <a:r>
-              <a:rPr lang="en-US" dirty="0"/>
-              <a:t>can connect/disconnect on fly</a:t>
-            </a:r>
           </a:p>
         </p:txBody>
       </p:sp>
     </p:spTree>
     <p:extLst>
       <p:ext uri="{BB962C8B-B14F-4D97-AF65-F5344CB8AC3E}">
-        <p14:creationId xmlns:p14="http://schemas.microsoft.com/office/powerpoint/2010/main" val="765546256"/>
+        <p14:creationId xmlns:p14="http://schemas.microsoft.com/office/powerpoint/2010/main" val="625904788"/>
       </p:ext>
     </p:extLst>
   </p:cSld>
@@ -5131,7 +5226,7 @@
           <p:cNvPr id="2" name="Title 1">
             <a:extLst>
               <a:ext uri="{FF2B5EF4-FFF2-40B4-BE49-F238E27FC236}">
-                <a16:creationId xmlns:a16="http://schemas.microsoft.com/office/drawing/2014/main" id="{08164F56-94C2-49D0-9A26-CBAFAF8A5F53}"/>
+                <a16:creationId xmlns:a16="http://schemas.microsoft.com/office/drawing/2014/main" id="{BC3BA01F-AAE0-4BA1-9E4A-89D64DEC7B6A}"/>
               </a:ext>
             </a:extLst>
           </p:cNvPr>
@@ -5149,7 +5244,7 @@
           <a:p>
             <a:r>
               <a:rPr lang="en-US" dirty="0"/>
-              <a:t>Docker networking</a:t>
+              <a:t>Bridge network</a:t>
             </a:r>
           </a:p>
         </p:txBody>
@@ -5159,7 +5254,7 @@
           <p:cNvPr id="3" name="Content Placeholder 2">
             <a:extLst>
               <a:ext uri="{FF2B5EF4-FFF2-40B4-BE49-F238E27FC236}">
-                <a16:creationId xmlns:a16="http://schemas.microsoft.com/office/drawing/2014/main" id="{53676A56-9A6B-458A-BBD3-A327BD173BC3}"/>
+                <a16:creationId xmlns:a16="http://schemas.microsoft.com/office/drawing/2014/main" id="{A35F4938-CA3E-4EF4-B8A3-CCAA14709FCF}"/>
               </a:ext>
             </a:extLst>
           </p:cNvPr>
@@ -5172,66 +5267,78 @@
         </p:nvSpPr>
         <p:spPr/>
         <p:txBody>
-          <a:bodyPr>
-            <a:normAutofit/>
-          </a:bodyPr>
-          <a:lstStyle/>
-          <a:p>
-            <a:r>
-              <a:rPr lang="en-US" dirty="0"/>
-              <a:t>Containers have their own IPs (not accessible from outside)</a:t>
+          <a:bodyPr/>
+          <a:lstStyle/>
+          <a:p>
+            <a:r>
+              <a:rPr lang="en-US" dirty="0"/>
+              <a:t>communication between containers on the same docker host</a:t>
+            </a:r>
+          </a:p>
+          <a:p>
+            <a:r>
+              <a:rPr lang="en-US" dirty="0"/>
+              <a:t>default bridge network</a:t>
             </a:r>
           </a:p>
           <a:p>
             <a:pPr lvl="1"/>
             <a:r>
               <a:rPr lang="en-US" dirty="0"/>
-              <a:t>outgoing connections are allowed</a:t>
-            </a:r>
-          </a:p>
-          <a:p>
-            <a:r>
-              <a:rPr lang="en-US" dirty="0"/>
-              <a:t>Container MAC address is generated from its IP</a:t>
-            </a:r>
-          </a:p>
-          <a:p>
-            <a:r>
-              <a:rPr lang="en-US" dirty="0"/>
-              <a:t>DNS is the same as host uses</a:t>
-            </a:r>
-          </a:p>
-          <a:p>
-            <a:r>
-              <a:rPr lang="en-US" dirty="0"/>
-              <a:t>Docker host has IP (can be accessed from outside)</a:t>
-            </a:r>
-          </a:p>
-          <a:p>
+              <a:t>created automatically (all container connect to it unless specified otherwise)</a:t>
+            </a:r>
+          </a:p>
+          <a:p>
+            <a:pPr lvl="1"/>
+            <a:r>
+              <a:rPr lang="en-US" dirty="0"/>
+              <a:t>communication via IP address</a:t>
+            </a:r>
+          </a:p>
+          <a:p>
+            <a:pPr lvl="1"/>
             <a:endParaRPr lang="en-US" dirty="0"/>
           </a:p>
           <a:p>
             <a:r>
               <a:rPr lang="en-US" dirty="0"/>
-              <a:t>Port binding (port forwarding)</a:t>
+              <a:t>User defined bridge networks</a:t>
             </a:r>
           </a:p>
           <a:p>
             <a:pPr lvl="1"/>
             <a:r>
               <a:rPr lang="en-US" dirty="0"/>
-              <a:t>must be set during creation</a:t>
-            </a:r>
-          </a:p>
-          <a:p>
-            <a:endParaRPr lang="en-US" dirty="0"/>
+              <a:t>containers expose all ports to each other</a:t>
+            </a:r>
+          </a:p>
+          <a:p>
+            <a:pPr lvl="1"/>
+            <a:r>
+              <a:rPr lang="en-US" dirty="0"/>
+              <a:t>no ports are exposed to the outside world</a:t>
+            </a:r>
+          </a:p>
+          <a:p>
+            <a:pPr lvl="1"/>
+            <a:r>
+              <a:rPr lang="en-US" dirty="0"/>
+              <a:t>communication via container name</a:t>
+            </a:r>
+          </a:p>
+          <a:p>
+            <a:pPr lvl="1"/>
+            <a:r>
+              <a:rPr lang="en-US" dirty="0"/>
+              <a:t>can connect/disconnect on fly</a:t>
+            </a:r>
           </a:p>
         </p:txBody>
       </p:sp>
     </p:spTree>
     <p:extLst>
       <p:ext uri="{BB962C8B-B14F-4D97-AF65-F5344CB8AC3E}">
-        <p14:creationId xmlns:p14="http://schemas.microsoft.com/office/powerpoint/2010/main" val="2296211017"/>
+        <p14:creationId xmlns:p14="http://schemas.microsoft.com/office/powerpoint/2010/main" val="765546256"/>
       </p:ext>
     </p:extLst>
   </p:cSld>
@@ -5327,7 +5434,7 @@
             </a:pPr>
             <a:r>
               <a:rPr lang="en-US" sz="4800" dirty="0"/>
-              <a:t>MariaDB example</a:t>
+              <a:t>phpMyAdmin + MariaDB</a:t>
             </a:r>
           </a:p>
         </p:txBody>
@@ -5346,7 +5453,7 @@
         </p:nvSpPr>
         <p:spPr>
           <a:xfrm>
-            <a:off x="0" y="4852653"/>
+            <a:off x="0" y="5657671"/>
             <a:ext cx="9118833" cy="1200329"/>
           </a:xfrm>
           <a:prstGeom prst="rect">
@@ -5397,16 +5504,6 @@
           </a:p>
           <a:p>
             <a:r>
-              <a:rPr lang="en-US" i="1">
-                <a:solidFill>
-                  <a:schemeClr val="accent2">
-                    <a:lumMod val="75000"/>
-                  </a:schemeClr>
-                </a:solidFill>
-              </a:rPr>
-              <a:t>docker -p</a:t>
-            </a:r>
-            <a:r>
               <a:rPr lang="en-US" i="1" dirty="0">
                 <a:solidFill>
                   <a:schemeClr val="accent2">
@@ -5414,7 +5511,7 @@
                   </a:schemeClr>
                 </a:solidFill>
               </a:rPr>
-              <a:t>:8080:80</a:t>
+              <a:t>docker -p:8080:80</a:t>
             </a:r>
           </a:p>
         </p:txBody>
@@ -5669,6 +5766,89 @@
     <p:extLst>
       <p:ext uri="{BB962C8B-B14F-4D97-AF65-F5344CB8AC3E}">
         <p14:creationId xmlns:p14="http://schemas.microsoft.com/office/powerpoint/2010/main" val="3651795639"/>
+      </p:ext>
+    </p:extLst>
+  </p:cSld>
+  <p:clrMapOvr>
+    <a:masterClrMapping/>
+  </p:clrMapOvr>
+</p:sld>
+</file>
+
+<file path=ppt/slides/slide24.xml><?xml version="1.0" encoding="utf-8"?>
+<p:sld xmlns:a="http://schemas.openxmlformats.org/drawingml/2006/main" xmlns:r="http://schemas.openxmlformats.org/officeDocument/2006/relationships" xmlns:p="http://schemas.openxmlformats.org/presentationml/2006/main">
+  <p:cSld>
+    <p:spTree>
+      <p:nvGrpSpPr>
+        <p:cNvPr id="1" name=""/>
+        <p:cNvGrpSpPr/>
+        <p:nvPr/>
+      </p:nvGrpSpPr>
+      <p:grpSpPr>
+        <a:xfrm>
+          <a:off x="0" y="0"/>
+          <a:ext cx="0" cy="0"/>
+          <a:chOff x="0" y="0"/>
+          <a:chExt cx="0" cy="0"/>
+        </a:xfrm>
+      </p:grpSpPr>
+      <p:sp>
+        <p:nvSpPr>
+          <p:cNvPr id="2" name="Title 1">
+            <a:extLst>
+              <a:ext uri="{FF2B5EF4-FFF2-40B4-BE49-F238E27FC236}">
+                <a16:creationId xmlns:a16="http://schemas.microsoft.com/office/drawing/2014/main" id="{C20B66C9-CE7A-4477-953E-205BA0E11C81}"/>
+              </a:ext>
+            </a:extLst>
+          </p:cNvPr>
+          <p:cNvSpPr>
+            <a:spLocks noGrp="1"/>
+          </p:cNvSpPr>
+          <p:nvPr>
+            <p:ph type="title"/>
+          </p:nvPr>
+        </p:nvSpPr>
+        <p:spPr/>
+        <p:txBody>
+          <a:bodyPr/>
+          <a:lstStyle/>
+          <a:p>
+            <a:r>
+              <a:rPr lang="en-US" dirty="0"/>
+              <a:t>Exercise</a:t>
+            </a:r>
+          </a:p>
+        </p:txBody>
+      </p:sp>
+      <p:sp>
+        <p:nvSpPr>
+          <p:cNvPr id="3" name="Content Placeholder 2">
+            <a:extLst>
+              <a:ext uri="{FF2B5EF4-FFF2-40B4-BE49-F238E27FC236}">
+                <a16:creationId xmlns:a16="http://schemas.microsoft.com/office/drawing/2014/main" id="{3B4976B0-1C36-4D9E-8E3B-E591570826C9}"/>
+              </a:ext>
+            </a:extLst>
+          </p:cNvPr>
+          <p:cNvSpPr>
+            <a:spLocks noGrp="1"/>
+          </p:cNvSpPr>
+          <p:nvPr>
+            <p:ph idx="1"/>
+          </p:nvPr>
+        </p:nvSpPr>
+        <p:spPr/>
+        <p:txBody>
+          <a:bodyPr/>
+          <a:lstStyle/>
+          <a:p>
+            <a:endParaRPr lang="en-US"/>
+          </a:p>
+        </p:txBody>
+      </p:sp>
+    </p:spTree>
+    <p:extLst>
+      <p:ext uri="{BB962C8B-B14F-4D97-AF65-F5344CB8AC3E}">
+        <p14:creationId xmlns:p14="http://schemas.microsoft.com/office/powerpoint/2010/main" val="2719538758"/>
       </p:ext>
     </p:extLst>
   </p:cSld>

</xml_diff>